<commit_message>
Changed Virus Charts, finished mains of poster
</commit_message>
<xml_diff>
--- a/Science Fair Poster .pptx
+++ b/Science Fair Poster .pptx
@@ -110,7 +110,7 @@
   </p:defaultTextStyle>
   <p:extLst>
     <p:ext uri="{EFAFB233-063F-42B5-8137-9DF3F51BA10A}">
-      <p15:sldGuideLst xmlns:p15="http://schemas.microsoft.com/office/powerpoint/2012/main" xmlns="">
+      <p15:sldGuideLst xmlns="" xmlns:p15="http://schemas.microsoft.com/office/powerpoint/2012/main">
         <p15:guide id="1" orient="horz" pos="6912" userDrawn="1">
           <p15:clr>
             <a:srgbClr val="A4A3A4"/>
@@ -124,7 +124,7 @@
       </p15:sldGuideLst>
     </p:ext>
     <p:ext uri="{2D200454-40CA-4A62-9FC3-DE9A4176ACB9}">
-      <p15:notesGuideLst xmlns:p15="http://schemas.microsoft.com/office/powerpoint/2012/main" xmlns="">
+      <p15:notesGuideLst xmlns="" xmlns:p15="http://schemas.microsoft.com/office/powerpoint/2012/main">
         <p15:guide id="1" orient="horz" pos="2880" userDrawn="1">
           <p15:clr>
             <a:srgbClr val="A4A3A4"/>
@@ -240,22 +240,22 @@
                   <c:v>100.0</c:v>
                 </c:pt>
                 <c:pt idx="3">
-                  <c:v>46.66666666666666</c:v>
+                  <c:v>46.66666666666664</c:v>
                 </c:pt>
                 <c:pt idx="4">
-                  <c:v>46.66666666666666</c:v>
+                  <c:v>46.66666666666664</c:v>
                 </c:pt>
                 <c:pt idx="5">
-                  <c:v>46.66666666666666</c:v>
+                  <c:v>46.66666666666664</c:v>
                 </c:pt>
                 <c:pt idx="6">
-                  <c:v>46.66666666666666</c:v>
+                  <c:v>46.66666666666664</c:v>
                 </c:pt>
                 <c:pt idx="7">
-                  <c:v>46.66666666666666</c:v>
+                  <c:v>46.66666666666664</c:v>
                 </c:pt>
                 <c:pt idx="8">
-                  <c:v>46.66666666666666</c:v>
+                  <c:v>46.66666666666664</c:v>
                 </c:pt>
                 <c:pt idx="9">
                   <c:v>5.0</c:v>
@@ -288,8 +288,8 @@
           <c:showPercent val="0"/>
           <c:showBubbleSize val="0"/>
         </c:dLbls>
-        <c:axId val="-2133739944"/>
-        <c:axId val="-2131922616"/>
+        <c:axId val="2116193144"/>
+        <c:axId val="2116195784"/>
       </c:scatterChart>
       <c:scatterChart>
         <c:scatterStyle val="smoothMarker"/>
@@ -421,11 +421,11 @@
           <c:showPercent val="0"/>
           <c:showBubbleSize val="0"/>
         </c:dLbls>
-        <c:axId val="2132995048"/>
-        <c:axId val="-2132565048"/>
+        <c:axId val="2116191368"/>
+        <c:axId val="2116188344"/>
       </c:scatterChart>
       <c:valAx>
-        <c:axId val="-2133739944"/>
+        <c:axId val="2116193144"/>
         <c:scaling>
           <c:orientation val="minMax"/>
         </c:scaling>
@@ -471,12 +471,12 @@
             <a:endParaRPr lang="en-US"/>
           </a:p>
         </c:txPr>
-        <c:crossAx val="-2131922616"/>
+        <c:crossAx val="2116195784"/>
         <c:crosses val="autoZero"/>
         <c:crossBetween val="midCat"/>
       </c:valAx>
       <c:valAx>
-        <c:axId val="-2131922616"/>
+        <c:axId val="2116195784"/>
         <c:scaling>
           <c:orientation val="minMax"/>
         </c:scaling>
@@ -511,12 +511,12 @@
         <c:majorTickMark val="out"/>
         <c:minorTickMark val="none"/>
         <c:tickLblPos val="nextTo"/>
-        <c:crossAx val="-2133739944"/>
+        <c:crossAx val="2116193144"/>
         <c:crosses val="autoZero"/>
         <c:crossBetween val="midCat"/>
       </c:valAx>
       <c:valAx>
-        <c:axId val="2132995048"/>
+        <c:axId val="2116191368"/>
         <c:scaling>
           <c:orientation val="minMax"/>
         </c:scaling>
@@ -526,12 +526,12 @@
         <c:majorTickMark val="out"/>
         <c:minorTickMark val="none"/>
         <c:tickLblPos val="nextTo"/>
-        <c:crossAx val="-2132565048"/>
+        <c:crossAx val="2116188344"/>
         <c:crosses val="autoZero"/>
         <c:crossBetween val="midCat"/>
       </c:valAx>
       <c:valAx>
-        <c:axId val="-2132565048"/>
+        <c:axId val="2116188344"/>
         <c:scaling>
           <c:orientation val="minMax"/>
         </c:scaling>
@@ -565,7 +565,7 @@
         <c:majorTickMark val="out"/>
         <c:minorTickMark val="none"/>
         <c:tickLblPos val="nextTo"/>
-        <c:crossAx val="2132995048"/>
+        <c:crossAx val="2116191368"/>
         <c:crosses val="max"/>
         <c:crossBetween val="midCat"/>
       </c:valAx>
@@ -875,11 +875,11 @@
           <c:showPercent val="0"/>
           <c:showBubbleSize val="0"/>
         </c:dLbls>
-        <c:axId val="2138193496"/>
-        <c:axId val="2138179544"/>
+        <c:axId val="2116141224"/>
+        <c:axId val="2116135640"/>
       </c:scatterChart>
       <c:valAx>
-        <c:axId val="2138193496"/>
+        <c:axId val="2116141224"/>
         <c:scaling>
           <c:orientation val="minMax"/>
         </c:scaling>
@@ -925,12 +925,12 @@
             <a:endParaRPr lang="en-US"/>
           </a:p>
         </c:txPr>
-        <c:crossAx val="2138179544"/>
+        <c:crossAx val="2116135640"/>
         <c:crosses val="autoZero"/>
         <c:crossBetween val="midCat"/>
       </c:valAx>
       <c:valAx>
-        <c:axId val="2138179544"/>
+        <c:axId val="2116135640"/>
         <c:scaling>
           <c:orientation val="minMax"/>
           <c:min val="0.0"/>
@@ -966,7 +966,7 @@
         <c:majorTickMark val="out"/>
         <c:minorTickMark val="none"/>
         <c:tickLblPos val="nextTo"/>
-        <c:crossAx val="2138193496"/>
+        <c:crossAx val="2116141224"/>
         <c:crosses val="autoZero"/>
         <c:crossBetween val="midCat"/>
       </c:valAx>
@@ -1109,22 +1109,22 @@
                   <c:v>100.0</c:v>
                 </c:pt>
                 <c:pt idx="3">
-                  <c:v>46.66666666666666</c:v>
+                  <c:v>46.66666666666664</c:v>
                 </c:pt>
                 <c:pt idx="4">
-                  <c:v>46.66666666666666</c:v>
+                  <c:v>46.66666666666664</c:v>
                 </c:pt>
                 <c:pt idx="5">
-                  <c:v>46.66666666666666</c:v>
+                  <c:v>46.66666666666664</c:v>
                 </c:pt>
                 <c:pt idx="6">
-                  <c:v>46.66666666666666</c:v>
+                  <c:v>46.66666666666664</c:v>
                 </c:pt>
                 <c:pt idx="7">
-                  <c:v>46.66666666666666</c:v>
+                  <c:v>46.66666666666664</c:v>
                 </c:pt>
                 <c:pt idx="8">
-                  <c:v>46.66666666666666</c:v>
+                  <c:v>46.66666666666664</c:v>
                 </c:pt>
                 <c:pt idx="9">
                   <c:v>5.0</c:v>
@@ -1276,11 +1276,11 @@
           <c:showPercent val="0"/>
           <c:showBubbleSize val="0"/>
         </c:dLbls>
-        <c:axId val="-2131929320"/>
-        <c:axId val="-2133605432"/>
+        <c:axId val="2116102584"/>
+        <c:axId val="2116097096"/>
       </c:scatterChart>
       <c:valAx>
-        <c:axId val="-2131929320"/>
+        <c:axId val="2116102584"/>
         <c:scaling>
           <c:orientation val="minMax"/>
         </c:scaling>
@@ -1326,12 +1326,12 @@
             <a:endParaRPr lang="en-US"/>
           </a:p>
         </c:txPr>
-        <c:crossAx val="-2133605432"/>
+        <c:crossAx val="2116097096"/>
         <c:crosses val="autoZero"/>
         <c:crossBetween val="midCat"/>
       </c:valAx>
       <c:valAx>
-        <c:axId val="-2133605432"/>
+        <c:axId val="2116097096"/>
         <c:scaling>
           <c:orientation val="minMax"/>
         </c:scaling>
@@ -1366,7 +1366,2118 @@
         <c:majorTickMark val="out"/>
         <c:minorTickMark val="none"/>
         <c:tickLblPos val="nextTo"/>
-        <c:crossAx val="-2131929320"/>
+        <c:crossAx val="2116102584"/>
+        <c:crosses val="autoZero"/>
+        <c:crossBetween val="midCat"/>
+      </c:valAx>
+    </c:plotArea>
+    <c:legend>
+      <c:legendPos val="r"/>
+      <c:layout/>
+      <c:overlay val="0"/>
+    </c:legend>
+    <c:plotVisOnly val="1"/>
+    <c:dispBlanksAs val="gap"/>
+    <c:showDLblsOverMax val="0"/>
+  </c:chart>
+  <c:externalData r:id="rId1">
+    <c:autoUpdate val="0"/>
+  </c:externalData>
+</c:chartSpace>
+</file>
+
+<file path=ppt/charts/chart4.xml><?xml version="1.0" encoding="utf-8"?>
+<c:chartSpace xmlns:c="http://schemas.openxmlformats.org/drawingml/2006/chart" xmlns:a="http://schemas.openxmlformats.org/drawingml/2006/main" xmlns:r="http://schemas.openxmlformats.org/officeDocument/2006/relationships">
+  <c:date1904 val="0"/>
+  <c:lang val="en-US"/>
+  <c:roundedCorners val="0"/>
+  <mc:AlternateContent xmlns:mc="http://schemas.openxmlformats.org/markup-compatibility/2006">
+    <mc:Choice xmlns:c14="http://schemas.microsoft.com/office/drawing/2007/8/2/chart" Requires="c14">
+      <c14:style val="118"/>
+    </mc:Choice>
+    <mc:Fallback>
+      <c:style val="18"/>
+    </mc:Fallback>
+  </mc:AlternateContent>
+  <c:chart>
+    <c:title>
+      <c:tx>
+        <c:rich>
+          <a:bodyPr/>
+          <a:lstStyle/>
+          <a:p>
+            <a:pPr>
+              <a:defRPr/>
+            </a:pPr>
+            <a:r>
+              <a:rPr lang="en-US"/>
+              <a:t>Body</a:t>
+            </a:r>
+            <a:r>
+              <a:rPr lang="en-US" baseline="0"/>
+              <a:t> Cell Death With and Without Immune System</a:t>
+            </a:r>
+            <a:endParaRPr lang="en-US"/>
+          </a:p>
+        </c:rich>
+      </c:tx>
+      <c:layout/>
+      <c:overlay val="0"/>
+    </c:title>
+    <c:autoTitleDeleted val="0"/>
+    <c:plotArea>
+      <c:layout/>
+      <c:scatterChart>
+        <c:scatterStyle val="smoothMarker"/>
+        <c:varyColors val="0"/>
+        <c:ser>
+          <c:idx val="0"/>
+          <c:order val="0"/>
+          <c:tx>
+            <c:v>Without Immune System</c:v>
+          </c:tx>
+          <c:marker>
+            <c:symbol val="none"/>
+          </c:marker>
+          <c:xVal>
+            <c:numRef>
+              <c:f>'With Immune system'!$G$3:$G$36</c:f>
+              <c:numCache>
+                <c:formatCode>General</c:formatCode>
+                <c:ptCount val="34"/>
+                <c:pt idx="0">
+                  <c:v>1.0</c:v>
+                </c:pt>
+                <c:pt idx="1">
+                  <c:v>2.0</c:v>
+                </c:pt>
+                <c:pt idx="2">
+                  <c:v>3.0</c:v>
+                </c:pt>
+                <c:pt idx="3">
+                  <c:v>4.0</c:v>
+                </c:pt>
+                <c:pt idx="4">
+                  <c:v>5.0</c:v>
+                </c:pt>
+                <c:pt idx="5">
+                  <c:v>6.0</c:v>
+                </c:pt>
+                <c:pt idx="6">
+                  <c:v>7.0</c:v>
+                </c:pt>
+                <c:pt idx="7">
+                  <c:v>8.0</c:v>
+                </c:pt>
+                <c:pt idx="8">
+                  <c:v>9.0</c:v>
+                </c:pt>
+                <c:pt idx="9">
+                  <c:v>10.0</c:v>
+                </c:pt>
+                <c:pt idx="10">
+                  <c:v>11.0</c:v>
+                </c:pt>
+                <c:pt idx="11">
+                  <c:v>12.0</c:v>
+                </c:pt>
+                <c:pt idx="12">
+                  <c:v>13.0</c:v>
+                </c:pt>
+                <c:pt idx="13">
+                  <c:v>14.0</c:v>
+                </c:pt>
+                <c:pt idx="14">
+                  <c:v>15.0</c:v>
+                </c:pt>
+                <c:pt idx="15">
+                  <c:v>16.0</c:v>
+                </c:pt>
+                <c:pt idx="16">
+                  <c:v>17.0</c:v>
+                </c:pt>
+                <c:pt idx="17">
+                  <c:v>18.0</c:v>
+                </c:pt>
+                <c:pt idx="18">
+                  <c:v>19.0</c:v>
+                </c:pt>
+                <c:pt idx="19">
+                  <c:v>20.0</c:v>
+                </c:pt>
+                <c:pt idx="20">
+                  <c:v>21.0</c:v>
+                </c:pt>
+                <c:pt idx="21">
+                  <c:v>22.0</c:v>
+                </c:pt>
+                <c:pt idx="22">
+                  <c:v>23.0</c:v>
+                </c:pt>
+                <c:pt idx="23">
+                  <c:v>24.0</c:v>
+                </c:pt>
+                <c:pt idx="24">
+                  <c:v>25.0</c:v>
+                </c:pt>
+                <c:pt idx="25">
+                  <c:v>26.0</c:v>
+                </c:pt>
+                <c:pt idx="26">
+                  <c:v>27.0</c:v>
+                </c:pt>
+                <c:pt idx="27">
+                  <c:v>28.0</c:v>
+                </c:pt>
+                <c:pt idx="28">
+                  <c:v>29.0</c:v>
+                </c:pt>
+                <c:pt idx="29">
+                  <c:v>30.0</c:v>
+                </c:pt>
+                <c:pt idx="30">
+                  <c:v>31.0</c:v>
+                </c:pt>
+                <c:pt idx="31">
+                  <c:v>32.0</c:v>
+                </c:pt>
+                <c:pt idx="32">
+                  <c:v>33.0</c:v>
+                </c:pt>
+                <c:pt idx="33">
+                  <c:v>34.0</c:v>
+                </c:pt>
+              </c:numCache>
+            </c:numRef>
+          </c:xVal>
+          <c:yVal>
+            <c:numRef>
+              <c:f>'With Immune system'!$H$3:$H$36</c:f>
+              <c:numCache>
+                <c:formatCode>0.00</c:formatCode>
+                <c:ptCount val="34"/>
+                <c:pt idx="0">
+                  <c:v>100.0</c:v>
+                </c:pt>
+                <c:pt idx="1">
+                  <c:v>100.0</c:v>
+                </c:pt>
+                <c:pt idx="2">
+                  <c:v>100.0</c:v>
+                </c:pt>
+                <c:pt idx="3">
+                  <c:v>46.66666666666666</c:v>
+                </c:pt>
+                <c:pt idx="4">
+                  <c:v>46.66666666666666</c:v>
+                </c:pt>
+                <c:pt idx="5">
+                  <c:v>46.66666666666666</c:v>
+                </c:pt>
+                <c:pt idx="6">
+                  <c:v>46.66666666666666</c:v>
+                </c:pt>
+                <c:pt idx="7">
+                  <c:v>46.66666666666666</c:v>
+                </c:pt>
+                <c:pt idx="8">
+                  <c:v>46.66666666666666</c:v>
+                </c:pt>
+                <c:pt idx="9">
+                  <c:v>5.0</c:v>
+                </c:pt>
+                <c:pt idx="10">
+                  <c:v>2.333333333333333</c:v>
+                </c:pt>
+                <c:pt idx="11">
+                  <c:v>2.0</c:v>
+                </c:pt>
+                <c:pt idx="12">
+                  <c:v>1.0</c:v>
+                </c:pt>
+                <c:pt idx="13">
+                  <c:v>0.666666666666667</c:v>
+                </c:pt>
+                <c:pt idx="14">
+                  <c:v>0.666666666666667</c:v>
+                </c:pt>
+                <c:pt idx="15">
+                  <c:v>0.0</c:v>
+                </c:pt>
+                <c:pt idx="16">
+                  <c:v>0.0</c:v>
+                </c:pt>
+                <c:pt idx="17">
+                  <c:v>0.0</c:v>
+                </c:pt>
+                <c:pt idx="18">
+                  <c:v>0.0</c:v>
+                </c:pt>
+                <c:pt idx="19">
+                  <c:v>0.0</c:v>
+                </c:pt>
+                <c:pt idx="20">
+                  <c:v>0.0</c:v>
+                </c:pt>
+                <c:pt idx="21">
+                  <c:v>0.0</c:v>
+                </c:pt>
+                <c:pt idx="22">
+                  <c:v>0.0</c:v>
+                </c:pt>
+                <c:pt idx="23">
+                  <c:v>0.0</c:v>
+                </c:pt>
+                <c:pt idx="24">
+                  <c:v>0.0</c:v>
+                </c:pt>
+                <c:pt idx="25">
+                  <c:v>0.0</c:v>
+                </c:pt>
+                <c:pt idx="26">
+                  <c:v>0.0</c:v>
+                </c:pt>
+                <c:pt idx="27">
+                  <c:v>0.0</c:v>
+                </c:pt>
+                <c:pt idx="28">
+                  <c:v>0.0</c:v>
+                </c:pt>
+                <c:pt idx="29">
+                  <c:v>0.0</c:v>
+                </c:pt>
+                <c:pt idx="30">
+                  <c:v>0.0</c:v>
+                </c:pt>
+                <c:pt idx="31">
+                  <c:v>0.0</c:v>
+                </c:pt>
+                <c:pt idx="32">
+                  <c:v>0.0</c:v>
+                </c:pt>
+                <c:pt idx="33">
+                  <c:v>0.0</c:v>
+                </c:pt>
+              </c:numCache>
+            </c:numRef>
+          </c:yVal>
+          <c:smooth val="1"/>
+        </c:ser>
+        <c:ser>
+          <c:idx val="1"/>
+          <c:order val="1"/>
+          <c:tx>
+            <c:v>With Immune System</c:v>
+          </c:tx>
+          <c:marker>
+            <c:symbol val="none"/>
+          </c:marker>
+          <c:xVal>
+            <c:numRef>
+              <c:f>'With Immune system'!$G$3:$G$36</c:f>
+              <c:numCache>
+                <c:formatCode>General</c:formatCode>
+                <c:ptCount val="34"/>
+                <c:pt idx="0">
+                  <c:v>1.0</c:v>
+                </c:pt>
+                <c:pt idx="1">
+                  <c:v>2.0</c:v>
+                </c:pt>
+                <c:pt idx="2">
+                  <c:v>3.0</c:v>
+                </c:pt>
+                <c:pt idx="3">
+                  <c:v>4.0</c:v>
+                </c:pt>
+                <c:pt idx="4">
+                  <c:v>5.0</c:v>
+                </c:pt>
+                <c:pt idx="5">
+                  <c:v>6.0</c:v>
+                </c:pt>
+                <c:pt idx="6">
+                  <c:v>7.0</c:v>
+                </c:pt>
+                <c:pt idx="7">
+                  <c:v>8.0</c:v>
+                </c:pt>
+                <c:pt idx="8">
+                  <c:v>9.0</c:v>
+                </c:pt>
+                <c:pt idx="9">
+                  <c:v>10.0</c:v>
+                </c:pt>
+                <c:pt idx="10">
+                  <c:v>11.0</c:v>
+                </c:pt>
+                <c:pt idx="11">
+                  <c:v>12.0</c:v>
+                </c:pt>
+                <c:pt idx="12">
+                  <c:v>13.0</c:v>
+                </c:pt>
+                <c:pt idx="13">
+                  <c:v>14.0</c:v>
+                </c:pt>
+                <c:pt idx="14">
+                  <c:v>15.0</c:v>
+                </c:pt>
+                <c:pt idx="15">
+                  <c:v>16.0</c:v>
+                </c:pt>
+                <c:pt idx="16">
+                  <c:v>17.0</c:v>
+                </c:pt>
+                <c:pt idx="17">
+                  <c:v>18.0</c:v>
+                </c:pt>
+                <c:pt idx="18">
+                  <c:v>19.0</c:v>
+                </c:pt>
+                <c:pt idx="19">
+                  <c:v>20.0</c:v>
+                </c:pt>
+                <c:pt idx="20">
+                  <c:v>21.0</c:v>
+                </c:pt>
+                <c:pt idx="21">
+                  <c:v>22.0</c:v>
+                </c:pt>
+                <c:pt idx="22">
+                  <c:v>23.0</c:v>
+                </c:pt>
+                <c:pt idx="23">
+                  <c:v>24.0</c:v>
+                </c:pt>
+                <c:pt idx="24">
+                  <c:v>25.0</c:v>
+                </c:pt>
+                <c:pt idx="25">
+                  <c:v>26.0</c:v>
+                </c:pt>
+                <c:pt idx="26">
+                  <c:v>27.0</c:v>
+                </c:pt>
+                <c:pt idx="27">
+                  <c:v>28.0</c:v>
+                </c:pt>
+                <c:pt idx="28">
+                  <c:v>29.0</c:v>
+                </c:pt>
+                <c:pt idx="29">
+                  <c:v>30.0</c:v>
+                </c:pt>
+                <c:pt idx="30">
+                  <c:v>31.0</c:v>
+                </c:pt>
+                <c:pt idx="31">
+                  <c:v>32.0</c:v>
+                </c:pt>
+                <c:pt idx="32">
+                  <c:v>33.0</c:v>
+                </c:pt>
+                <c:pt idx="33">
+                  <c:v>34.0</c:v>
+                </c:pt>
+              </c:numCache>
+            </c:numRef>
+          </c:xVal>
+          <c:yVal>
+            <c:numRef>
+              <c:f>'With Immune system'!$I$3:$I$36</c:f>
+              <c:numCache>
+                <c:formatCode>General</c:formatCode>
+                <c:ptCount val="34"/>
+                <c:pt idx="0">
+                  <c:v>100.0</c:v>
+                </c:pt>
+                <c:pt idx="1">
+                  <c:v>100.0</c:v>
+                </c:pt>
+                <c:pt idx="2">
+                  <c:v>99.0</c:v>
+                </c:pt>
+                <c:pt idx="3">
+                  <c:v>98.0</c:v>
+                </c:pt>
+                <c:pt idx="4">
+                  <c:v>96.0</c:v>
+                </c:pt>
+                <c:pt idx="5">
+                  <c:v>95.0</c:v>
+                </c:pt>
+                <c:pt idx="6">
+                  <c:v>92.0</c:v>
+                </c:pt>
+                <c:pt idx="7">
+                  <c:v>90.0</c:v>
+                </c:pt>
+                <c:pt idx="8">
+                  <c:v>87.0</c:v>
+                </c:pt>
+                <c:pt idx="9">
+                  <c:v>85.0</c:v>
+                </c:pt>
+                <c:pt idx="10">
+                  <c:v>82.0</c:v>
+                </c:pt>
+                <c:pt idx="11">
+                  <c:v>80.0</c:v>
+                </c:pt>
+                <c:pt idx="12">
+                  <c:v>74.0</c:v>
+                </c:pt>
+                <c:pt idx="13">
+                  <c:v>73.0</c:v>
+                </c:pt>
+                <c:pt idx="14">
+                  <c:v>61.0</c:v>
+                </c:pt>
+                <c:pt idx="15">
+                  <c:v>59.0</c:v>
+                </c:pt>
+                <c:pt idx="16">
+                  <c:v>54.0</c:v>
+                </c:pt>
+                <c:pt idx="17">
+                  <c:v>43.0</c:v>
+                </c:pt>
+                <c:pt idx="18">
+                  <c:v>29.0</c:v>
+                </c:pt>
+                <c:pt idx="19">
+                  <c:v>22.0</c:v>
+                </c:pt>
+                <c:pt idx="20">
+                  <c:v>18.0</c:v>
+                </c:pt>
+                <c:pt idx="21">
+                  <c:v>16.0</c:v>
+                </c:pt>
+                <c:pt idx="22">
+                  <c:v>8.0</c:v>
+                </c:pt>
+                <c:pt idx="23">
+                  <c:v>7.0</c:v>
+                </c:pt>
+                <c:pt idx="24">
+                  <c:v>4.0</c:v>
+                </c:pt>
+                <c:pt idx="25">
+                  <c:v>4.0</c:v>
+                </c:pt>
+                <c:pt idx="26">
+                  <c:v>3.0</c:v>
+                </c:pt>
+                <c:pt idx="27">
+                  <c:v>3.0</c:v>
+                </c:pt>
+                <c:pt idx="28">
+                  <c:v>2.0</c:v>
+                </c:pt>
+                <c:pt idx="29">
+                  <c:v>1.0</c:v>
+                </c:pt>
+                <c:pt idx="30">
+                  <c:v>1.0</c:v>
+                </c:pt>
+                <c:pt idx="31">
+                  <c:v>1.0</c:v>
+                </c:pt>
+                <c:pt idx="32">
+                  <c:v>1.0</c:v>
+                </c:pt>
+                <c:pt idx="33">
+                  <c:v>1.0</c:v>
+                </c:pt>
+              </c:numCache>
+            </c:numRef>
+          </c:yVal>
+          <c:smooth val="1"/>
+        </c:ser>
+        <c:dLbls>
+          <c:showLegendKey val="0"/>
+          <c:showVal val="0"/>
+          <c:showCatName val="0"/>
+          <c:showSerName val="0"/>
+          <c:showPercent val="0"/>
+          <c:showBubbleSize val="0"/>
+        </c:dLbls>
+        <c:axId val="-2131651048"/>
+        <c:axId val="-2131696584"/>
+      </c:scatterChart>
+      <c:valAx>
+        <c:axId val="-2131651048"/>
+        <c:scaling>
+          <c:orientation val="minMax"/>
+        </c:scaling>
+        <c:delete val="0"/>
+        <c:axPos val="b"/>
+        <c:title>
+          <c:tx>
+            <c:rich>
+              <a:bodyPr/>
+              <a:lstStyle/>
+              <a:p>
+                <a:pPr>
+                  <a:defRPr/>
+                </a:pPr>
+                <a:r>
+                  <a:rPr lang="en-US"/>
+                  <a:t>Time(seconds)</a:t>
+                </a:r>
+              </a:p>
+            </c:rich>
+          </c:tx>
+          <c:layout/>
+          <c:overlay val="0"/>
+        </c:title>
+        <c:numFmt formatCode="General" sourceLinked="1"/>
+        <c:majorTickMark val="out"/>
+        <c:minorTickMark val="none"/>
+        <c:tickLblPos val="nextTo"/>
+        <c:txPr>
+          <a:bodyPr rot="0" vert="horz"/>
+          <a:lstStyle/>
+          <a:p>
+            <a:pPr>
+              <a:defRPr sz="1000" b="0" i="0" u="none" strike="noStrike" baseline="0">
+                <a:solidFill>
+                  <a:srgbClr val="000000"/>
+                </a:solidFill>
+                <a:latin typeface="Calibri"/>
+                <a:ea typeface="Calibri"/>
+                <a:cs typeface="Calibri"/>
+              </a:defRPr>
+            </a:pPr>
+            <a:endParaRPr lang="en-US"/>
+          </a:p>
+        </c:txPr>
+        <c:crossAx val="-2131696584"/>
+        <c:crosses val="autoZero"/>
+        <c:crossBetween val="midCat"/>
+      </c:valAx>
+      <c:valAx>
+        <c:axId val="-2131696584"/>
+        <c:scaling>
+          <c:orientation val="minMax"/>
+          <c:min val="0.0"/>
+        </c:scaling>
+        <c:delete val="0"/>
+        <c:axPos val="l"/>
+        <c:majorGridlines/>
+        <c:title>
+          <c:tx>
+            <c:rich>
+              <a:bodyPr rot="-5400000" vert="horz"/>
+              <a:lstStyle/>
+              <a:p>
+                <a:pPr>
+                  <a:defRPr/>
+                </a:pPr>
+                <a:r>
+                  <a:rPr lang="en-US"/>
+                  <a:t>Number</a:t>
+                </a:r>
+                <a:r>
+                  <a:rPr lang="en-US" baseline="0"/>
+                  <a:t> of Viruses</a:t>
+                </a:r>
+                <a:endParaRPr lang="en-US"/>
+              </a:p>
+            </c:rich>
+          </c:tx>
+          <c:layout/>
+          <c:overlay val="0"/>
+        </c:title>
+        <c:numFmt formatCode="0.00" sourceLinked="1"/>
+        <c:majorTickMark val="out"/>
+        <c:minorTickMark val="none"/>
+        <c:tickLblPos val="nextTo"/>
+        <c:crossAx val="-2131651048"/>
+        <c:crosses val="autoZero"/>
+        <c:crossBetween val="midCat"/>
+      </c:valAx>
+    </c:plotArea>
+    <c:legend>
+      <c:legendPos val="r"/>
+      <c:layout/>
+      <c:overlay val="0"/>
+    </c:legend>
+    <c:plotVisOnly val="1"/>
+    <c:dispBlanksAs val="gap"/>
+    <c:showDLblsOverMax val="0"/>
+  </c:chart>
+  <c:externalData r:id="rId1">
+    <c:autoUpdate val="0"/>
+  </c:externalData>
+</c:chartSpace>
+</file>
+
+<file path=ppt/charts/chart5.xml><?xml version="1.0" encoding="utf-8"?>
+<c:chartSpace xmlns:c="http://schemas.openxmlformats.org/drawingml/2006/chart" xmlns:a="http://schemas.openxmlformats.org/drawingml/2006/main" xmlns:r="http://schemas.openxmlformats.org/officeDocument/2006/relationships">
+  <c:date1904 val="0"/>
+  <c:lang val="en-US"/>
+  <c:roundedCorners val="0"/>
+  <mc:AlternateContent xmlns:mc="http://schemas.openxmlformats.org/markup-compatibility/2006">
+    <mc:Choice xmlns:c14="http://schemas.microsoft.com/office/drawing/2007/8/2/chart" Requires="c14">
+      <c14:style val="118"/>
+    </mc:Choice>
+    <mc:Fallback>
+      <c:style val="18"/>
+    </mc:Fallback>
+  </mc:AlternateContent>
+  <c:chart>
+    <c:title>
+      <c:tx>
+        <c:rich>
+          <a:bodyPr/>
+          <a:lstStyle/>
+          <a:p>
+            <a:pPr>
+              <a:defRPr/>
+            </a:pPr>
+            <a:r>
+              <a:rPr lang="en-US"/>
+              <a:t>Virus</a:t>
+            </a:r>
+            <a:r>
+              <a:rPr lang="en-US" baseline="0"/>
+              <a:t> Reproduction</a:t>
+            </a:r>
+            <a:endParaRPr lang="en-US"/>
+          </a:p>
+        </c:rich>
+      </c:tx>
+      <c:layout/>
+      <c:overlay val="0"/>
+    </c:title>
+    <c:autoTitleDeleted val="0"/>
+    <c:plotArea>
+      <c:layout/>
+      <c:scatterChart>
+        <c:scatterStyle val="smoothMarker"/>
+        <c:varyColors val="0"/>
+        <c:ser>
+          <c:idx val="0"/>
+          <c:order val="0"/>
+          <c:tx>
+            <c:v>Without the Immune System</c:v>
+          </c:tx>
+          <c:marker>
+            <c:symbol val="none"/>
+          </c:marker>
+          <c:xVal>
+            <c:numRef>
+              <c:f>'With Immune system'!$A$37:$A$70</c:f>
+              <c:numCache>
+                <c:formatCode>General</c:formatCode>
+                <c:ptCount val="34"/>
+                <c:pt idx="0">
+                  <c:v>1.0</c:v>
+                </c:pt>
+                <c:pt idx="1">
+                  <c:v>2.0</c:v>
+                </c:pt>
+                <c:pt idx="2">
+                  <c:v>3.0</c:v>
+                </c:pt>
+                <c:pt idx="3">
+                  <c:v>4.0</c:v>
+                </c:pt>
+                <c:pt idx="4">
+                  <c:v>5.0</c:v>
+                </c:pt>
+                <c:pt idx="5">
+                  <c:v>6.0</c:v>
+                </c:pt>
+                <c:pt idx="6">
+                  <c:v>7.0</c:v>
+                </c:pt>
+                <c:pt idx="7">
+                  <c:v>8.0</c:v>
+                </c:pt>
+                <c:pt idx="8">
+                  <c:v>9.0</c:v>
+                </c:pt>
+                <c:pt idx="9">
+                  <c:v>10.0</c:v>
+                </c:pt>
+                <c:pt idx="10">
+                  <c:v>11.0</c:v>
+                </c:pt>
+                <c:pt idx="11">
+                  <c:v>12.0</c:v>
+                </c:pt>
+                <c:pt idx="12">
+                  <c:v>13.0</c:v>
+                </c:pt>
+                <c:pt idx="13">
+                  <c:v>14.0</c:v>
+                </c:pt>
+                <c:pt idx="14">
+                  <c:v>15.0</c:v>
+                </c:pt>
+                <c:pt idx="15">
+                  <c:v>16.0</c:v>
+                </c:pt>
+                <c:pt idx="16">
+                  <c:v>17.0</c:v>
+                </c:pt>
+                <c:pt idx="17">
+                  <c:v>18.0</c:v>
+                </c:pt>
+                <c:pt idx="18">
+                  <c:v>19.0</c:v>
+                </c:pt>
+                <c:pt idx="19">
+                  <c:v>20.0</c:v>
+                </c:pt>
+                <c:pt idx="20">
+                  <c:v>21.0</c:v>
+                </c:pt>
+                <c:pt idx="21">
+                  <c:v>22.0</c:v>
+                </c:pt>
+                <c:pt idx="22">
+                  <c:v>23.0</c:v>
+                </c:pt>
+                <c:pt idx="23">
+                  <c:v>24.0</c:v>
+                </c:pt>
+                <c:pt idx="24">
+                  <c:v>25.0</c:v>
+                </c:pt>
+                <c:pt idx="25">
+                  <c:v>26.0</c:v>
+                </c:pt>
+                <c:pt idx="26">
+                  <c:v>27.0</c:v>
+                </c:pt>
+                <c:pt idx="27">
+                  <c:v>28.0</c:v>
+                </c:pt>
+                <c:pt idx="28">
+                  <c:v>29.0</c:v>
+                </c:pt>
+                <c:pt idx="29">
+                  <c:v>30.0</c:v>
+                </c:pt>
+                <c:pt idx="30">
+                  <c:v>31.0</c:v>
+                </c:pt>
+                <c:pt idx="31">
+                  <c:v>32.0</c:v>
+                </c:pt>
+                <c:pt idx="32">
+                  <c:v>33.0</c:v>
+                </c:pt>
+                <c:pt idx="33">
+                  <c:v>34.0</c:v>
+                </c:pt>
+              </c:numCache>
+            </c:numRef>
+          </c:xVal>
+          <c:yVal>
+            <c:numRef>
+              <c:f>'With Immune system'!$B$37:$B$70</c:f>
+              <c:numCache>
+                <c:formatCode>General</c:formatCode>
+                <c:ptCount val="34"/>
+                <c:pt idx="0">
+                  <c:v>1.0</c:v>
+                </c:pt>
+                <c:pt idx="1">
+                  <c:v>1.0</c:v>
+                </c:pt>
+                <c:pt idx="2">
+                  <c:v>1.0</c:v>
+                </c:pt>
+                <c:pt idx="3">
+                  <c:v>850.0</c:v>
+                </c:pt>
+                <c:pt idx="4">
+                  <c:v>849.0</c:v>
+                </c:pt>
+                <c:pt idx="5">
+                  <c:v>848.0</c:v>
+                </c:pt>
+                <c:pt idx="6">
+                  <c:v>848.0</c:v>
+                </c:pt>
+                <c:pt idx="7">
+                  <c:v>848.0</c:v>
+                </c:pt>
+                <c:pt idx="8">
+                  <c:v>1828.0</c:v>
+                </c:pt>
+                <c:pt idx="9">
+                  <c:v>1928.0</c:v>
+                </c:pt>
+                <c:pt idx="10">
+                  <c:v>1928.0</c:v>
+                </c:pt>
+                <c:pt idx="11">
+                  <c:v>1948.0</c:v>
+                </c:pt>
+                <c:pt idx="12">
+                  <c:v>1948.0</c:v>
+                </c:pt>
+                <c:pt idx="13">
+                  <c:v>1948.0</c:v>
+                </c:pt>
+                <c:pt idx="14">
+                  <c:v>1948.0</c:v>
+                </c:pt>
+                <c:pt idx="15">
+                  <c:v>1948.0</c:v>
+                </c:pt>
+                <c:pt idx="16">
+                  <c:v>1948.0</c:v>
+                </c:pt>
+                <c:pt idx="17">
+                  <c:v>1948.0</c:v>
+                </c:pt>
+                <c:pt idx="18">
+                  <c:v>1948.0</c:v>
+                </c:pt>
+                <c:pt idx="19">
+                  <c:v>1948.0</c:v>
+                </c:pt>
+                <c:pt idx="20">
+                  <c:v>1948.0</c:v>
+                </c:pt>
+                <c:pt idx="21">
+                  <c:v>1948.0</c:v>
+                </c:pt>
+                <c:pt idx="22">
+                  <c:v>1948.0</c:v>
+                </c:pt>
+                <c:pt idx="23">
+                  <c:v>1948.0</c:v>
+                </c:pt>
+                <c:pt idx="24">
+                  <c:v>1948.0</c:v>
+                </c:pt>
+                <c:pt idx="25">
+                  <c:v>1948.0</c:v>
+                </c:pt>
+                <c:pt idx="26">
+                  <c:v>1948.0</c:v>
+                </c:pt>
+                <c:pt idx="27">
+                  <c:v>1948.0</c:v>
+                </c:pt>
+                <c:pt idx="28">
+                  <c:v>1948.0</c:v>
+                </c:pt>
+                <c:pt idx="29">
+                  <c:v>1948.0</c:v>
+                </c:pt>
+                <c:pt idx="30">
+                  <c:v>1948.0</c:v>
+                </c:pt>
+                <c:pt idx="31">
+                  <c:v>1948.0</c:v>
+                </c:pt>
+                <c:pt idx="32">
+                  <c:v>1948.0</c:v>
+                </c:pt>
+                <c:pt idx="33">
+                  <c:v>1948.0</c:v>
+                </c:pt>
+              </c:numCache>
+            </c:numRef>
+          </c:yVal>
+          <c:smooth val="1"/>
+        </c:ser>
+        <c:ser>
+          <c:idx val="1"/>
+          <c:order val="1"/>
+          <c:tx>
+            <c:v>With the Immune System</c:v>
+          </c:tx>
+          <c:marker>
+            <c:symbol val="none"/>
+          </c:marker>
+          <c:xVal>
+            <c:numRef>
+              <c:f>'With Immune system'!$A$37:$A$70</c:f>
+              <c:numCache>
+                <c:formatCode>General</c:formatCode>
+                <c:ptCount val="34"/>
+                <c:pt idx="0">
+                  <c:v>1.0</c:v>
+                </c:pt>
+                <c:pt idx="1">
+                  <c:v>2.0</c:v>
+                </c:pt>
+                <c:pt idx="2">
+                  <c:v>3.0</c:v>
+                </c:pt>
+                <c:pt idx="3">
+                  <c:v>4.0</c:v>
+                </c:pt>
+                <c:pt idx="4">
+                  <c:v>5.0</c:v>
+                </c:pt>
+                <c:pt idx="5">
+                  <c:v>6.0</c:v>
+                </c:pt>
+                <c:pt idx="6">
+                  <c:v>7.0</c:v>
+                </c:pt>
+                <c:pt idx="7">
+                  <c:v>8.0</c:v>
+                </c:pt>
+                <c:pt idx="8">
+                  <c:v>9.0</c:v>
+                </c:pt>
+                <c:pt idx="9">
+                  <c:v>10.0</c:v>
+                </c:pt>
+                <c:pt idx="10">
+                  <c:v>11.0</c:v>
+                </c:pt>
+                <c:pt idx="11">
+                  <c:v>12.0</c:v>
+                </c:pt>
+                <c:pt idx="12">
+                  <c:v>13.0</c:v>
+                </c:pt>
+                <c:pt idx="13">
+                  <c:v>14.0</c:v>
+                </c:pt>
+                <c:pt idx="14">
+                  <c:v>15.0</c:v>
+                </c:pt>
+                <c:pt idx="15">
+                  <c:v>16.0</c:v>
+                </c:pt>
+                <c:pt idx="16">
+                  <c:v>17.0</c:v>
+                </c:pt>
+                <c:pt idx="17">
+                  <c:v>18.0</c:v>
+                </c:pt>
+                <c:pt idx="18">
+                  <c:v>19.0</c:v>
+                </c:pt>
+                <c:pt idx="19">
+                  <c:v>20.0</c:v>
+                </c:pt>
+                <c:pt idx="20">
+                  <c:v>21.0</c:v>
+                </c:pt>
+                <c:pt idx="21">
+                  <c:v>22.0</c:v>
+                </c:pt>
+                <c:pt idx="22">
+                  <c:v>23.0</c:v>
+                </c:pt>
+                <c:pt idx="23">
+                  <c:v>24.0</c:v>
+                </c:pt>
+                <c:pt idx="24">
+                  <c:v>25.0</c:v>
+                </c:pt>
+                <c:pt idx="25">
+                  <c:v>26.0</c:v>
+                </c:pt>
+                <c:pt idx="26">
+                  <c:v>27.0</c:v>
+                </c:pt>
+                <c:pt idx="27">
+                  <c:v>28.0</c:v>
+                </c:pt>
+                <c:pt idx="28">
+                  <c:v>29.0</c:v>
+                </c:pt>
+                <c:pt idx="29">
+                  <c:v>30.0</c:v>
+                </c:pt>
+                <c:pt idx="30">
+                  <c:v>31.0</c:v>
+                </c:pt>
+                <c:pt idx="31">
+                  <c:v>32.0</c:v>
+                </c:pt>
+                <c:pt idx="32">
+                  <c:v>33.0</c:v>
+                </c:pt>
+                <c:pt idx="33">
+                  <c:v>34.0</c:v>
+                </c:pt>
+              </c:numCache>
+            </c:numRef>
+          </c:xVal>
+          <c:yVal>
+            <c:numRef>
+              <c:f>'With Immune system'!$C$37:$C$70</c:f>
+              <c:numCache>
+                <c:formatCode>General</c:formatCode>
+                <c:ptCount val="34"/>
+                <c:pt idx="0">
+                  <c:v>1.0</c:v>
+                </c:pt>
+                <c:pt idx="1">
+                  <c:v>1.0</c:v>
+                </c:pt>
+                <c:pt idx="2">
+                  <c:v>1.0</c:v>
+                </c:pt>
+                <c:pt idx="3">
+                  <c:v>17.0</c:v>
+                </c:pt>
+                <c:pt idx="4">
+                  <c:v>6.0</c:v>
+                </c:pt>
+                <c:pt idx="5">
+                  <c:v>1.0</c:v>
+                </c:pt>
+                <c:pt idx="6">
+                  <c:v>1.0</c:v>
+                </c:pt>
+                <c:pt idx="7">
+                  <c:v>1.0</c:v>
+                </c:pt>
+                <c:pt idx="8">
+                  <c:v>59.0</c:v>
+                </c:pt>
+                <c:pt idx="9">
+                  <c:v>53.0</c:v>
+                </c:pt>
+                <c:pt idx="10">
+                  <c:v>103.0</c:v>
+                </c:pt>
+                <c:pt idx="11">
+                  <c:v>25.0</c:v>
+                </c:pt>
+                <c:pt idx="12">
+                  <c:v>59.0</c:v>
+                </c:pt>
+                <c:pt idx="13">
+                  <c:v>20.0</c:v>
+                </c:pt>
+                <c:pt idx="14">
+                  <c:v>202.0</c:v>
+                </c:pt>
+                <c:pt idx="15">
+                  <c:v>66.0</c:v>
+                </c:pt>
+                <c:pt idx="16">
+                  <c:v>58.0</c:v>
+                </c:pt>
+                <c:pt idx="17">
+                  <c:v>182.0</c:v>
+                </c:pt>
+                <c:pt idx="18">
+                  <c:v>325.0</c:v>
+                </c:pt>
+                <c:pt idx="19">
+                  <c:v>357.0</c:v>
+                </c:pt>
+                <c:pt idx="20">
+                  <c:v>337.0</c:v>
+                </c:pt>
+                <c:pt idx="21">
+                  <c:v>249.0</c:v>
+                </c:pt>
+                <c:pt idx="22">
+                  <c:v>328.0</c:v>
+                </c:pt>
+                <c:pt idx="23">
+                  <c:v>197.0</c:v>
+                </c:pt>
+                <c:pt idx="24">
+                  <c:v>122.0</c:v>
+                </c:pt>
+                <c:pt idx="25">
+                  <c:v>55.0</c:v>
+                </c:pt>
+                <c:pt idx="26">
+                  <c:v>33.0</c:v>
+                </c:pt>
+                <c:pt idx="27">
+                  <c:v>17.0</c:v>
+                </c:pt>
+                <c:pt idx="28">
+                  <c:v>26.0</c:v>
+                </c:pt>
+                <c:pt idx="29">
+                  <c:v>27.0</c:v>
+                </c:pt>
+                <c:pt idx="30">
+                  <c:v>10.0</c:v>
+                </c:pt>
+                <c:pt idx="31">
+                  <c:v>2.0</c:v>
+                </c:pt>
+                <c:pt idx="32">
+                  <c:v>1.0</c:v>
+                </c:pt>
+                <c:pt idx="33">
+                  <c:v>1.0</c:v>
+                </c:pt>
+              </c:numCache>
+            </c:numRef>
+          </c:yVal>
+          <c:smooth val="1"/>
+        </c:ser>
+        <c:dLbls>
+          <c:showLegendKey val="0"/>
+          <c:showVal val="0"/>
+          <c:showCatName val="0"/>
+          <c:showSerName val="0"/>
+          <c:showPercent val="0"/>
+          <c:showBubbleSize val="0"/>
+        </c:dLbls>
+        <c:axId val="-2121099640"/>
+        <c:axId val="-2122451672"/>
+      </c:scatterChart>
+      <c:valAx>
+        <c:axId val="-2121099640"/>
+        <c:scaling>
+          <c:orientation val="minMax"/>
+        </c:scaling>
+        <c:delete val="0"/>
+        <c:axPos val="b"/>
+        <c:title>
+          <c:tx>
+            <c:rich>
+              <a:bodyPr/>
+              <a:lstStyle/>
+              <a:p>
+                <a:pPr>
+                  <a:defRPr/>
+                </a:pPr>
+                <a:r>
+                  <a:rPr lang="en-US"/>
+                  <a:t>Time(seconds)</a:t>
+                </a:r>
+              </a:p>
+            </c:rich>
+          </c:tx>
+          <c:layout/>
+          <c:overlay val="0"/>
+        </c:title>
+        <c:numFmt formatCode="General" sourceLinked="1"/>
+        <c:majorTickMark val="out"/>
+        <c:minorTickMark val="none"/>
+        <c:tickLblPos val="nextTo"/>
+        <c:txPr>
+          <a:bodyPr rot="0" vert="horz"/>
+          <a:lstStyle/>
+          <a:p>
+            <a:pPr>
+              <a:defRPr sz="1000" b="0" i="0" u="none" strike="noStrike" baseline="0">
+                <a:solidFill>
+                  <a:srgbClr val="000000"/>
+                </a:solidFill>
+                <a:latin typeface="Calibri"/>
+                <a:ea typeface="Calibri"/>
+                <a:cs typeface="Calibri"/>
+              </a:defRPr>
+            </a:pPr>
+            <a:endParaRPr lang="en-US"/>
+          </a:p>
+        </c:txPr>
+        <c:crossAx val="-2122451672"/>
+        <c:crosses val="autoZero"/>
+        <c:crossBetween val="midCat"/>
+      </c:valAx>
+      <c:valAx>
+        <c:axId val="-2122451672"/>
+        <c:scaling>
+          <c:orientation val="minMax"/>
+        </c:scaling>
+        <c:delete val="0"/>
+        <c:axPos val="l"/>
+        <c:majorGridlines/>
+        <c:title>
+          <c:tx>
+            <c:rich>
+              <a:bodyPr rot="-5400000" vert="horz"/>
+              <a:lstStyle/>
+              <a:p>
+                <a:pPr>
+                  <a:defRPr/>
+                </a:pPr>
+                <a:r>
+                  <a:rPr lang="en-US"/>
+                  <a:t> Number</a:t>
+                </a:r>
+                <a:r>
+                  <a:rPr lang="en-US" baseline="0"/>
+                  <a:t> of Viruses</a:t>
+                </a:r>
+                <a:endParaRPr lang="en-US"/>
+              </a:p>
+            </c:rich>
+          </c:tx>
+          <c:layout/>
+          <c:overlay val="0"/>
+        </c:title>
+        <c:numFmt formatCode="General" sourceLinked="1"/>
+        <c:majorTickMark val="out"/>
+        <c:minorTickMark val="none"/>
+        <c:tickLblPos val="nextTo"/>
+        <c:crossAx val="-2121099640"/>
+        <c:crosses val="autoZero"/>
+        <c:crossBetween val="midCat"/>
+      </c:valAx>
+    </c:plotArea>
+    <c:legend>
+      <c:legendPos val="r"/>
+      <c:layout/>
+      <c:overlay val="0"/>
+    </c:legend>
+    <c:plotVisOnly val="1"/>
+    <c:dispBlanksAs val="gap"/>
+    <c:showDLblsOverMax val="0"/>
+  </c:chart>
+  <c:externalData r:id="rId1">
+    <c:autoUpdate val="0"/>
+  </c:externalData>
+</c:chartSpace>
+</file>
+
+<file path=ppt/charts/chart6.xml><?xml version="1.0" encoding="utf-8"?>
+<c:chartSpace xmlns:c="http://schemas.openxmlformats.org/drawingml/2006/chart" xmlns:a="http://schemas.openxmlformats.org/drawingml/2006/main" xmlns:r="http://schemas.openxmlformats.org/officeDocument/2006/relationships">
+  <c:date1904 val="0"/>
+  <c:lang val="en-US"/>
+  <c:roundedCorners val="0"/>
+  <mc:AlternateContent xmlns:mc="http://schemas.openxmlformats.org/markup-compatibility/2006">
+    <mc:Choice xmlns:c14="http://schemas.microsoft.com/office/drawing/2007/8/2/chart" Requires="c14">
+      <c14:style val="118"/>
+    </mc:Choice>
+    <mc:Fallback>
+      <c:style val="18"/>
+    </mc:Fallback>
+  </mc:AlternateContent>
+  <c:chart>
+    <c:title>
+      <c:tx>
+        <c:rich>
+          <a:bodyPr/>
+          <a:lstStyle/>
+          <a:p>
+            <a:pPr>
+              <a:defRPr/>
+            </a:pPr>
+            <a:r>
+              <a:rPr lang="en-US"/>
+              <a:t>Number</a:t>
+            </a:r>
+            <a:r>
+              <a:rPr lang="en-US" baseline="0"/>
+              <a:t> of Body Cells Dying With Bacteria </a:t>
+            </a:r>
+            <a:endParaRPr lang="en-US"/>
+          </a:p>
+        </c:rich>
+      </c:tx>
+      <c:layout>
+        <c:manualLayout>
+          <c:xMode val="edge"/>
+          <c:yMode val="edge"/>
+          <c:x val="0.13794750656168"/>
+          <c:y val="0.0416666666666667"/>
+        </c:manualLayout>
+      </c:layout>
+      <c:overlay val="0"/>
+    </c:title>
+    <c:autoTitleDeleted val="0"/>
+    <c:plotArea>
+      <c:layout/>
+      <c:scatterChart>
+        <c:scatterStyle val="smoothMarker"/>
+        <c:varyColors val="0"/>
+        <c:ser>
+          <c:idx val="0"/>
+          <c:order val="0"/>
+          <c:tx>
+            <c:v>Body Cells Dying</c:v>
+          </c:tx>
+          <c:marker>
+            <c:symbol val="none"/>
+          </c:marker>
+          <c:xVal>
+            <c:numRef>
+              <c:f>Sheet1!$A$1:$A$29</c:f>
+              <c:numCache>
+                <c:formatCode>General</c:formatCode>
+                <c:ptCount val="29"/>
+                <c:pt idx="0">
+                  <c:v>1.0</c:v>
+                </c:pt>
+                <c:pt idx="1">
+                  <c:v>2.0</c:v>
+                </c:pt>
+                <c:pt idx="2">
+                  <c:v>3.0</c:v>
+                </c:pt>
+                <c:pt idx="3">
+                  <c:v>4.0</c:v>
+                </c:pt>
+                <c:pt idx="4">
+                  <c:v>5.0</c:v>
+                </c:pt>
+                <c:pt idx="5">
+                  <c:v>6.0</c:v>
+                </c:pt>
+                <c:pt idx="6">
+                  <c:v>7.0</c:v>
+                </c:pt>
+                <c:pt idx="7">
+                  <c:v>8.0</c:v>
+                </c:pt>
+                <c:pt idx="8">
+                  <c:v>9.0</c:v>
+                </c:pt>
+                <c:pt idx="9">
+                  <c:v>10.0</c:v>
+                </c:pt>
+                <c:pt idx="10">
+                  <c:v>11.0</c:v>
+                </c:pt>
+                <c:pt idx="11">
+                  <c:v>12.0</c:v>
+                </c:pt>
+                <c:pt idx="12">
+                  <c:v>13.0</c:v>
+                </c:pt>
+                <c:pt idx="13">
+                  <c:v>14.0</c:v>
+                </c:pt>
+                <c:pt idx="14">
+                  <c:v>15.0</c:v>
+                </c:pt>
+                <c:pt idx="15">
+                  <c:v>16.0</c:v>
+                </c:pt>
+                <c:pt idx="16">
+                  <c:v>17.0</c:v>
+                </c:pt>
+                <c:pt idx="17">
+                  <c:v>18.0</c:v>
+                </c:pt>
+                <c:pt idx="18">
+                  <c:v>19.0</c:v>
+                </c:pt>
+                <c:pt idx="19">
+                  <c:v>20.0</c:v>
+                </c:pt>
+                <c:pt idx="20">
+                  <c:v>21.0</c:v>
+                </c:pt>
+                <c:pt idx="21">
+                  <c:v>22.0</c:v>
+                </c:pt>
+                <c:pt idx="22">
+                  <c:v>23.0</c:v>
+                </c:pt>
+                <c:pt idx="23">
+                  <c:v>24.0</c:v>
+                </c:pt>
+                <c:pt idx="24">
+                  <c:v>25.0</c:v>
+                </c:pt>
+                <c:pt idx="25">
+                  <c:v>26.0</c:v>
+                </c:pt>
+                <c:pt idx="26">
+                  <c:v>27.0</c:v>
+                </c:pt>
+                <c:pt idx="27">
+                  <c:v>28.0</c:v>
+                </c:pt>
+                <c:pt idx="28">
+                  <c:v>29.0</c:v>
+                </c:pt>
+              </c:numCache>
+            </c:numRef>
+          </c:xVal>
+          <c:yVal>
+            <c:numRef>
+              <c:f>Sheet1!$B$1:$B$29</c:f>
+              <c:numCache>
+                <c:formatCode>General</c:formatCode>
+                <c:ptCount val="29"/>
+                <c:pt idx="0">
+                  <c:v>10.0</c:v>
+                </c:pt>
+                <c:pt idx="1">
+                  <c:v>10.0</c:v>
+                </c:pt>
+                <c:pt idx="2">
+                  <c:v>10.0</c:v>
+                </c:pt>
+                <c:pt idx="3">
+                  <c:v>10.0</c:v>
+                </c:pt>
+                <c:pt idx="4">
+                  <c:v>9.0</c:v>
+                </c:pt>
+                <c:pt idx="5">
+                  <c:v>9.0</c:v>
+                </c:pt>
+                <c:pt idx="6">
+                  <c:v>9.0</c:v>
+                </c:pt>
+                <c:pt idx="7">
+                  <c:v>9.0</c:v>
+                </c:pt>
+                <c:pt idx="8">
+                  <c:v>9.0</c:v>
+                </c:pt>
+                <c:pt idx="9">
+                  <c:v>9.0</c:v>
+                </c:pt>
+                <c:pt idx="10">
+                  <c:v>8.0</c:v>
+                </c:pt>
+                <c:pt idx="11">
+                  <c:v>8.0</c:v>
+                </c:pt>
+                <c:pt idx="12">
+                  <c:v>6.0</c:v>
+                </c:pt>
+                <c:pt idx="13">
+                  <c:v>5.0</c:v>
+                </c:pt>
+                <c:pt idx="14">
+                  <c:v>5.0</c:v>
+                </c:pt>
+                <c:pt idx="15">
+                  <c:v>4.0</c:v>
+                </c:pt>
+                <c:pt idx="16">
+                  <c:v>4.0</c:v>
+                </c:pt>
+                <c:pt idx="17">
+                  <c:v>2.0</c:v>
+                </c:pt>
+                <c:pt idx="18">
+                  <c:v>2.0</c:v>
+                </c:pt>
+                <c:pt idx="19">
+                  <c:v>2.0</c:v>
+                </c:pt>
+                <c:pt idx="20">
+                  <c:v>2.0</c:v>
+                </c:pt>
+                <c:pt idx="21">
+                  <c:v>2.0</c:v>
+                </c:pt>
+                <c:pt idx="22">
+                  <c:v>2.0</c:v>
+                </c:pt>
+                <c:pt idx="23">
+                  <c:v>1.0</c:v>
+                </c:pt>
+                <c:pt idx="24">
+                  <c:v>1.0</c:v>
+                </c:pt>
+                <c:pt idx="25">
+                  <c:v>1.0</c:v>
+                </c:pt>
+                <c:pt idx="26">
+                  <c:v>1.0</c:v>
+                </c:pt>
+                <c:pt idx="27">
+                  <c:v>1.0</c:v>
+                </c:pt>
+                <c:pt idx="28">
+                  <c:v>0.0</c:v>
+                </c:pt>
+              </c:numCache>
+            </c:numRef>
+          </c:yVal>
+          <c:smooth val="1"/>
+        </c:ser>
+        <c:dLbls>
+          <c:showLegendKey val="0"/>
+          <c:showVal val="0"/>
+          <c:showCatName val="0"/>
+          <c:showSerName val="0"/>
+          <c:showPercent val="0"/>
+          <c:showBubbleSize val="0"/>
+        </c:dLbls>
+        <c:axId val="-2130698088"/>
+        <c:axId val="-2120166440"/>
+      </c:scatterChart>
+      <c:valAx>
+        <c:axId val="-2130698088"/>
+        <c:scaling>
+          <c:orientation val="minMax"/>
+        </c:scaling>
+        <c:delete val="0"/>
+        <c:axPos val="b"/>
+        <c:numFmt formatCode="General" sourceLinked="1"/>
+        <c:majorTickMark val="out"/>
+        <c:minorTickMark val="none"/>
+        <c:tickLblPos val="nextTo"/>
+        <c:txPr>
+          <a:bodyPr rot="0" vert="horz"/>
+          <a:lstStyle/>
+          <a:p>
+            <a:pPr>
+              <a:defRPr sz="1000" b="0" i="0" u="none" strike="noStrike" baseline="0">
+                <a:solidFill>
+                  <a:srgbClr val="000000"/>
+                </a:solidFill>
+                <a:latin typeface="Calibri"/>
+                <a:ea typeface="Calibri"/>
+                <a:cs typeface="Calibri"/>
+              </a:defRPr>
+            </a:pPr>
+            <a:endParaRPr lang="en-US"/>
+          </a:p>
+        </c:txPr>
+        <c:crossAx val="-2120166440"/>
+        <c:crosses val="autoZero"/>
+        <c:crossBetween val="midCat"/>
+      </c:valAx>
+      <c:valAx>
+        <c:axId val="-2120166440"/>
+        <c:scaling>
+          <c:orientation val="minMax"/>
+        </c:scaling>
+        <c:delete val="0"/>
+        <c:axPos val="l"/>
+        <c:majorGridlines/>
+        <c:numFmt formatCode="General" sourceLinked="1"/>
+        <c:majorTickMark val="out"/>
+        <c:minorTickMark val="none"/>
+        <c:tickLblPos val="nextTo"/>
+        <c:crossAx val="-2130698088"/>
+        <c:crosses val="autoZero"/>
+        <c:crossBetween val="midCat"/>
+      </c:valAx>
+    </c:plotArea>
+    <c:legend>
+      <c:legendPos val="r"/>
+      <c:layout/>
+      <c:overlay val="0"/>
+    </c:legend>
+    <c:plotVisOnly val="1"/>
+    <c:dispBlanksAs val="gap"/>
+    <c:showDLblsOverMax val="0"/>
+  </c:chart>
+  <c:externalData r:id="rId1">
+    <c:autoUpdate val="0"/>
+  </c:externalData>
+</c:chartSpace>
+</file>
+
+<file path=ppt/charts/chart7.xml><?xml version="1.0" encoding="utf-8"?>
+<c:chartSpace xmlns:c="http://schemas.openxmlformats.org/drawingml/2006/chart" xmlns:a="http://schemas.openxmlformats.org/drawingml/2006/main" xmlns:r="http://schemas.openxmlformats.org/officeDocument/2006/relationships">
+  <c:date1904 val="0"/>
+  <c:lang val="en-US"/>
+  <c:roundedCorners val="0"/>
+  <mc:AlternateContent xmlns:mc="http://schemas.openxmlformats.org/markup-compatibility/2006">
+    <mc:Choice xmlns:c14="http://schemas.microsoft.com/office/drawing/2007/8/2/chart" Requires="c14">
+      <c14:style val="118"/>
+    </mc:Choice>
+    <mc:Fallback>
+      <c:style val="18"/>
+    </mc:Fallback>
+  </mc:AlternateContent>
+  <c:chart>
+    <c:title>
+      <c:tx>
+        <c:rich>
+          <a:bodyPr/>
+          <a:lstStyle/>
+          <a:p>
+            <a:pPr>
+              <a:defRPr/>
+            </a:pPr>
+            <a:r>
+              <a:rPr lang="en-US"/>
+              <a:t>Body</a:t>
+            </a:r>
+            <a:r>
+              <a:rPr lang="en-US" baseline="0"/>
+              <a:t> Cell Death with Bacteria and Macrophages</a:t>
+            </a:r>
+            <a:endParaRPr lang="en-US"/>
+          </a:p>
+        </c:rich>
+      </c:tx>
+      <c:layout/>
+      <c:overlay val="0"/>
+    </c:title>
+    <c:autoTitleDeleted val="0"/>
+    <c:plotArea>
+      <c:layout/>
+      <c:scatterChart>
+        <c:scatterStyle val="smoothMarker"/>
+        <c:varyColors val="0"/>
+        <c:ser>
+          <c:idx val="0"/>
+          <c:order val="0"/>
+          <c:tx>
+            <c:v>Number of Body Cells Without Macrophages</c:v>
+          </c:tx>
+          <c:marker>
+            <c:symbol val="none"/>
+          </c:marker>
+          <c:xVal>
+            <c:numRef>
+              <c:f>Sheet1!$A$1:$A$29</c:f>
+              <c:numCache>
+                <c:formatCode>General</c:formatCode>
+                <c:ptCount val="29"/>
+                <c:pt idx="0">
+                  <c:v>1.0</c:v>
+                </c:pt>
+                <c:pt idx="1">
+                  <c:v>2.0</c:v>
+                </c:pt>
+                <c:pt idx="2">
+                  <c:v>3.0</c:v>
+                </c:pt>
+                <c:pt idx="3">
+                  <c:v>4.0</c:v>
+                </c:pt>
+                <c:pt idx="4">
+                  <c:v>5.0</c:v>
+                </c:pt>
+                <c:pt idx="5">
+                  <c:v>6.0</c:v>
+                </c:pt>
+                <c:pt idx="6">
+                  <c:v>7.0</c:v>
+                </c:pt>
+                <c:pt idx="7">
+                  <c:v>8.0</c:v>
+                </c:pt>
+                <c:pt idx="8">
+                  <c:v>9.0</c:v>
+                </c:pt>
+                <c:pt idx="9">
+                  <c:v>10.0</c:v>
+                </c:pt>
+                <c:pt idx="10">
+                  <c:v>11.0</c:v>
+                </c:pt>
+                <c:pt idx="11">
+                  <c:v>12.0</c:v>
+                </c:pt>
+                <c:pt idx="12">
+                  <c:v>13.0</c:v>
+                </c:pt>
+                <c:pt idx="13">
+                  <c:v>14.0</c:v>
+                </c:pt>
+                <c:pt idx="14">
+                  <c:v>15.0</c:v>
+                </c:pt>
+                <c:pt idx="15">
+                  <c:v>16.0</c:v>
+                </c:pt>
+                <c:pt idx="16">
+                  <c:v>17.0</c:v>
+                </c:pt>
+                <c:pt idx="17">
+                  <c:v>18.0</c:v>
+                </c:pt>
+                <c:pt idx="18">
+                  <c:v>19.0</c:v>
+                </c:pt>
+                <c:pt idx="19">
+                  <c:v>20.0</c:v>
+                </c:pt>
+                <c:pt idx="20">
+                  <c:v>21.0</c:v>
+                </c:pt>
+                <c:pt idx="21">
+                  <c:v>22.0</c:v>
+                </c:pt>
+                <c:pt idx="22">
+                  <c:v>23.0</c:v>
+                </c:pt>
+                <c:pt idx="23">
+                  <c:v>24.0</c:v>
+                </c:pt>
+                <c:pt idx="24">
+                  <c:v>25.0</c:v>
+                </c:pt>
+                <c:pt idx="25">
+                  <c:v>26.0</c:v>
+                </c:pt>
+                <c:pt idx="26">
+                  <c:v>27.0</c:v>
+                </c:pt>
+                <c:pt idx="27">
+                  <c:v>28.0</c:v>
+                </c:pt>
+                <c:pt idx="28">
+                  <c:v>29.0</c:v>
+                </c:pt>
+              </c:numCache>
+            </c:numRef>
+          </c:xVal>
+          <c:yVal>
+            <c:numRef>
+              <c:f>Sheet1!$B$1:$B$29</c:f>
+              <c:numCache>
+                <c:formatCode>General</c:formatCode>
+                <c:ptCount val="29"/>
+                <c:pt idx="0">
+                  <c:v>10.0</c:v>
+                </c:pt>
+                <c:pt idx="1">
+                  <c:v>10.0</c:v>
+                </c:pt>
+                <c:pt idx="2">
+                  <c:v>10.0</c:v>
+                </c:pt>
+                <c:pt idx="3">
+                  <c:v>10.0</c:v>
+                </c:pt>
+                <c:pt idx="4">
+                  <c:v>9.0</c:v>
+                </c:pt>
+                <c:pt idx="5">
+                  <c:v>9.0</c:v>
+                </c:pt>
+                <c:pt idx="6">
+                  <c:v>9.0</c:v>
+                </c:pt>
+                <c:pt idx="7">
+                  <c:v>9.0</c:v>
+                </c:pt>
+                <c:pt idx="8">
+                  <c:v>9.0</c:v>
+                </c:pt>
+                <c:pt idx="9">
+                  <c:v>9.0</c:v>
+                </c:pt>
+                <c:pt idx="10">
+                  <c:v>8.0</c:v>
+                </c:pt>
+                <c:pt idx="11">
+                  <c:v>8.0</c:v>
+                </c:pt>
+                <c:pt idx="12">
+                  <c:v>6.0</c:v>
+                </c:pt>
+                <c:pt idx="13">
+                  <c:v>5.0</c:v>
+                </c:pt>
+                <c:pt idx="14">
+                  <c:v>5.0</c:v>
+                </c:pt>
+                <c:pt idx="15">
+                  <c:v>4.0</c:v>
+                </c:pt>
+                <c:pt idx="16">
+                  <c:v>4.0</c:v>
+                </c:pt>
+                <c:pt idx="17">
+                  <c:v>2.0</c:v>
+                </c:pt>
+                <c:pt idx="18">
+                  <c:v>2.0</c:v>
+                </c:pt>
+                <c:pt idx="19">
+                  <c:v>2.0</c:v>
+                </c:pt>
+                <c:pt idx="20">
+                  <c:v>2.0</c:v>
+                </c:pt>
+                <c:pt idx="21">
+                  <c:v>2.0</c:v>
+                </c:pt>
+                <c:pt idx="22">
+                  <c:v>2.0</c:v>
+                </c:pt>
+                <c:pt idx="23">
+                  <c:v>1.0</c:v>
+                </c:pt>
+                <c:pt idx="24">
+                  <c:v>1.0</c:v>
+                </c:pt>
+                <c:pt idx="25">
+                  <c:v>1.0</c:v>
+                </c:pt>
+                <c:pt idx="26">
+                  <c:v>1.0</c:v>
+                </c:pt>
+                <c:pt idx="27">
+                  <c:v>1.0</c:v>
+                </c:pt>
+                <c:pt idx="28">
+                  <c:v>0.0</c:v>
+                </c:pt>
+              </c:numCache>
+            </c:numRef>
+          </c:yVal>
+          <c:smooth val="1"/>
+        </c:ser>
+        <c:ser>
+          <c:idx val="1"/>
+          <c:order val="1"/>
+          <c:tx>
+            <c:v>Number of Body Cells With Macrophages</c:v>
+          </c:tx>
+          <c:marker>
+            <c:symbol val="none"/>
+          </c:marker>
+          <c:xVal>
+            <c:numRef>
+              <c:f>Sheet1!$A$1:$A$29</c:f>
+              <c:numCache>
+                <c:formatCode>General</c:formatCode>
+                <c:ptCount val="29"/>
+                <c:pt idx="0">
+                  <c:v>1.0</c:v>
+                </c:pt>
+                <c:pt idx="1">
+                  <c:v>2.0</c:v>
+                </c:pt>
+                <c:pt idx="2">
+                  <c:v>3.0</c:v>
+                </c:pt>
+                <c:pt idx="3">
+                  <c:v>4.0</c:v>
+                </c:pt>
+                <c:pt idx="4">
+                  <c:v>5.0</c:v>
+                </c:pt>
+                <c:pt idx="5">
+                  <c:v>6.0</c:v>
+                </c:pt>
+                <c:pt idx="6">
+                  <c:v>7.0</c:v>
+                </c:pt>
+                <c:pt idx="7">
+                  <c:v>8.0</c:v>
+                </c:pt>
+                <c:pt idx="8">
+                  <c:v>9.0</c:v>
+                </c:pt>
+                <c:pt idx="9">
+                  <c:v>10.0</c:v>
+                </c:pt>
+                <c:pt idx="10">
+                  <c:v>11.0</c:v>
+                </c:pt>
+                <c:pt idx="11">
+                  <c:v>12.0</c:v>
+                </c:pt>
+                <c:pt idx="12">
+                  <c:v>13.0</c:v>
+                </c:pt>
+                <c:pt idx="13">
+                  <c:v>14.0</c:v>
+                </c:pt>
+                <c:pt idx="14">
+                  <c:v>15.0</c:v>
+                </c:pt>
+                <c:pt idx="15">
+                  <c:v>16.0</c:v>
+                </c:pt>
+                <c:pt idx="16">
+                  <c:v>17.0</c:v>
+                </c:pt>
+                <c:pt idx="17">
+                  <c:v>18.0</c:v>
+                </c:pt>
+                <c:pt idx="18">
+                  <c:v>19.0</c:v>
+                </c:pt>
+                <c:pt idx="19">
+                  <c:v>20.0</c:v>
+                </c:pt>
+                <c:pt idx="20">
+                  <c:v>21.0</c:v>
+                </c:pt>
+                <c:pt idx="21">
+                  <c:v>22.0</c:v>
+                </c:pt>
+                <c:pt idx="22">
+                  <c:v>23.0</c:v>
+                </c:pt>
+                <c:pt idx="23">
+                  <c:v>24.0</c:v>
+                </c:pt>
+                <c:pt idx="24">
+                  <c:v>25.0</c:v>
+                </c:pt>
+                <c:pt idx="25">
+                  <c:v>26.0</c:v>
+                </c:pt>
+                <c:pt idx="26">
+                  <c:v>27.0</c:v>
+                </c:pt>
+                <c:pt idx="27">
+                  <c:v>28.0</c:v>
+                </c:pt>
+                <c:pt idx="28">
+                  <c:v>29.0</c:v>
+                </c:pt>
+              </c:numCache>
+            </c:numRef>
+          </c:xVal>
+          <c:yVal>
+            <c:numRef>
+              <c:f>Sheet1!$C$1:$C$29</c:f>
+              <c:numCache>
+                <c:formatCode>General</c:formatCode>
+                <c:ptCount val="29"/>
+                <c:pt idx="0">
+                  <c:v>10.0</c:v>
+                </c:pt>
+                <c:pt idx="1">
+                  <c:v>10.0</c:v>
+                </c:pt>
+                <c:pt idx="2">
+                  <c:v>10.0</c:v>
+                </c:pt>
+                <c:pt idx="3">
+                  <c:v>10.0</c:v>
+                </c:pt>
+                <c:pt idx="4">
+                  <c:v>10.0</c:v>
+                </c:pt>
+                <c:pt idx="5">
+                  <c:v>9.0</c:v>
+                </c:pt>
+                <c:pt idx="6">
+                  <c:v>8.0</c:v>
+                </c:pt>
+                <c:pt idx="7">
+                  <c:v>8.0</c:v>
+                </c:pt>
+                <c:pt idx="8">
+                  <c:v>8.0</c:v>
+                </c:pt>
+                <c:pt idx="9">
+                  <c:v>8.0</c:v>
+                </c:pt>
+                <c:pt idx="10">
+                  <c:v>8.0</c:v>
+                </c:pt>
+                <c:pt idx="11">
+                  <c:v>8.0</c:v>
+                </c:pt>
+                <c:pt idx="12">
+                  <c:v>8.0</c:v>
+                </c:pt>
+                <c:pt idx="13">
+                  <c:v>8.0</c:v>
+                </c:pt>
+                <c:pt idx="14">
+                  <c:v>8.0</c:v>
+                </c:pt>
+                <c:pt idx="15">
+                  <c:v>8.0</c:v>
+                </c:pt>
+                <c:pt idx="16">
+                  <c:v>8.0</c:v>
+                </c:pt>
+                <c:pt idx="17">
+                  <c:v>8.0</c:v>
+                </c:pt>
+                <c:pt idx="18">
+                  <c:v>8.0</c:v>
+                </c:pt>
+                <c:pt idx="19">
+                  <c:v>8.0</c:v>
+                </c:pt>
+                <c:pt idx="20">
+                  <c:v>8.0</c:v>
+                </c:pt>
+                <c:pt idx="21">
+                  <c:v>7.0</c:v>
+                </c:pt>
+                <c:pt idx="22">
+                  <c:v>7.0</c:v>
+                </c:pt>
+                <c:pt idx="23">
+                  <c:v>7.0</c:v>
+                </c:pt>
+                <c:pt idx="24">
+                  <c:v>7.0</c:v>
+                </c:pt>
+                <c:pt idx="25">
+                  <c:v>7.0</c:v>
+                </c:pt>
+                <c:pt idx="26">
+                  <c:v>7.0</c:v>
+                </c:pt>
+                <c:pt idx="27">
+                  <c:v>7.0</c:v>
+                </c:pt>
+                <c:pt idx="28">
+                  <c:v>7.0</c:v>
+                </c:pt>
+              </c:numCache>
+            </c:numRef>
+          </c:yVal>
+          <c:smooth val="1"/>
+        </c:ser>
+        <c:dLbls>
+          <c:showLegendKey val="0"/>
+          <c:showVal val="0"/>
+          <c:showCatName val="0"/>
+          <c:showSerName val="0"/>
+          <c:showPercent val="0"/>
+          <c:showBubbleSize val="0"/>
+        </c:dLbls>
+        <c:axId val="-2115039256"/>
+        <c:axId val="-2115934216"/>
+      </c:scatterChart>
+      <c:valAx>
+        <c:axId val="-2115039256"/>
+        <c:scaling>
+          <c:orientation val="minMax"/>
+        </c:scaling>
+        <c:delete val="0"/>
+        <c:axPos val="b"/>
+        <c:numFmt formatCode="General" sourceLinked="1"/>
+        <c:majorTickMark val="out"/>
+        <c:minorTickMark val="none"/>
+        <c:tickLblPos val="nextTo"/>
+        <c:txPr>
+          <a:bodyPr rot="0" vert="horz"/>
+          <a:lstStyle/>
+          <a:p>
+            <a:pPr>
+              <a:defRPr sz="1000" b="0" i="0" u="none" strike="noStrike" baseline="0">
+                <a:solidFill>
+                  <a:srgbClr val="000000"/>
+                </a:solidFill>
+                <a:latin typeface="Calibri"/>
+                <a:ea typeface="Calibri"/>
+                <a:cs typeface="Calibri"/>
+              </a:defRPr>
+            </a:pPr>
+            <a:endParaRPr lang="en-US"/>
+          </a:p>
+        </c:txPr>
+        <c:crossAx val="-2115934216"/>
+        <c:crosses val="autoZero"/>
+        <c:crossBetween val="midCat"/>
+      </c:valAx>
+      <c:valAx>
+        <c:axId val="-2115934216"/>
+        <c:scaling>
+          <c:orientation val="minMax"/>
+        </c:scaling>
+        <c:delete val="0"/>
+        <c:axPos val="l"/>
+        <c:majorGridlines/>
+        <c:numFmt formatCode="General" sourceLinked="1"/>
+        <c:majorTickMark val="out"/>
+        <c:minorTickMark val="none"/>
+        <c:tickLblPos val="nextTo"/>
+        <c:crossAx val="-2115039256"/>
         <c:crosses val="autoZero"/>
         <c:crossBetween val="midCat"/>
       </c:valAx>
@@ -4787,7 +6898,7 @@
         </p:nvSpPr>
         <p:spPr>
           <a:xfrm>
-            <a:off x="9144000" y="4876800"/>
+            <a:off x="8991600" y="3708400"/>
             <a:ext cx="14935200" cy="6959600"/>
           </a:xfrm>
           <a:prstGeom prst="roundRect">
@@ -4843,7 +6954,7 @@
         </p:nvSpPr>
         <p:spPr>
           <a:xfrm>
-            <a:off x="1319341" y="611208"/>
+            <a:off x="1674941" y="509608"/>
             <a:ext cx="29447301" cy="3130172"/>
           </a:xfrm>
         </p:spPr>
@@ -4933,14 +7044,7 @@
                 <a:latin typeface="Century Gothic"/>
                 <a:cs typeface="Century Gothic"/>
               </a:rPr>
-              <a:t>A </a:t>
-            </a:r>
-            <a:r>
-              <a:rPr lang="en-US" sz="1800" dirty="0" smtClean="0">
-                <a:latin typeface="Century Gothic"/>
-                <a:cs typeface="Century Gothic"/>
-              </a:rPr>
-              <a:t>realistic immune system simulator </a:t>
+              <a:t>A realistic immune system simulator </a:t>
             </a:r>
             <a:r>
               <a:rPr lang="en-US" sz="1800" dirty="0" err="1" smtClean="0">
@@ -5559,117 +7663,6 @@
           </a:lstStyle>
           <a:p>
             <a:pPr algn="ctr"/>
-            <a:r>
-              <a:rPr lang="en-US" sz="2648" dirty="0">
-                <a:latin typeface="Century Gothic"/>
-                <a:cs typeface="Century Gothic"/>
-              </a:rPr>
-              <a:t>Materials</a:t>
-            </a:r>
-          </a:p>
-          <a:p>
-            <a:pPr fontAlgn="base"/>
-            <a:r>
-              <a:rPr lang="en-US" sz="2648" dirty="0">
-                <a:latin typeface="Century Gothic"/>
-                <a:cs typeface="Century Gothic"/>
-              </a:rPr>
-              <a:t>A </a:t>
-            </a:r>
-            <a:r>
-              <a:rPr lang="en-US" sz="2648" dirty="0" err="1">
-                <a:latin typeface="Century Gothic"/>
-                <a:cs typeface="Century Gothic"/>
-              </a:rPr>
-              <a:t>Mindstorm</a:t>
-            </a:r>
-            <a:r>
-              <a:rPr lang="en-US" sz="2648" dirty="0">
-                <a:latin typeface="Century Gothic"/>
-                <a:cs typeface="Century Gothic"/>
-              </a:rPr>
-              <a:t> Ev3 brick (brain)</a:t>
-            </a:r>
-          </a:p>
-          <a:p>
-            <a:pPr fontAlgn="base"/>
-            <a:r>
-              <a:rPr lang="en-US" sz="2648" dirty="0">
-                <a:latin typeface="Century Gothic"/>
-                <a:cs typeface="Century Gothic"/>
-              </a:rPr>
-              <a:t>An Ev3 color sensor</a:t>
-            </a:r>
-          </a:p>
-          <a:p>
-            <a:pPr fontAlgn="base"/>
-            <a:r>
-              <a:rPr lang="en-US" sz="2648" dirty="0">
-                <a:latin typeface="Century Gothic"/>
-                <a:cs typeface="Century Gothic"/>
-              </a:rPr>
-              <a:t>A Benjamin Moore Color Preview swatch (A color palette)</a:t>
-            </a:r>
-          </a:p>
-          <a:p>
-            <a:pPr fontAlgn="base"/>
-            <a:r>
-              <a:rPr lang="en-US" sz="2648" dirty="0">
-                <a:latin typeface="Century Gothic"/>
-                <a:cs typeface="Century Gothic"/>
-              </a:rPr>
-              <a:t>A computer</a:t>
-            </a:r>
-          </a:p>
-          <a:p>
-            <a:pPr fontAlgn="base"/>
-            <a:r>
-              <a:rPr lang="en-US" sz="2648" dirty="0" err="1">
-                <a:latin typeface="Century Gothic"/>
-                <a:cs typeface="Century Gothic"/>
-              </a:rPr>
-              <a:t>Mindstorm</a:t>
-            </a:r>
-            <a:r>
-              <a:rPr lang="en-US" sz="2648" dirty="0">
-                <a:latin typeface="Century Gothic"/>
-                <a:cs typeface="Century Gothic"/>
-              </a:rPr>
-              <a:t> Software</a:t>
-            </a:r>
-          </a:p>
-          <a:p>
-            <a:pPr fontAlgn="base"/>
-            <a:r>
-              <a:rPr lang="en-US" sz="2648" dirty="0">
-                <a:latin typeface="Century Gothic"/>
-                <a:cs typeface="Century Gothic"/>
-              </a:rPr>
-              <a:t>Light Dimmer (Switch)</a:t>
-            </a:r>
-          </a:p>
-          <a:p>
-            <a:pPr fontAlgn="base"/>
-            <a:r>
-              <a:rPr lang="en-US" sz="2648" dirty="0">
-                <a:latin typeface="Century Gothic"/>
-                <a:cs typeface="Century Gothic"/>
-              </a:rPr>
-              <a:t>Legos</a:t>
-            </a:r>
-          </a:p>
-          <a:p>
-            <a:pPr fontAlgn="base"/>
-            <a:r>
-              <a:rPr lang="en-US" sz="2648" dirty="0">
-                <a:latin typeface="Century Gothic"/>
-                <a:cs typeface="Century Gothic"/>
-              </a:rPr>
-              <a:t>A computer USB</a:t>
-            </a:r>
-          </a:p>
-          <a:p>
-            <a:pPr algn="ctr"/>
             <a:endParaRPr lang="en-US" sz="2648" dirty="0">
               <a:latin typeface="Century Gothic"/>
               <a:cs typeface="Century Gothic"/>
@@ -5687,7 +7680,7 @@
         </p:nvSpPr>
         <p:spPr>
           <a:xfrm>
-            <a:off x="9448801" y="5036774"/>
+            <a:off x="9448801" y="3919174"/>
             <a:ext cx="14325600" cy="7684728"/>
           </a:xfrm>
           <a:prstGeom prst="rect">
@@ -6269,16 +8262,10 @@
           <a:p>
             <a:pPr algn="ctr"/>
             <a:r>
-              <a:rPr lang="en-US" sz="2648" dirty="0"/>
-              <a:t>Conclusion</a:t>
-            </a:r>
-          </a:p>
-          <a:p>
-            <a:pPr algn="ctr"/>
-            <a:r>
-              <a:rPr lang="en-US" sz="2648" dirty="0"/>
-              <a:t>We learned that even though we thought that the colors red and green would be sensed more by the robot, the robot actually sensed all the colors the same. Also, the human eye can sense hues that the robotic sensor could not. </a:t>
-            </a:r>
+              <a:rPr lang="en-US" sz="2648" dirty="0" smtClean="0"/>
+              <a:t> </a:t>
+            </a:r>
+            <a:endParaRPr lang="en-US" sz="2648" dirty="0"/>
           </a:p>
         </p:txBody>
       </p:sp>
@@ -7316,7 +9303,14 @@
                 <a:latin typeface="Century Gothic"/>
                 <a:cs typeface="Century Gothic"/>
               </a:rPr>
-              <a:t>In these results, the effect was huge. The first chart shows the death of body cells without killer-T cells(blue) , and the death of body cells with killer-T cells(red). In this chart, the effect of the killer-T cells was not significant. However, the body cells died quicker than without killer-T cells. The second chart shows the amount of viruses with and without killer-T cells(red and blue). The impact was significant. The results without killer-T cells showed the virus population reaching almost 2000, while the population with killer-T cells reached less than 500. So, the killer-T cells killed a lot of viruses, but did not impact the amount of body cells as much.</a:t>
+              <a:t>       In </a:t>
+            </a:r>
+            <a:r>
+              <a:rPr lang="en-US" dirty="0" smtClean="0">
+                <a:latin typeface="Century Gothic"/>
+                <a:cs typeface="Century Gothic"/>
+              </a:rPr>
+              <a:t>these results, the effect was huge. The first chart shows the death of body cells without killer-T cells(blue) , and the death of body cells with killer-T cells(red). In this chart, the effect of the killer-T cells was not significant. However, the body cells died quicker than without killer-T cells. The second chart shows the amount of viruses with and without killer-T cells(red and blue). The impact was significant. The results without killer-T cells showed the virus population reaching almost 2000, while the population with killer-T cells reached less than 500. So, the killer-T cells killed a lot of viruses, but did not impact the amount of body cells as much.</a:t>
             </a:r>
           </a:p>
           <a:p>
@@ -7352,6 +9346,294 @@
           </a:graphicData>
         </a:graphic>
       </p:graphicFrame>
+      <p:sp>
+        <p:nvSpPr>
+          <p:cNvPr id="6" name="TextBox 5"/>
+          <p:cNvSpPr txBox="1"/>
+          <p:nvPr/>
+        </p:nvSpPr>
+        <p:spPr>
+          <a:xfrm>
+            <a:off x="22120703" y="13762543"/>
+            <a:ext cx="3394304" cy="1200329"/>
+          </a:xfrm>
+          <a:prstGeom prst="rect">
+            <a:avLst/>
+          </a:prstGeom>
+          <a:noFill/>
+        </p:spPr>
+        <p:txBody>
+          <a:bodyPr wrap="square" rtlCol="0">
+            <a:spAutoFit/>
+          </a:bodyPr>
+          <a:lstStyle/>
+          <a:p>
+            <a:r>
+              <a:rPr lang="en-US" dirty="0" smtClean="0">
+                <a:latin typeface="Century Gothic"/>
+                <a:cs typeface="Century Gothic"/>
+              </a:rPr>
+              <a:t>In my third experiment, I did a simulation with on virus and the entire immune system. </a:t>
+            </a:r>
+            <a:endParaRPr lang="en-US" dirty="0">
+              <a:latin typeface="Century Gothic"/>
+              <a:cs typeface="Century Gothic"/>
+            </a:endParaRPr>
+          </a:p>
+        </p:txBody>
+      </p:sp>
+      <p:graphicFrame>
+        <p:nvGraphicFramePr>
+          <p:cNvPr id="24" name="Chart 23"/>
+          <p:cNvGraphicFramePr>
+            <a:graphicFrameLocks/>
+          </p:cNvGraphicFramePr>
+          <p:nvPr>
+            <p:extLst>
+              <p:ext uri="{D42A27DB-BD31-4B8C-83A1-F6EECF244321}">
+                <p14:modId xmlns:p14="http://schemas.microsoft.com/office/powerpoint/2010/main" val="3790889612"/>
+              </p:ext>
+            </p:extLst>
+          </p:nvPr>
+        </p:nvGraphicFramePr>
+        <p:xfrm>
+          <a:off x="22213301" y="15124944"/>
+          <a:ext cx="3994421" cy="3325178"/>
+        </p:xfrm>
+        <a:graphic>
+          <a:graphicData uri="http://schemas.openxmlformats.org/drawingml/2006/chart">
+            <c:chart xmlns:c="http://schemas.openxmlformats.org/drawingml/2006/chart" xmlns:r="http://schemas.openxmlformats.org/officeDocument/2006/relationships" r:id="rId5"/>
+          </a:graphicData>
+        </a:graphic>
+      </p:graphicFrame>
+      <p:graphicFrame>
+        <p:nvGraphicFramePr>
+          <p:cNvPr id="26" name="Chart 25"/>
+          <p:cNvGraphicFramePr>
+            <a:graphicFrameLocks/>
+          </p:cNvGraphicFramePr>
+          <p:nvPr>
+            <p:extLst>
+              <p:ext uri="{D42A27DB-BD31-4B8C-83A1-F6EECF244321}">
+                <p14:modId xmlns:p14="http://schemas.microsoft.com/office/powerpoint/2010/main" val="2381244341"/>
+              </p:ext>
+            </p:extLst>
+          </p:nvPr>
+        </p:nvGraphicFramePr>
+        <p:xfrm>
+          <a:off x="22277967" y="18699258"/>
+          <a:ext cx="4572000" cy="2743200"/>
+        </p:xfrm>
+        <a:graphic>
+          <a:graphicData uri="http://schemas.openxmlformats.org/drawingml/2006/chart">
+            <c:chart xmlns:c="http://schemas.openxmlformats.org/drawingml/2006/chart" xmlns:r="http://schemas.openxmlformats.org/officeDocument/2006/relationships" r:id="rId6"/>
+          </a:graphicData>
+        </a:graphic>
+      </p:graphicFrame>
+      <p:sp>
+        <p:nvSpPr>
+          <p:cNvPr id="13" name="TextBox 12"/>
+          <p:cNvSpPr txBox="1"/>
+          <p:nvPr/>
+        </p:nvSpPr>
+        <p:spPr>
+          <a:xfrm>
+            <a:off x="27477700" y="15263492"/>
+            <a:ext cx="3740662" cy="5632312"/>
+          </a:xfrm>
+          <a:prstGeom prst="rect">
+            <a:avLst/>
+          </a:prstGeom>
+          <a:noFill/>
+        </p:spPr>
+        <p:txBody>
+          <a:bodyPr wrap="square" rtlCol="0">
+            <a:spAutoFit/>
+          </a:bodyPr>
+          <a:lstStyle/>
+          <a:p>
+            <a:r>
+              <a:rPr lang="en-US" dirty="0" smtClean="0">
+                <a:latin typeface="Century Gothic"/>
+                <a:cs typeface="Century Gothic"/>
+              </a:rPr>
+              <a:t>In these results, the effect was the most significant. The first chart shows the death of body cells with (red) and without(blue) the immune system.  The impact of the immune system shows that the cells without the immune system died much before the cells with the immune system did. In the second chart, the effect is also extremely large. The viruses without the immune system replicated much more than the viruses with the immune system. In fact, the viruses with the immune system died after awhile. So, the immune system impacted the body cells and the viruses the most. </a:t>
+            </a:r>
+            <a:endParaRPr lang="en-US" dirty="0">
+              <a:latin typeface="Century Gothic"/>
+              <a:cs typeface="Century Gothic"/>
+            </a:endParaRPr>
+          </a:p>
+        </p:txBody>
+      </p:sp>
+      <p:sp>
+        <p:nvSpPr>
+          <p:cNvPr id="15" name="TextBox 14"/>
+          <p:cNvSpPr txBox="1"/>
+          <p:nvPr/>
+        </p:nvSpPr>
+        <p:spPr>
+          <a:xfrm>
+            <a:off x="25603200" y="3911600"/>
+            <a:ext cx="6146800" cy="646331"/>
+          </a:xfrm>
+          <a:prstGeom prst="rect">
+            <a:avLst/>
+          </a:prstGeom>
+          <a:noFill/>
+        </p:spPr>
+        <p:txBody>
+          <a:bodyPr wrap="square" rtlCol="0">
+            <a:spAutoFit/>
+          </a:bodyPr>
+          <a:lstStyle/>
+          <a:p>
+            <a:r>
+              <a:rPr lang="en-US" dirty="0" smtClean="0"/>
+              <a:t>In my fourth experiment, I simulated a much slower infection with twenty staph bacteria and 10 body cells. </a:t>
+            </a:r>
+            <a:endParaRPr lang="en-US" dirty="0"/>
+          </a:p>
+        </p:txBody>
+      </p:sp>
+      <p:graphicFrame>
+        <p:nvGraphicFramePr>
+          <p:cNvPr id="30" name="Chart 29"/>
+          <p:cNvGraphicFramePr>
+            <a:graphicFrameLocks/>
+          </p:cNvGraphicFramePr>
+          <p:nvPr>
+            <p:extLst>
+              <p:ext uri="{D42A27DB-BD31-4B8C-83A1-F6EECF244321}">
+                <p14:modId xmlns:p14="http://schemas.microsoft.com/office/powerpoint/2010/main" val="1490716748"/>
+              </p:ext>
+            </p:extLst>
+          </p:nvPr>
+        </p:nvGraphicFramePr>
+        <p:xfrm>
+          <a:off x="25695361" y="4798164"/>
+          <a:ext cx="4572000" cy="2743200"/>
+        </p:xfrm>
+        <a:graphic>
+          <a:graphicData uri="http://schemas.openxmlformats.org/drawingml/2006/chart">
+            <c:chart xmlns:c="http://schemas.openxmlformats.org/drawingml/2006/chart" xmlns:r="http://schemas.openxmlformats.org/officeDocument/2006/relationships" r:id="rId7"/>
+          </a:graphicData>
+        </a:graphic>
+      </p:graphicFrame>
+      <p:sp>
+        <p:nvSpPr>
+          <p:cNvPr id="17" name="TextBox 16"/>
+          <p:cNvSpPr txBox="1"/>
+          <p:nvPr/>
+        </p:nvSpPr>
+        <p:spPr>
+          <a:xfrm>
+            <a:off x="25953726" y="7550926"/>
+            <a:ext cx="4687373" cy="646331"/>
+          </a:xfrm>
+          <a:prstGeom prst="rect">
+            <a:avLst/>
+          </a:prstGeom>
+          <a:noFill/>
+        </p:spPr>
+        <p:txBody>
+          <a:bodyPr wrap="square" rtlCol="0">
+            <a:spAutoFit/>
+          </a:bodyPr>
+          <a:lstStyle/>
+          <a:p>
+            <a:r>
+              <a:rPr lang="en-US" dirty="0" smtClean="0"/>
+              <a:t>In this experiment, the body cells died much slower. </a:t>
+            </a:r>
+            <a:endParaRPr lang="en-US" dirty="0"/>
+          </a:p>
+        </p:txBody>
+      </p:sp>
+      <p:sp>
+        <p:nvSpPr>
+          <p:cNvPr id="18" name="TextBox 17"/>
+          <p:cNvSpPr txBox="1"/>
+          <p:nvPr/>
+        </p:nvSpPr>
+        <p:spPr>
+          <a:xfrm>
+            <a:off x="25976817" y="8336038"/>
+            <a:ext cx="4641191" cy="923330"/>
+          </a:xfrm>
+          <a:prstGeom prst="rect">
+            <a:avLst/>
+          </a:prstGeom>
+          <a:noFill/>
+        </p:spPr>
+        <p:txBody>
+          <a:bodyPr wrap="square" rtlCol="0">
+            <a:spAutoFit/>
+          </a:bodyPr>
+          <a:lstStyle/>
+          <a:p>
+            <a:r>
+              <a:rPr lang="en-US" dirty="0" smtClean="0"/>
+              <a:t>In my fifth experiment, I added 10 macrophages with the same number of bacteria and body cells.</a:t>
+            </a:r>
+            <a:endParaRPr lang="en-US" dirty="0"/>
+          </a:p>
+        </p:txBody>
+      </p:sp>
+      <p:graphicFrame>
+        <p:nvGraphicFramePr>
+          <p:cNvPr id="32" name="Chart 31"/>
+          <p:cNvGraphicFramePr>
+            <a:graphicFrameLocks/>
+          </p:cNvGraphicFramePr>
+          <p:nvPr>
+            <p:extLst>
+              <p:ext uri="{D42A27DB-BD31-4B8C-83A1-F6EECF244321}">
+                <p14:modId xmlns:p14="http://schemas.microsoft.com/office/powerpoint/2010/main" val="1513096895"/>
+              </p:ext>
+            </p:extLst>
+          </p:nvPr>
+        </p:nvGraphicFramePr>
+        <p:xfrm>
+          <a:off x="26041720" y="9370285"/>
+          <a:ext cx="4572000" cy="2743200"/>
+        </p:xfrm>
+        <a:graphic>
+          <a:graphicData uri="http://schemas.openxmlformats.org/drawingml/2006/chart">
+            <c:chart xmlns:c="http://schemas.openxmlformats.org/drawingml/2006/chart" xmlns:r="http://schemas.openxmlformats.org/officeDocument/2006/relationships" r:id="rId8"/>
+          </a:graphicData>
+        </a:graphic>
+      </p:graphicFrame>
+      <p:sp>
+        <p:nvSpPr>
+          <p:cNvPr id="20" name="TextBox 19"/>
+          <p:cNvSpPr txBox="1"/>
+          <p:nvPr/>
+        </p:nvSpPr>
+        <p:spPr>
+          <a:xfrm>
+            <a:off x="26392446" y="12330870"/>
+            <a:ext cx="4087019" cy="1477328"/>
+          </a:xfrm>
+          <a:prstGeom prst="rect">
+            <a:avLst/>
+          </a:prstGeom>
+          <a:noFill/>
+        </p:spPr>
+        <p:txBody>
+          <a:bodyPr wrap="square" rtlCol="0">
+            <a:spAutoFit/>
+          </a:bodyPr>
+          <a:lstStyle/>
+          <a:p>
+            <a:r>
+              <a:rPr lang="en-US" dirty="0" smtClean="0"/>
+              <a:t>In this experiment, the impact was also significant. The body cells with the macrophages were saved, and in the test without the macrophages, all the body cells died. </a:t>
+            </a:r>
+            <a:endParaRPr lang="en-US" dirty="0"/>
+          </a:p>
+        </p:txBody>
+      </p:sp>
     </p:spTree>
     <p:extLst>
       <p:ext uri="{BB962C8B-B14F-4D97-AF65-F5344CB8AC3E}">
@@ -7973,7 +10255,7 @@
   <a:extraClrSchemeLst/>
   <a:extLst>
     <a:ext uri="{05A4C25C-085E-4340-85A3-A5531E510DB2}">
-      <thm15:themeFamily xmlns:thm15="http://schemas.microsoft.com/office/thememl/2012/main" xmlns="" name="Office Theme" id="{62F939B6-93AF-4DB8-9C6B-D6C7DFDC589F}" vid="{4A3C46E8-61CC-4603-A589-7422A47A8E4A}"/>
+      <thm15:themeFamily xmlns="" xmlns:thm15="http://schemas.microsoft.com/office/thememl/2012/main" name="Office Theme" id="{62F939B6-93AF-4DB8-9C6B-D6C7DFDC589F}" vid="{4A3C46E8-61CC-4603-A589-7422A47A8E4A}"/>
     </a:ext>
   </a:extLst>
 </a:theme>

</xml_diff>

<commit_message>
updating with final versions and website material
</commit_message>
<xml_diff>
--- a/Science Fair Poster .pptx
+++ b/Science Fair Poster .pptx
@@ -263,22 +263,22 @@
                   <c:v>100.0</c:v>
                 </c:pt>
                 <c:pt idx="3">
-                  <c:v>46.66666666666666</c:v>
+                  <c:v>46.66666666666664</c:v>
                 </c:pt>
                 <c:pt idx="4">
-                  <c:v>46.66666666666666</c:v>
+                  <c:v>46.66666666666664</c:v>
                 </c:pt>
                 <c:pt idx="5">
-                  <c:v>46.66666666666666</c:v>
+                  <c:v>46.66666666666664</c:v>
                 </c:pt>
                 <c:pt idx="6">
-                  <c:v>46.66666666666666</c:v>
+                  <c:v>46.66666666666664</c:v>
                 </c:pt>
                 <c:pt idx="7">
-                  <c:v>46.66666666666666</c:v>
+                  <c:v>46.66666666666664</c:v>
                 </c:pt>
                 <c:pt idx="8">
-                  <c:v>46.66666666666666</c:v>
+                  <c:v>46.66666666666664</c:v>
                 </c:pt>
                 <c:pt idx="9">
                   <c:v>5.0</c:v>
@@ -311,8 +311,8 @@
           <c:showPercent val="0"/>
           <c:showBubbleSize val="0"/>
         </c:dLbls>
-        <c:axId val="1548467680"/>
-        <c:axId val="1591228976"/>
+        <c:axId val="734889616"/>
+        <c:axId val="734897280"/>
       </c:scatterChart>
       <c:scatterChart>
         <c:scatterStyle val="smoothMarker"/>
@@ -444,11 +444,11 @@
           <c:showPercent val="0"/>
           <c:showBubbleSize val="0"/>
         </c:dLbls>
-        <c:axId val="1641608288"/>
-        <c:axId val="1591083776"/>
+        <c:axId val="734905552"/>
+        <c:axId val="734909264"/>
       </c:scatterChart>
       <c:valAx>
-        <c:axId val="1548467680"/>
+        <c:axId val="734889616"/>
         <c:scaling>
           <c:orientation val="minMax"/>
         </c:scaling>
@@ -494,12 +494,12 @@
             <a:endParaRPr lang="en-US"/>
           </a:p>
         </c:txPr>
-        <c:crossAx val="1591228976"/>
+        <c:crossAx val="734897280"/>
         <c:crosses val="autoZero"/>
         <c:crossBetween val="midCat"/>
       </c:valAx>
       <c:valAx>
-        <c:axId val="1591228976"/>
+        <c:axId val="734897280"/>
         <c:scaling>
           <c:orientation val="minMax"/>
           <c:max val="110.0"/>
@@ -546,12 +546,12 @@
             <a:endParaRPr lang="en-US"/>
           </a:p>
         </c:txPr>
-        <c:crossAx val="1548467680"/>
+        <c:crossAx val="734889616"/>
         <c:crosses val="autoZero"/>
         <c:crossBetween val="midCat"/>
       </c:valAx>
       <c:valAx>
-        <c:axId val="1641608288"/>
+        <c:axId val="734905552"/>
         <c:scaling>
           <c:orientation val="minMax"/>
         </c:scaling>
@@ -560,12 +560,12 @@
         <c:majorTickMark val="out"/>
         <c:minorTickMark val="none"/>
         <c:tickLblPos val="nextTo"/>
-        <c:crossAx val="1591083776"/>
+        <c:crossAx val="734909264"/>
         <c:crosses val="autoZero"/>
         <c:crossBetween val="midCat"/>
       </c:valAx>
       <c:valAx>
-        <c:axId val="1591083776"/>
+        <c:axId val="734909264"/>
         <c:scaling>
           <c:orientation val="minMax"/>
           <c:max val="2400.0"/>
@@ -618,7 +618,7 @@
             <a:endParaRPr lang="en-US"/>
           </a:p>
         </c:txPr>
-        <c:crossAx val="1641608288"/>
+        <c:crossAx val="734905552"/>
         <c:crosses val="max"/>
         <c:crossBetween val="midCat"/>
       </c:valAx>
@@ -790,22 +790,22 @@
                   <c:v>100.0</c:v>
                 </c:pt>
                 <c:pt idx="3">
-                  <c:v>46.66666666666666</c:v>
+                  <c:v>46.66666666666664</c:v>
                 </c:pt>
                 <c:pt idx="4">
-                  <c:v>46.66666666666666</c:v>
+                  <c:v>46.66666666666664</c:v>
                 </c:pt>
                 <c:pt idx="5">
-                  <c:v>46.66666666666666</c:v>
+                  <c:v>46.66666666666664</c:v>
                 </c:pt>
                 <c:pt idx="6">
-                  <c:v>46.66666666666666</c:v>
+                  <c:v>46.66666666666664</c:v>
                 </c:pt>
                 <c:pt idx="7">
-                  <c:v>46.66666666666666</c:v>
+                  <c:v>46.66666666666664</c:v>
                 </c:pt>
                 <c:pt idx="8">
-                  <c:v>46.66666666666666</c:v>
+                  <c:v>46.66666666666664</c:v>
                 </c:pt>
                 <c:pt idx="9">
                   <c:v>5.0</c:v>
@@ -964,11 +964,11 @@
           <c:showPercent val="0"/>
           <c:showBubbleSize val="0"/>
         </c:dLbls>
-        <c:axId val="1696961696"/>
-        <c:axId val="1699960016"/>
+        <c:axId val="737202176"/>
+        <c:axId val="737209440"/>
       </c:scatterChart>
       <c:valAx>
-        <c:axId val="1696961696"/>
+        <c:axId val="737202176"/>
         <c:scaling>
           <c:orientation val="minMax"/>
         </c:scaling>
@@ -1014,12 +1014,12 @@
             <a:endParaRPr lang="en-US"/>
           </a:p>
         </c:txPr>
-        <c:crossAx val="1699960016"/>
+        <c:crossAx val="737209440"/>
         <c:crosses val="autoZero"/>
         <c:crossBetween val="midCat"/>
       </c:valAx>
       <c:valAx>
-        <c:axId val="1699960016"/>
+        <c:axId val="737209440"/>
         <c:scaling>
           <c:orientation val="minMax"/>
         </c:scaling>
@@ -1064,7 +1064,7 @@
             <a:endParaRPr lang="en-US"/>
           </a:p>
         </c:txPr>
-        <c:crossAx val="1696961696"/>
+        <c:crossAx val="737202176"/>
         <c:crosses val="autoZero"/>
         <c:crossBetween val="midCat"/>
       </c:valAx>
@@ -1417,11 +1417,11 @@
           <c:showPercent val="0"/>
           <c:showBubbleSize val="0"/>
         </c:dLbls>
-        <c:axId val="1578212800"/>
-        <c:axId val="1579382176"/>
+        <c:axId val="737264064"/>
+        <c:axId val="737271296"/>
       </c:scatterChart>
       <c:valAx>
-        <c:axId val="1578212800"/>
+        <c:axId val="737264064"/>
         <c:scaling>
           <c:orientation val="minMax"/>
         </c:scaling>
@@ -1467,12 +1467,12 @@
             <a:endParaRPr lang="en-US"/>
           </a:p>
         </c:txPr>
-        <c:crossAx val="1579382176"/>
+        <c:crossAx val="737271296"/>
         <c:crosses val="autoZero"/>
         <c:crossBetween val="midCat"/>
       </c:valAx>
       <c:valAx>
-        <c:axId val="1579382176"/>
+        <c:axId val="737271296"/>
         <c:scaling>
           <c:orientation val="minMax"/>
           <c:min val="0.0"/>
@@ -1518,7 +1518,7 @@
             <a:endParaRPr lang="en-US"/>
           </a:p>
         </c:txPr>
-        <c:crossAx val="1578212800"/>
+        <c:crossAx val="737264064"/>
         <c:crosses val="autoZero"/>
         <c:crossBetween val="midCat"/>
       </c:valAx>
@@ -2099,11 +2099,11 @@
           <c:showPercent val="0"/>
           <c:showBubbleSize val="0"/>
         </c:dLbls>
-        <c:axId val="1584506736"/>
-        <c:axId val="1722822976"/>
+        <c:axId val="737333632"/>
+        <c:axId val="737340864"/>
       </c:scatterChart>
       <c:valAx>
-        <c:axId val="1584506736"/>
+        <c:axId val="737333632"/>
         <c:scaling>
           <c:orientation val="minMax"/>
         </c:scaling>
@@ -2149,12 +2149,12 @@
             <a:endParaRPr lang="en-US"/>
           </a:p>
         </c:txPr>
-        <c:crossAx val="1722822976"/>
+        <c:crossAx val="737340864"/>
         <c:crosses val="autoZero"/>
         <c:crossBetween val="midCat"/>
       </c:valAx>
       <c:valAx>
-        <c:axId val="1722822976"/>
+        <c:axId val="737340864"/>
         <c:scaling>
           <c:orientation val="minMax"/>
           <c:min val="0.0"/>
@@ -2200,7 +2200,7 @@
             <a:endParaRPr lang="en-US"/>
           </a:p>
         </c:txPr>
-        <c:crossAx val="1584506736"/>
+        <c:crossAx val="737333632"/>
         <c:crosses val="autoZero"/>
         <c:crossBetween val="midCat"/>
       </c:valAx>
@@ -2429,22 +2429,22 @@
                   <c:v>100.0</c:v>
                 </c:pt>
                 <c:pt idx="3">
-                  <c:v>46.66666666666666</c:v>
+                  <c:v>46.66666666666664</c:v>
                 </c:pt>
                 <c:pt idx="4">
-                  <c:v>46.66666666666666</c:v>
+                  <c:v>46.66666666666664</c:v>
                 </c:pt>
                 <c:pt idx="5">
-                  <c:v>46.66666666666666</c:v>
+                  <c:v>46.66666666666664</c:v>
                 </c:pt>
                 <c:pt idx="6">
-                  <c:v>46.66666666666666</c:v>
+                  <c:v>46.66666666666664</c:v>
                 </c:pt>
                 <c:pt idx="7">
-                  <c:v>46.66666666666666</c:v>
+                  <c:v>46.66666666666664</c:v>
                 </c:pt>
                 <c:pt idx="8">
-                  <c:v>46.66666666666666</c:v>
+                  <c:v>46.66666666666664</c:v>
                 </c:pt>
                 <c:pt idx="9">
                   <c:v>5.0</c:v>
@@ -2774,11 +2774,11 @@
           <c:showPercent val="0"/>
           <c:showBubbleSize val="0"/>
         </c:dLbls>
-        <c:axId val="1641830976"/>
-        <c:axId val="1608023328"/>
+        <c:axId val="737390736"/>
+        <c:axId val="737397968"/>
       </c:scatterChart>
       <c:valAx>
-        <c:axId val="1641830976"/>
+        <c:axId val="737390736"/>
         <c:scaling>
           <c:orientation val="minMax"/>
         </c:scaling>
@@ -2824,12 +2824,12 @@
             <a:endParaRPr lang="en-US"/>
           </a:p>
         </c:txPr>
-        <c:crossAx val="1608023328"/>
+        <c:crossAx val="737397968"/>
         <c:crosses val="autoZero"/>
         <c:crossBetween val="midCat"/>
       </c:valAx>
       <c:valAx>
-        <c:axId val="1608023328"/>
+        <c:axId val="737397968"/>
         <c:scaling>
           <c:orientation val="minMax"/>
           <c:min val="0.0"/>
@@ -2875,7 +2875,7 @@
             <a:endParaRPr lang="en-US"/>
           </a:p>
         </c:txPr>
-        <c:crossAx val="1641830976"/>
+        <c:crossAx val="737390736"/>
         <c:crosses val="autoZero"/>
         <c:crossBetween val="midCat"/>
       </c:valAx>
@@ -3186,11 +3186,11 @@
           <c:showPercent val="0"/>
           <c:showBubbleSize val="0"/>
         </c:dLbls>
-        <c:axId val="1727393936"/>
-        <c:axId val="1587649856"/>
+        <c:axId val="737436976"/>
+        <c:axId val="737441024"/>
       </c:scatterChart>
       <c:valAx>
-        <c:axId val="1727393936"/>
+        <c:axId val="737436976"/>
         <c:scaling>
           <c:orientation val="minMax"/>
         </c:scaling>
@@ -3217,12 +3217,12 @@
             <a:endParaRPr lang="en-US"/>
           </a:p>
         </c:txPr>
-        <c:crossAx val="1587649856"/>
+        <c:crossAx val="737441024"/>
         <c:crosses val="autoZero"/>
         <c:crossBetween val="midCat"/>
       </c:valAx>
       <c:valAx>
-        <c:axId val="1587649856"/>
+        <c:axId val="737441024"/>
         <c:scaling>
           <c:orientation val="minMax"/>
         </c:scaling>
@@ -3243,7 +3243,7 @@
             <a:endParaRPr lang="en-US"/>
           </a:p>
         </c:txPr>
-        <c:crossAx val="1727393936"/>
+        <c:crossAx val="737436976"/>
         <c:crosses val="autoZero"/>
         <c:crossBetween val="midCat"/>
       </c:valAx>
@@ -3742,11 +3742,11 @@
           <c:showPercent val="0"/>
           <c:showBubbleSize val="0"/>
         </c:dLbls>
-        <c:axId val="1608149840"/>
-        <c:axId val="1591121040"/>
+        <c:axId val="737492576"/>
+        <c:axId val="679252128"/>
       </c:scatterChart>
       <c:valAx>
-        <c:axId val="1608149840"/>
+        <c:axId val="737492576"/>
         <c:scaling>
           <c:orientation val="minMax"/>
         </c:scaling>
@@ -3773,12 +3773,12 @@
             <a:endParaRPr lang="en-US"/>
           </a:p>
         </c:txPr>
-        <c:crossAx val="1591121040"/>
+        <c:crossAx val="679252128"/>
         <c:crosses val="autoZero"/>
         <c:crossBetween val="midCat"/>
       </c:valAx>
       <c:valAx>
-        <c:axId val="1591121040"/>
+        <c:axId val="679252128"/>
         <c:scaling>
           <c:orientation val="minMax"/>
         </c:scaling>
@@ -3799,7 +3799,7 @@
             <a:endParaRPr lang="en-US"/>
           </a:p>
         </c:txPr>
-        <c:crossAx val="1608149840"/>
+        <c:crossAx val="737492576"/>
         <c:crosses val="autoZero"/>
         <c:crossBetween val="midCat"/>
       </c:valAx>
@@ -3928,7 +3928,7 @@
           <a:p>
             <a:fld id="{C774A270-9CA5-4E17-9448-1389142F63AE}" type="datetimeFigureOut">
               <a:rPr lang="en-US" smtClean="0"/>
-              <a:t>1/14/17</a:t>
+              <a:t>1/15/17</a:t>
             </a:fld>
             <a:endParaRPr lang="en-US"/>
           </a:p>
@@ -4718,7 +4718,7 @@
           <a:p>
             <a:fld id="{48A87A34-81AB-432B-8DAE-1953F412C126}" type="datetimeFigureOut">
               <a:rPr lang="en-US" smtClean="0"/>
-              <a:t>1/14/17</a:t>
+              <a:t>1/15/17</a:t>
             </a:fld>
             <a:endParaRPr lang="en-US" dirty="0"/>
           </a:p>
@@ -4933,7 +4933,7 @@
             <a:fld id="{48A87A34-81AB-432B-8DAE-1953F412C126}" type="datetimeFigureOut">
               <a:rPr lang="en-US" smtClean="0"/>
               <a:pPr/>
-              <a:t>1/14/17</a:t>
+              <a:t>1/15/17</a:t>
             </a:fld>
             <a:endParaRPr lang="en-US" dirty="0"/>
           </a:p>
@@ -5285,6 +5285,31 @@
 <file path=ppt/slides/slide1.xml><?xml version="1.0" encoding="utf-8"?>
 <p:sld xmlns:a="http://schemas.openxmlformats.org/drawingml/2006/main" xmlns:r="http://schemas.openxmlformats.org/officeDocument/2006/relationships" xmlns:p="http://schemas.openxmlformats.org/presentationml/2006/main">
   <p:cSld>
+    <p:bg>
+      <p:bgPr>
+        <a:gradFill flip="none" rotWithShape="1">
+          <a:gsLst>
+            <a:gs pos="0">
+              <a:schemeClr val="bg1">
+                <a:tint val="80000"/>
+                <a:satMod val="300000"/>
+              </a:schemeClr>
+            </a:gs>
+            <a:gs pos="100000">
+              <a:schemeClr val="bg1">
+                <a:shade val="30000"/>
+                <a:satMod val="200000"/>
+              </a:schemeClr>
+            </a:gs>
+          </a:gsLst>
+          <a:path path="rect">
+            <a:fillToRect l="50000" t="50000" r="50000" b="50000"/>
+          </a:path>
+          <a:tileRect/>
+        </a:gradFill>
+        <a:effectLst/>
+      </p:bgPr>
+    </p:bg>
     <p:spTree>
       <p:nvGrpSpPr>
         <p:cNvPr id="1" name=""/>
@@ -5299,61 +5324,6 @@
           <a:chExt cx="0" cy="0"/>
         </a:xfrm>
       </p:grpSpPr>
-      <p:sp>
-        <p:nvSpPr>
-          <p:cNvPr id="34" name="Rounded Rectangle 33"/>
-          <p:cNvSpPr/>
-          <p:nvPr/>
-        </p:nvSpPr>
-        <p:spPr>
-          <a:xfrm>
-            <a:off x="26092576" y="6577472"/>
-            <a:ext cx="6490112" cy="14798000"/>
-          </a:xfrm>
-          <a:prstGeom prst="roundRect">
-            <a:avLst/>
-          </a:prstGeom>
-          <a:solidFill>
-            <a:schemeClr val="bg1"/>
-          </a:solidFill>
-          <a:ln>
-            <a:solidFill>
-              <a:schemeClr val="bg1"/>
-            </a:solidFill>
-          </a:ln>
-          <a:effectLst>
-            <a:outerShdw blurRad="50800" dist="38100" dir="2700000" algn="tl" rotWithShape="0">
-              <a:prstClr val="black">
-                <a:alpha val="40000"/>
-              </a:prstClr>
-            </a:outerShdw>
-          </a:effectLst>
-        </p:spPr>
-        <p:style>
-          <a:lnRef idx="2">
-            <a:schemeClr val="accent1">
-              <a:shade val="50000"/>
-            </a:schemeClr>
-          </a:lnRef>
-          <a:fillRef idx="1">
-            <a:schemeClr val="accent1"/>
-          </a:fillRef>
-          <a:effectRef idx="0">
-            <a:schemeClr val="accent1"/>
-          </a:effectRef>
-          <a:fontRef idx="minor">
-            <a:schemeClr val="lt1"/>
-          </a:fontRef>
-        </p:style>
-        <p:txBody>
-          <a:bodyPr rtlCol="0" anchor="ctr"/>
-          <a:lstStyle/>
-          <a:p>
-            <a:pPr algn="ctr"/>
-            <a:endParaRPr lang="en-US"/>
-          </a:p>
-        </p:txBody>
-      </p:sp>
       <p:sp>
         <p:nvSpPr>
           <p:cNvPr id="20" name="Rounded Rectangle 19"/>
@@ -5421,7 +5391,7 @@
         </p:nvSpPr>
         <p:spPr>
           <a:xfrm>
-            <a:off x="2275307" y="64577"/>
+            <a:off x="2228869" y="66329"/>
             <a:ext cx="29447301" cy="2932623"/>
           </a:xfrm>
         </p:spPr>
@@ -6117,18 +6087,17 @@
       </p:sp>
       <p:grpSp>
         <p:nvGrpSpPr>
-          <p:cNvPr id="27" name="Group 26"/>
+          <p:cNvPr id="26" name="Group 25"/>
           <p:cNvGrpSpPr/>
           <p:nvPr/>
         </p:nvGrpSpPr>
         <p:grpSpPr>
           <a:xfrm>
-            <a:off x="9505122" y="2931160"/>
-            <a:ext cx="15793906" cy="8055943"/>
-            <a:chOff x="9316976" y="2837351"/>
-            <a:chExt cx="15793906" cy="7546944"/>
+            <a:off x="9329165" y="2826013"/>
+            <a:ext cx="16457678" cy="8008640"/>
+            <a:chOff x="9378757" y="2679816"/>
+            <a:chExt cx="16457678" cy="8008640"/>
           </a:xfrm>
-          <a:effectLst/>
         </p:grpSpPr>
         <p:sp>
           <p:nvSpPr>
@@ -6138,8 +6107,8 @@
           </p:nvSpPr>
           <p:spPr>
             <a:xfrm>
-              <a:off x="9316976" y="2837351"/>
-              <a:ext cx="15793906" cy="6996731"/>
+              <a:off x="9378757" y="2679816"/>
+              <a:ext cx="16457678" cy="8008640"/>
             </a:xfrm>
             <a:prstGeom prst="roundRect">
               <a:avLst/>
@@ -6192,8 +6161,8 @@
           </p:nvSpPr>
           <p:spPr>
             <a:xfrm>
-              <a:off x="9515262" y="2930063"/>
-              <a:ext cx="15465853" cy="7454232"/>
+              <a:off x="9586552" y="2871818"/>
+              <a:ext cx="16157867" cy="7425273"/>
             </a:xfrm>
             <a:prstGeom prst="rect">
               <a:avLst/>
@@ -6402,13 +6371,7 @@
                 <a:rPr lang="en-US" sz="2400" dirty="0" smtClean="0">
                   <a:cs typeface="Century Gothic"/>
                 </a:rPr>
-                <a:t>e </a:t>
-              </a:r>
-              <a:r>
-                <a:rPr lang="en-US" sz="2400" dirty="0" smtClean="0">
-                  <a:cs typeface="Century Gothic"/>
-                </a:rPr>
-                <a:t>all get sick. </a:t>
+                <a:t>e all get sick. </a:t>
               </a:r>
               <a:r>
                 <a:rPr lang="en-US" sz="2400" dirty="0">
@@ -6420,47 +6383,13 @@
                 <a:rPr lang="en-US" sz="2400" dirty="0" smtClean="0">
                   <a:cs typeface="Century Gothic"/>
                 </a:rPr>
-                <a:t>hat </a:t>
-              </a:r>
-              <a:r>
-                <a:rPr lang="en-US" sz="2400" dirty="0" smtClean="0">
-                  <a:cs typeface="Century Gothic"/>
-                </a:rPr>
-                <a:t>defends us from invading </a:t>
-              </a:r>
-              <a:r>
-                <a:rPr lang="en-US" sz="2400" dirty="0" smtClean="0">
-                  <a:cs typeface="Century Gothic"/>
-                </a:rPr>
-                <a:t>pathogens like bacteria </a:t>
-              </a:r>
-              <a:r>
-                <a:rPr lang="en-US" sz="2400" dirty="0" smtClean="0">
-                  <a:cs typeface="Century Gothic"/>
-                </a:rPr>
-                <a:t>and viruses? </a:t>
-              </a:r>
-              <a:endParaRPr lang="en-US" sz="2400" dirty="0" smtClean="0">
-                <a:cs typeface="Century Gothic"/>
-              </a:endParaRPr>
-            </a:p>
-            <a:p>
-              <a:pPr algn="ctr">
-                <a:lnSpc>
-                  <a:spcPct val="100000"/>
-                </a:lnSpc>
-              </a:pPr>
-              <a:r>
-                <a:rPr lang="en-US" sz="2400" b="1" dirty="0" smtClean="0">
-                  <a:cs typeface="Century Gothic"/>
-                </a:rPr>
-                <a:t>O</a:t>
+                <a:t>hat defends us from invading pathogens like bacteria and viruses? </a:t>
               </a:r>
               <a:r>
                 <a:rPr lang="en-US" sz="2400" b="1" dirty="0" smtClean="0">
                   <a:cs typeface="Century Gothic"/>
                 </a:rPr>
-                <a:t>ur </a:t>
+                <a:t>Our </a:t>
               </a:r>
               <a:r>
                 <a:rPr lang="en-US" sz="2400" b="1" dirty="0" smtClean="0">
@@ -6482,31 +6411,7 @@
                 <a:rPr lang="en-US" sz="2400" dirty="0" smtClean="0">
                   <a:cs typeface="Century Gothic"/>
                 </a:rPr>
-                <a:t>Our immune system </a:t>
-              </a:r>
-              <a:r>
-                <a:rPr lang="en-US" sz="2400" dirty="0" smtClean="0">
-                  <a:cs typeface="Century Gothic"/>
-                </a:rPr>
-                <a:t>has many kinds of white </a:t>
-              </a:r>
-              <a:r>
-                <a:rPr lang="en-US" sz="2400" dirty="0" smtClean="0">
-                  <a:cs typeface="Century Gothic"/>
-                </a:rPr>
-                <a:t>blood </a:t>
-              </a:r>
-              <a:r>
-                <a:rPr lang="en-US" sz="2400" dirty="0" smtClean="0">
-                  <a:cs typeface="Century Gothic"/>
-                </a:rPr>
-                <a:t>cells. </a:t>
-              </a:r>
-              <a:r>
-                <a:rPr lang="en-US" sz="2400" dirty="0" smtClean="0">
-                  <a:cs typeface="Century Gothic"/>
-                </a:rPr>
-                <a:t>These cells each have an important role in killing pathogens. </a:t>
+                <a:t>Our immune system has many kinds of white blood cells. These cells each have an important role in killing pathogens. </a:t>
               </a:r>
             </a:p>
             <a:p>
@@ -6524,13 +6429,7 @@
                 <a:rPr lang="en-US" sz="2400" b="1" dirty="0" smtClean="0">
                   <a:cs typeface="Century Gothic"/>
                 </a:rPr>
-                <a:t>Dendritic </a:t>
-              </a:r>
-              <a:r>
-                <a:rPr lang="en-US" sz="2400" b="1" dirty="0" smtClean="0">
-                  <a:cs typeface="Century Gothic"/>
-                </a:rPr>
-                <a:t>cells </a:t>
+                <a:t>Dendritic cells </a:t>
               </a:r>
               <a:r>
                 <a:rPr lang="en-US" sz="2400" dirty="0" smtClean="0">
@@ -6560,13 +6459,7 @@
                 <a:rPr lang="en-US" sz="2400" b="1" dirty="0" smtClean="0">
                   <a:cs typeface="Century Gothic"/>
                 </a:rPr>
-                <a:t>elper-T </a:t>
-              </a:r>
-              <a:r>
-                <a:rPr lang="en-US" sz="2400" b="1" dirty="0" smtClean="0">
-                  <a:cs typeface="Century Gothic"/>
-                </a:rPr>
-                <a:t>cells </a:t>
+                <a:t>elper-T cells </a:t>
               </a:r>
               <a:r>
                 <a:rPr lang="en-US" sz="2400" dirty="0" smtClean="0">
@@ -6596,43 +6489,7 @@
                 <a:rPr lang="en-US" sz="2400" dirty="0" smtClean="0">
                   <a:cs typeface="Century Gothic"/>
                 </a:rPr>
-                <a:t> </a:t>
-              </a:r>
-              <a:r>
-                <a:rPr lang="en-US" sz="2400" dirty="0" smtClean="0">
-                  <a:cs typeface="Century Gothic"/>
-                </a:rPr>
-                <a:t>use the parts to create </a:t>
-              </a:r>
-              <a:r>
-                <a:rPr lang="en-US" sz="2400" dirty="0" smtClean="0">
-                  <a:cs typeface="Century Gothic"/>
-                </a:rPr>
-                <a:t>proteins called </a:t>
-              </a:r>
-              <a:r>
-                <a:rPr lang="en-US" sz="2400" dirty="0" smtClean="0">
-                  <a:cs typeface="Century Gothic"/>
-                </a:rPr>
-                <a:t>antibodies </a:t>
-              </a:r>
-              <a:r>
-                <a:rPr lang="en-US" sz="2400" dirty="0" smtClean="0">
-                  <a:cs typeface="Century Gothic"/>
-                </a:rPr>
-                <a:t>which stick to the </a:t>
-              </a:r>
-              <a:r>
-                <a:rPr lang="en-US" sz="2400" dirty="0" smtClean="0">
-                  <a:cs typeface="Century Gothic"/>
-                </a:rPr>
-                <a:t>specific </a:t>
-              </a:r>
-              <a:r>
-                <a:rPr lang="en-US" sz="2400" dirty="0" smtClean="0">
-                  <a:cs typeface="Century Gothic"/>
-                </a:rPr>
-                <a:t>type of pathogen. </a:t>
+                <a:t> use the parts to create proteins called antibodies which stick to the specific type of pathogen. </a:t>
               </a:r>
             </a:p>
             <a:p>
@@ -6656,17 +6513,8 @@
                 <a:rPr lang="en-US" sz="2400" dirty="0" smtClean="0">
                   <a:cs typeface="Century Gothic"/>
                 </a:rPr>
-                <a:t> migrate to the pathogens with antibodies and swallow them, killing them instantly. They can only kill viruses flagged with antibodies, but they can kill bacteria without needing an </a:t>
+                <a:t> migrate to the pathogens with antibodies and swallow them, killing them instantly. They can only kill viruses flagged with antibodies, but they can kill bacteria without needing an antibody. </a:t>
               </a:r>
-              <a:r>
-                <a:rPr lang="en-US" sz="2400" dirty="0" smtClean="0">
-                  <a:cs typeface="Century Gothic"/>
-                </a:rPr>
-                <a:t>antibody. </a:t>
-              </a:r>
-              <a:endParaRPr lang="en-US" sz="2400" dirty="0" smtClean="0">
-                <a:cs typeface="Century Gothic"/>
-              </a:endParaRPr>
             </a:p>
             <a:p>
               <a:pPr marL="342900" indent="-342900">
@@ -6695,17 +6543,8 @@
                 <a:rPr lang="en-US" sz="2400" dirty="0" smtClean="0">
                   <a:cs typeface="Century Gothic"/>
                 </a:rPr>
-                <a:t>kill infected cells. Since viruses reproduce inside cells, they can also be killed inside them</a:t>
+                <a:t>kill infected cells. Since viruses reproduce inside cells, they can also be killed inside them.</a:t>
               </a:r>
-              <a:r>
-                <a:rPr lang="en-US" sz="2400" dirty="0" smtClean="0">
-                  <a:cs typeface="Century Gothic"/>
-                </a:rPr>
-                <a:t>.</a:t>
-              </a:r>
-              <a:endParaRPr lang="en-US" sz="2400" dirty="0" smtClean="0">
-                <a:cs typeface="Century Gothic"/>
-              </a:endParaRPr>
             </a:p>
             <a:p>
               <a:pPr algn="ctr">
@@ -6730,7 +6569,19 @@
                 <a:rPr lang="en-US" sz="2400" dirty="0" smtClean="0">
                   <a:cs typeface="Century Gothic"/>
                 </a:rPr>
-                <a:t>My objective is to simulate the immune system and different pathogenic infections so we can better understand how our immune system works</a:t>
+                <a:t>To </a:t>
+              </a:r>
+              <a:r>
+                <a:rPr lang="en-US" sz="2400" dirty="0" smtClean="0">
+                  <a:cs typeface="Century Gothic"/>
+                </a:rPr>
+                <a:t>simulate </a:t>
+              </a:r>
+              <a:r>
+                <a:rPr lang="en-US" sz="2400" dirty="0" smtClean="0">
+                  <a:cs typeface="Century Gothic"/>
+                </a:rPr>
+                <a:t>the immune system and different pathogenic infections so we can better understand how our immune system works</a:t>
               </a:r>
               <a:r>
                 <a:rPr lang="en-US" sz="2000" dirty="0" smtClean="0">
@@ -6738,7 +6589,33 @@
                 </a:rPr>
                 <a:t>.</a:t>
               </a:r>
-              <a:endParaRPr lang="en-US" sz="7200" dirty="0" smtClean="0">
+            </a:p>
+            <a:p>
+              <a:pPr algn="ctr">
+                <a:spcBef>
+                  <a:spcPts val="2067"/>
+                </a:spcBef>
+              </a:pPr>
+              <a:r>
+                <a:rPr lang="en-US" sz="2800" b="1" dirty="0" smtClean="0">
+                  <a:cs typeface="Century Gothic"/>
+                </a:rPr>
+                <a:t>Conclusion</a:t>
+              </a:r>
+            </a:p>
+            <a:p>
+              <a:pPr algn="ctr">
+                <a:spcBef>
+                  <a:spcPts val="2067"/>
+                </a:spcBef>
+              </a:pPr>
+              <a:r>
+                <a:rPr lang="en-US" sz="2400" dirty="0" smtClean="0">
+                  <a:cs typeface="Century Gothic"/>
+                </a:rPr>
+                <a:t>The simulation reflected aspects of the immune system effectively, based on known behaviors of the immune system.</a:t>
+              </a:r>
+              <a:endParaRPr lang="en-US" sz="2400" dirty="0" smtClean="0">
                 <a:cs typeface="Century Gothic"/>
               </a:endParaRPr>
             </a:p>
@@ -7375,12 +7252,6 @@
               </a:rPr>
               <a:t>Viral Infections</a:t>
             </a:r>
-            <a:endParaRPr lang="en-US" sz="2800" b="1" dirty="0" smtClean="0">
-              <a:solidFill>
-                <a:schemeClr val="tx1"/>
-              </a:solidFill>
-              <a:cs typeface="Century Gothic"/>
-            </a:endParaRPr>
           </a:p>
           <a:p>
             <a:r>
@@ -7401,12 +7272,6 @@
               </a:rPr>
               <a:t>: Infecting 100 body cells with no immune system</a:t>
             </a:r>
-            <a:endParaRPr lang="en-US" sz="2400" dirty="0" smtClean="0">
-              <a:solidFill>
-                <a:schemeClr val="tx1"/>
-              </a:solidFill>
-              <a:cs typeface="Century Gothic"/>
-            </a:endParaRPr>
           </a:p>
           <a:p>
             <a:endParaRPr lang="en-US" sz="2400" dirty="0">
@@ -7529,109 +7394,6 @@
           </a:p>
         </p:txBody>
       </p:sp>
-      <p:sp>
-        <p:nvSpPr>
-          <p:cNvPr id="15" name="TextBox 14"/>
-          <p:cNvSpPr txBox="1"/>
-          <p:nvPr/>
-        </p:nvSpPr>
-        <p:spPr>
-          <a:xfrm>
-            <a:off x="26397787" y="6962233"/>
-            <a:ext cx="6146800" cy="1692771"/>
-          </a:xfrm>
-          <a:prstGeom prst="rect">
-            <a:avLst/>
-          </a:prstGeom>
-          <a:noFill/>
-        </p:spPr>
-        <p:txBody>
-          <a:bodyPr wrap="square" rtlCol="0">
-            <a:spAutoFit/>
-          </a:bodyPr>
-          <a:lstStyle/>
-          <a:p>
-            <a:pPr algn="ctr"/>
-            <a:r>
-              <a:rPr lang="en-US" sz="2800" b="1" dirty="0" smtClean="0">
-                <a:ea typeface="Century Gothic" charset="0"/>
-                <a:cs typeface="Century Gothic" charset="0"/>
-              </a:rPr>
-              <a:t>Bacterial Infections</a:t>
-            </a:r>
-          </a:p>
-          <a:p>
-            <a:pPr algn="ctr"/>
-            <a:endParaRPr lang="en-US" sz="2800" b="1" dirty="0" smtClean="0">
-              <a:ea typeface="Century Gothic" charset="0"/>
-              <a:cs typeface="Century Gothic" charset="0"/>
-            </a:endParaRPr>
-          </a:p>
-          <a:p>
-            <a:r>
-              <a:rPr lang="en-US" sz="2400" b="1" dirty="0" smtClean="0">
-                <a:ea typeface="Century Gothic" charset="0"/>
-                <a:cs typeface="Century Gothic" charset="0"/>
-              </a:rPr>
-              <a:t>Experiment 4:</a:t>
-            </a:r>
-            <a:r>
-              <a:rPr lang="en-US" sz="2400" dirty="0" smtClean="0">
-                <a:ea typeface="Century Gothic" charset="0"/>
-                <a:cs typeface="Century Gothic" charset="0"/>
-              </a:rPr>
-              <a:t> Killing 10 body cells with bacteria.</a:t>
-            </a:r>
-            <a:endParaRPr lang="en-US" sz="2400" dirty="0">
-              <a:ea typeface="Century Gothic" charset="0"/>
-              <a:cs typeface="Century Gothic" charset="0"/>
-            </a:endParaRPr>
-          </a:p>
-        </p:txBody>
-      </p:sp>
-      <p:sp>
-        <p:nvSpPr>
-          <p:cNvPr id="18" name="TextBox 17"/>
-          <p:cNvSpPr txBox="1"/>
-          <p:nvPr/>
-        </p:nvSpPr>
-        <p:spPr>
-          <a:xfrm>
-            <a:off x="26727803" y="13320318"/>
-            <a:ext cx="5486767" cy="830997"/>
-          </a:xfrm>
-          <a:prstGeom prst="rect">
-            <a:avLst/>
-          </a:prstGeom>
-          <a:noFill/>
-        </p:spPr>
-        <p:txBody>
-          <a:bodyPr wrap="square" rtlCol="0">
-            <a:spAutoFit/>
-          </a:bodyPr>
-          <a:lstStyle/>
-          <a:p>
-            <a:r>
-              <a:rPr lang="en-US" sz="2400" b="1" dirty="0" smtClean="0">
-                <a:ea typeface="Century Gothic" charset="0"/>
-                <a:cs typeface="Century Gothic" charset="0"/>
-              </a:rPr>
-              <a:t>Experiment 5: </a:t>
-            </a:r>
-            <a:r>
-              <a:rPr lang="en-US" sz="2400" dirty="0" smtClean="0">
-                <a:ea typeface="Century Gothic" charset="0"/>
-                <a:cs typeface="Century Gothic" charset="0"/>
-              </a:rPr>
-              <a:t>Killing 10 body cells with 10 macrophages for protection. </a:t>
-            </a:r>
-            <a:endParaRPr lang="en-US" sz="2400" dirty="0">
-              <a:ea typeface="Century Gothic" charset="0"/>
-              <a:cs typeface="Century Gothic" charset="0"/>
-            </a:endParaRPr>
-          </a:p>
-        </p:txBody>
-      </p:sp>
       <p:pic>
         <p:nvPicPr>
           <p:cNvPr id="21" name="Picture 20" descr="Beginning_infection.tiff"/>
@@ -7653,7 +7415,7 @@
         </p:blipFill>
         <p:spPr>
           <a:xfrm>
-            <a:off x="9517422" y="11344960"/>
+            <a:off x="9517422" y="11624662"/>
             <a:ext cx="5470866" cy="3519244"/>
           </a:xfrm>
           <a:prstGeom prst="roundRect">
@@ -7695,7 +7457,7 @@
         </p:blipFill>
         <p:spPr>
           <a:xfrm>
-            <a:off x="15057984" y="11350072"/>
+            <a:off x="15057984" y="11629774"/>
             <a:ext cx="5470866" cy="3519244"/>
           </a:xfrm>
           <a:prstGeom prst="roundRect">
@@ -7737,7 +7499,7 @@
         </p:blipFill>
         <p:spPr>
           <a:xfrm>
-            <a:off x="20598546" y="11344960"/>
+            <a:off x="20598546" y="11624662"/>
             <a:ext cx="5307584" cy="3519244"/>
           </a:xfrm>
           <a:prstGeom prst="roundRect">
@@ -7790,12 +7552,6 @@
               </a:rPr>
               <a:t>Hypothesis</a:t>
             </a:r>
-            <a:endParaRPr lang="en-US" sz="2800" b="1" dirty="0" smtClean="0">
-              <a:solidFill>
-                <a:schemeClr val="tx1"/>
-              </a:solidFill>
-              <a:cs typeface="Century Gothic"/>
-            </a:endParaRPr>
           </a:p>
           <a:p>
             <a:pPr algn="ctr"/>
@@ -7815,34 +7571,7 @@
                 </a:solidFill>
                 <a:cs typeface="Century Gothic"/>
               </a:rPr>
-              <a:t>A realistic immune system simulator </a:t>
-            </a:r>
-            <a:r>
-              <a:rPr lang="en-US" sz="2400" dirty="0" smtClean="0">
-                <a:solidFill>
-                  <a:schemeClr val="tx1"/>
-                </a:solidFill>
-                <a:cs typeface="Century Gothic"/>
-              </a:rPr>
-              <a:t>can </a:t>
-            </a:r>
-            <a:r>
-              <a:rPr lang="en-US" sz="2400" dirty="0" smtClean="0">
-                <a:solidFill>
-                  <a:schemeClr val="tx1"/>
-                </a:solidFill>
-                <a:cs typeface="Century Gothic"/>
-              </a:rPr>
-              <a:t>be built using Processing (a </a:t>
-            </a:r>
-            <a:r>
-              <a:rPr lang="en-US" sz="2400" dirty="0" smtClean="0">
-                <a:solidFill>
-                  <a:schemeClr val="tx1"/>
-                </a:solidFill>
-                <a:cs typeface="Century Gothic"/>
-              </a:rPr>
-              <a:t>Java-based visualization language).</a:t>
+              <a:t>A realistic immune system simulator can be built using Processing (a Java-based visualization language).</a:t>
             </a:r>
             <a:endParaRPr lang="en-US" sz="2400" dirty="0">
               <a:solidFill>
@@ -8037,23 +7766,8 @@
                 </a:solidFill>
                 <a:cs typeface="Century Gothic"/>
               </a:rPr>
-              <a:t>Materials and </a:t>
+              <a:t>Materials and Methods</a:t>
             </a:r>
-            <a:r>
-              <a:rPr lang="en-US" sz="2800" b="1" dirty="0" smtClean="0">
-                <a:solidFill>
-                  <a:schemeClr val="tx1"/>
-                </a:solidFill>
-                <a:cs typeface="Century Gothic"/>
-              </a:rPr>
-              <a:t>Methods</a:t>
-            </a:r>
-            <a:endParaRPr lang="en-US" sz="2800" b="1" dirty="0" smtClean="0">
-              <a:solidFill>
-                <a:schemeClr val="tx1"/>
-              </a:solidFill>
-              <a:cs typeface="Century Gothic"/>
-            </a:endParaRPr>
           </a:p>
           <a:p>
             <a:pPr marL="342900" indent="-342900" algn="l">
@@ -8127,41 +7841,8 @@
                 </a:solidFill>
                 <a:cs typeface="Century Gothic"/>
               </a:rPr>
-              <a:t>under </a:t>
+              <a:t>under many different settings to make sure all the components worked. </a:t>
             </a:r>
-            <a:r>
-              <a:rPr lang="en-US" sz="2400" dirty="0" smtClean="0">
-                <a:solidFill>
-                  <a:schemeClr val="tx1"/>
-                </a:solidFill>
-                <a:cs typeface="Century Gothic"/>
-              </a:rPr>
-              <a:t>many different </a:t>
-            </a:r>
-            <a:r>
-              <a:rPr lang="en-US" sz="2400" dirty="0" smtClean="0">
-                <a:solidFill>
-                  <a:schemeClr val="tx1"/>
-                </a:solidFill>
-                <a:cs typeface="Century Gothic"/>
-              </a:rPr>
-              <a:t>settings to </a:t>
-            </a:r>
-            <a:r>
-              <a:rPr lang="en-US" sz="2400" dirty="0" smtClean="0">
-                <a:solidFill>
-                  <a:schemeClr val="tx1"/>
-                </a:solidFill>
-                <a:cs typeface="Century Gothic"/>
-              </a:rPr>
-              <a:t>make sure all the components worked. </a:t>
-            </a:r>
-            <a:endParaRPr lang="en-US" sz="2400" dirty="0" smtClean="0">
-              <a:solidFill>
-                <a:schemeClr val="tx1"/>
-              </a:solidFill>
-              <a:cs typeface="Century Gothic"/>
-            </a:endParaRPr>
           </a:p>
           <a:p>
             <a:pPr marL="342900" indent="-342900" algn="l">
@@ -8175,34 +7856,7 @@
                 </a:solidFill>
                 <a:cs typeface="Century Gothic"/>
               </a:rPr>
-              <a:t>The </a:t>
-            </a:r>
-            <a:r>
-              <a:rPr lang="en-US" sz="2400" dirty="0" smtClean="0">
-                <a:solidFill>
-                  <a:schemeClr val="tx1"/>
-                </a:solidFill>
-                <a:cs typeface="Century Gothic"/>
-              </a:rPr>
-              <a:t>program recorded data (number of body cells, number of </a:t>
-            </a:r>
-            <a:r>
-              <a:rPr lang="en-US" sz="2400" dirty="0" smtClean="0">
-                <a:solidFill>
-                  <a:schemeClr val="tx1"/>
-                </a:solidFill>
-                <a:cs typeface="Century Gothic"/>
-              </a:rPr>
-              <a:t>viruses</a:t>
-            </a:r>
-            <a:r>
-              <a:rPr lang="en-US" sz="2400" dirty="0" smtClean="0">
-                <a:solidFill>
-                  <a:schemeClr val="tx1"/>
-                </a:solidFill>
-                <a:cs typeface="Century Gothic"/>
-              </a:rPr>
-              <a:t>, and number of bacteria during each infection) </a:t>
+              <a:t>The program recorded data (number of body cells, number of viruses, and number of bacteria during each infection) </a:t>
             </a:r>
             <a:endParaRPr lang="en-US" sz="2400" dirty="0">
               <a:solidFill>
@@ -8223,17 +7877,38 @@
                 </a:solidFill>
                 <a:cs typeface="Century Gothic"/>
               </a:rPr>
-              <a:t>I </a:t>
+              <a:t>I analyzed the data using Microsoft Excel.</a:t>
             </a:r>
-            <a:r>
-              <a:rPr lang="en-US" sz="2400" dirty="0" smtClean="0">
-                <a:solidFill>
-                  <a:schemeClr val="tx1"/>
-                </a:solidFill>
-                <a:cs typeface="Century Gothic"/>
-              </a:rPr>
-              <a:t>analyzed the data using Microsoft Excel.</a:t>
-            </a:r>
+          </a:p>
+        </p:txBody>
+      </p:sp>
+      <p:sp>
+        <p:nvSpPr>
+          <p:cNvPr id="13" name="TextBox 12"/>
+          <p:cNvSpPr txBox="1"/>
+          <p:nvPr/>
+        </p:nvSpPr>
+        <p:spPr>
+          <a:xfrm>
+            <a:off x="28868852" y="1180719"/>
+            <a:ext cx="4360316" cy="400110"/>
+          </a:xfrm>
+          <a:prstGeom prst="rect">
+            <a:avLst/>
+          </a:prstGeom>
+          <a:noFill/>
+        </p:spPr>
+        <p:txBody>
+          <a:bodyPr wrap="square" rtlCol="0">
+            <a:spAutoFit/>
+          </a:bodyPr>
+          <a:lstStyle/>
+          <a:p>
+            <a:endParaRPr lang="en-US" sz="2000" dirty="0">
+              <a:latin typeface="Century Gothic" charset="0"/>
+              <a:ea typeface="Century Gothic" charset="0"/>
+              <a:cs typeface="Century Gothic" charset="0"/>
+            </a:endParaRPr>
           </a:p>
         </p:txBody>
       </p:sp>
@@ -8245,8 +7920,8 @@
         </p:nvSpPr>
         <p:spPr>
           <a:xfrm>
-            <a:off x="26092575" y="2904065"/>
-            <a:ext cx="6490111" cy="3411454"/>
+            <a:off x="26112766" y="2696971"/>
+            <a:ext cx="6381385" cy="6147006"/>
           </a:xfrm>
           <a:prstGeom prst="roundRect">
             <a:avLst/>
@@ -8295,14 +7970,14 @@
       </p:sp>
       <p:sp>
         <p:nvSpPr>
-          <p:cNvPr id="13" name="TextBox 12"/>
+          <p:cNvPr id="16" name="TextBox 15"/>
           <p:cNvSpPr txBox="1"/>
           <p:nvPr/>
         </p:nvSpPr>
         <p:spPr>
           <a:xfrm>
-            <a:off x="28868852" y="1180719"/>
-            <a:ext cx="4360316" cy="400110"/>
+            <a:off x="26265757" y="3631462"/>
+            <a:ext cx="6070599" cy="4216539"/>
           </a:xfrm>
           <a:prstGeom prst="rect">
             <a:avLst/>
@@ -8315,47 +7990,119 @@
           </a:bodyPr>
           <a:lstStyle/>
           <a:p>
-            <a:endParaRPr lang="en-US" sz="2000" dirty="0">
-              <a:latin typeface="Century Gothic" charset="0"/>
-              <a:ea typeface="Century Gothic" charset="0"/>
-              <a:cs typeface="Century Gothic" charset="0"/>
-            </a:endParaRPr>
-          </a:p>
-        </p:txBody>
-      </p:sp>
-      <p:sp>
-        <p:nvSpPr>
-          <p:cNvPr id="16" name="TextBox 15"/>
-          <p:cNvSpPr txBox="1"/>
-          <p:nvPr/>
-        </p:nvSpPr>
-        <p:spPr>
-          <a:xfrm>
-            <a:off x="27078188" y="1464083"/>
-            <a:ext cx="4360316" cy="461665"/>
-          </a:xfrm>
-          <a:prstGeom prst="rect">
-            <a:avLst/>
-          </a:prstGeom>
-          <a:noFill/>
-        </p:spPr>
-        <p:txBody>
-          <a:bodyPr wrap="square" rtlCol="0">
-            <a:spAutoFit/>
-          </a:bodyPr>
-          <a:lstStyle/>
-          <a:p>
             <a:pPr algn="ctr"/>
             <a:r>
-              <a:rPr lang="en-US" sz="2400" dirty="0" smtClean="0">
-                <a:latin typeface="Century Gothic" charset="0"/>
+              <a:rPr lang="en-US" sz="2800" b="1" dirty="0" smtClean="0">
                 <a:ea typeface="Century Gothic" charset="0"/>
                 <a:cs typeface="Century Gothic" charset="0"/>
               </a:rPr>
               <a:t>Sources</a:t>
             </a:r>
+          </a:p>
+          <a:p>
+            <a:pPr marL="342900" indent="-342900">
+              <a:buFont typeface="Arial" charset="0"/>
+              <a:buChar char="•"/>
+            </a:pPr>
+            <a:r>
+              <a:rPr lang="en-US" sz="2400" dirty="0">
+                <a:ea typeface="Century Gothic" charset="0"/>
+                <a:cs typeface="Century Gothic" charset="0"/>
+                <a:hlinkClick r:id="rId6"/>
+              </a:rPr>
+              <a:t>http://www.diabetes.co.uk</a:t>
+            </a:r>
+            <a:r>
+              <a:rPr lang="en-US" sz="2400" dirty="0" smtClean="0">
+                <a:ea typeface="Century Gothic" charset="0"/>
+                <a:cs typeface="Century Gothic" charset="0"/>
+                <a:hlinkClick r:id="rId6"/>
+              </a:rPr>
+              <a:t>/</a:t>
+            </a:r>
+            <a:endParaRPr lang="en-US" sz="2400" dirty="0" smtClean="0">
+              <a:ea typeface="Century Gothic" charset="0"/>
+              <a:cs typeface="Century Gothic" charset="0"/>
+            </a:endParaRPr>
+          </a:p>
+          <a:p>
+            <a:pPr marL="342900" indent="-342900">
+              <a:buFont typeface="Arial" charset="0"/>
+              <a:buChar char="•"/>
+            </a:pPr>
+            <a:r>
+              <a:rPr lang="en-US" sz="2400" u="sng" dirty="0" smtClean="0">
+                <a:ea typeface="Century Gothic" charset="0"/>
+                <a:cs typeface="Century Gothic" charset="0"/>
+              </a:rPr>
+              <a:t>Your Amazing Immune System: How it Protects Your Body, compiled by the Japanese Society for Immunology. Wiley-Blackwell 2009. pp. 1-71</a:t>
+            </a:r>
+          </a:p>
+          <a:p>
+            <a:pPr marL="342900" indent="-342900">
+              <a:buFont typeface="Arial" charset="0"/>
+              <a:buChar char="•"/>
+            </a:pPr>
+            <a:r>
+              <a:rPr lang="en-US" sz="2400" u="sng" dirty="0" err="1" smtClean="0">
+                <a:ea typeface="Century Gothic" charset="0"/>
+                <a:cs typeface="Century Gothic" charset="0"/>
+              </a:rPr>
+              <a:t>Burillo-Kirch</a:t>
+            </a:r>
+            <a:r>
+              <a:rPr lang="en-US" sz="2400" u="sng" dirty="0" smtClean="0">
+                <a:ea typeface="Century Gothic" charset="0"/>
+                <a:cs typeface="Century Gothic" charset="0"/>
+              </a:rPr>
+              <a:t>, C, Microbes: Discover an Unseen World. Nomad Press 2015, pp 1-114</a:t>
+            </a:r>
+          </a:p>
+          <a:p>
+            <a:pPr algn="ctr"/>
+            <a:endParaRPr lang="en-US" sz="2400" dirty="0" smtClean="0">
+              <a:ea typeface="Century Gothic" charset="0"/>
+              <a:cs typeface="Century Gothic" charset="0"/>
+            </a:endParaRPr>
+          </a:p>
+          <a:p>
+            <a:pPr algn="ctr"/>
+            <a:r>
+              <a:rPr lang="en-US" sz="2400" dirty="0" smtClean="0">
+                <a:ea typeface="Century Gothic" charset="0"/>
+                <a:cs typeface="Century Gothic" charset="0"/>
+              </a:rPr>
+              <a:t>Special Thanks to Dr. </a:t>
+            </a:r>
+            <a:r>
+              <a:rPr lang="en-US" sz="2400" dirty="0" err="1" smtClean="0">
+                <a:ea typeface="Century Gothic" charset="0"/>
+                <a:cs typeface="Century Gothic" charset="0"/>
+              </a:rPr>
+              <a:t>Loida</a:t>
+            </a:r>
+            <a:r>
+              <a:rPr lang="en-US" sz="2400" dirty="0" smtClean="0">
+                <a:ea typeface="Century Gothic" charset="0"/>
+                <a:cs typeface="Century Gothic" charset="0"/>
+              </a:rPr>
+              <a:t> </a:t>
+            </a:r>
+            <a:r>
+              <a:rPr lang="en-US" sz="2400" dirty="0" err="1" smtClean="0">
+                <a:ea typeface="Century Gothic" charset="0"/>
+                <a:cs typeface="Century Gothic" charset="0"/>
+              </a:rPr>
+              <a:t>Viera</a:t>
+            </a:r>
+            <a:r>
+              <a:rPr lang="en-US" sz="2400" dirty="0" smtClean="0">
+                <a:ea typeface="Century Gothic" charset="0"/>
+                <a:cs typeface="Century Gothic" charset="0"/>
+              </a:rPr>
+              <a:t>-Hutchins, Pediatric Immunology, University of Utah</a:t>
+            </a:r>
             <a:endParaRPr lang="en-US" sz="2400" dirty="0">
-              <a:latin typeface="Century Gothic" charset="0"/>
               <a:ea typeface="Century Gothic" charset="0"/>
               <a:cs typeface="Century Gothic" charset="0"/>
             </a:endParaRPr>
@@ -8382,7 +8129,7 @@
         </p:xfrm>
         <a:graphic>
           <a:graphicData uri="http://schemas.openxmlformats.org/drawingml/2006/chart">
-            <c:chart xmlns:c="http://schemas.openxmlformats.org/drawingml/2006/chart" xmlns:r="http://schemas.openxmlformats.org/officeDocument/2006/relationships" r:id="rId6"/>
+            <c:chart xmlns:c="http://schemas.openxmlformats.org/drawingml/2006/chart" xmlns:r="http://schemas.openxmlformats.org/officeDocument/2006/relationships" r:id="rId7"/>
           </a:graphicData>
         </a:graphic>
       </p:graphicFrame>
@@ -8406,7 +8153,7 @@
         </p:xfrm>
         <a:graphic>
           <a:graphicData uri="http://schemas.openxmlformats.org/drawingml/2006/chart">
-            <c:chart xmlns:c="http://schemas.openxmlformats.org/drawingml/2006/chart" xmlns:r="http://schemas.openxmlformats.org/officeDocument/2006/relationships" r:id="rId7"/>
+            <c:chart xmlns:c="http://schemas.openxmlformats.org/drawingml/2006/chart" xmlns:r="http://schemas.openxmlformats.org/officeDocument/2006/relationships" r:id="rId8"/>
           </a:graphicData>
         </a:graphic>
       </p:graphicFrame>
@@ -8430,7 +8177,7 @@
         </p:xfrm>
         <a:graphic>
           <a:graphicData uri="http://schemas.openxmlformats.org/drawingml/2006/chart">
-            <c:chart xmlns:c="http://schemas.openxmlformats.org/drawingml/2006/chart" xmlns:r="http://schemas.openxmlformats.org/officeDocument/2006/relationships" r:id="rId8"/>
+            <c:chart xmlns:c="http://schemas.openxmlformats.org/drawingml/2006/chart" xmlns:r="http://schemas.openxmlformats.org/officeDocument/2006/relationships" r:id="rId9"/>
           </a:graphicData>
         </a:graphic>
       </p:graphicFrame>
@@ -8537,7 +8284,13 @@
                 <a:rPr lang="en-US" sz="2400" dirty="0" smtClean="0">
                   <a:cs typeface="Century Gothic"/>
                 </a:rPr>
-                <a:t>Infecting 100 body cells with the entire immune system for protection. </a:t>
+                <a:t>Infecting 100 body cells with the entire immune system for </a:t>
+              </a:r>
+              <a:r>
+                <a:rPr lang="en-US" sz="2400" dirty="0" smtClean="0">
+                  <a:cs typeface="Century Gothic"/>
+                </a:rPr>
+                <a:t>protection</a:t>
               </a:r>
               <a:endParaRPr lang="en-US" sz="2400" dirty="0">
                 <a:cs typeface="Century Gothic"/>
@@ -8565,7 +8318,7 @@
           </p:xfrm>
           <a:graphic>
             <a:graphicData uri="http://schemas.openxmlformats.org/drawingml/2006/chart">
-              <c:chart xmlns:c="http://schemas.openxmlformats.org/drawingml/2006/chart" xmlns:r="http://schemas.openxmlformats.org/officeDocument/2006/relationships" r:id="rId9"/>
+              <c:chart xmlns:c="http://schemas.openxmlformats.org/drawingml/2006/chart" xmlns:r="http://schemas.openxmlformats.org/officeDocument/2006/relationships" r:id="rId10"/>
             </a:graphicData>
           </a:graphic>
         </p:graphicFrame>
@@ -8589,59 +8342,246 @@
           </p:xfrm>
           <a:graphic>
             <a:graphicData uri="http://schemas.openxmlformats.org/drawingml/2006/chart">
-              <c:chart xmlns:c="http://schemas.openxmlformats.org/drawingml/2006/chart" xmlns:r="http://schemas.openxmlformats.org/officeDocument/2006/relationships" r:id="rId10"/>
+              <c:chart xmlns:c="http://schemas.openxmlformats.org/drawingml/2006/chart" xmlns:r="http://schemas.openxmlformats.org/officeDocument/2006/relationships" r:id="rId11"/>
             </a:graphicData>
           </a:graphic>
         </p:graphicFrame>
       </p:grpSp>
-      <p:graphicFrame>
-        <p:nvGraphicFramePr>
-          <p:cNvPr id="49" name="Chart 48"/>
-          <p:cNvGraphicFramePr>
-            <a:graphicFrameLocks/>
-          </p:cNvGraphicFramePr>
-          <p:nvPr>
-            <p:extLst>
-              <p:ext uri="{D42A27DB-BD31-4B8C-83A1-F6EECF244321}">
-                <p14:modId xmlns:p14="http://schemas.microsoft.com/office/powerpoint/2010/main" val="651887152"/>
-              </p:ext>
-            </p:extLst>
-          </p:nvPr>
-        </p:nvGraphicFramePr>
-        <p:xfrm>
-          <a:off x="26527846" y="8422245"/>
-          <a:ext cx="5461000" cy="4573981"/>
-        </p:xfrm>
-        <a:graphic>
-          <a:graphicData uri="http://schemas.openxmlformats.org/drawingml/2006/chart">
-            <c:chart xmlns:c="http://schemas.openxmlformats.org/drawingml/2006/chart" xmlns:r="http://schemas.openxmlformats.org/officeDocument/2006/relationships" r:id="rId11"/>
-          </a:graphicData>
-        </a:graphic>
-      </p:graphicFrame>
-      <p:graphicFrame>
-        <p:nvGraphicFramePr>
-          <p:cNvPr id="50" name="Chart 49"/>
-          <p:cNvGraphicFramePr>
-            <a:graphicFrameLocks/>
-          </p:cNvGraphicFramePr>
-          <p:nvPr>
-            <p:extLst>
-              <p:ext uri="{D42A27DB-BD31-4B8C-83A1-F6EECF244321}">
-                <p14:modId xmlns:p14="http://schemas.microsoft.com/office/powerpoint/2010/main" val="1120476649"/>
-              </p:ext>
-            </p:extLst>
-          </p:nvPr>
-        </p:nvGraphicFramePr>
-        <p:xfrm>
-          <a:off x="26302330" y="14279372"/>
-          <a:ext cx="6070600" cy="6379193"/>
-        </p:xfrm>
-        <a:graphic>
-          <a:graphicData uri="http://schemas.openxmlformats.org/drawingml/2006/chart">
-            <c:chart xmlns:c="http://schemas.openxmlformats.org/drawingml/2006/chart" xmlns:r="http://schemas.openxmlformats.org/officeDocument/2006/relationships" r:id="rId12"/>
-          </a:graphicData>
-        </a:graphic>
-      </p:graphicFrame>
+      <p:grpSp>
+        <p:nvGrpSpPr>
+          <p:cNvPr id="24" name="Group 23"/>
+          <p:cNvGrpSpPr/>
+          <p:nvPr/>
+        </p:nvGrpSpPr>
+        <p:grpSpPr>
+          <a:xfrm>
+            <a:off x="26112767" y="9038647"/>
+            <a:ext cx="6490112" cy="12336825"/>
+            <a:chOff x="26092576" y="9038646"/>
+            <a:chExt cx="6490112" cy="12336825"/>
+          </a:xfrm>
+        </p:grpSpPr>
+        <p:sp>
+          <p:nvSpPr>
+            <p:cNvPr id="34" name="Rounded Rectangle 33"/>
+            <p:cNvSpPr/>
+            <p:nvPr/>
+          </p:nvSpPr>
+          <p:spPr>
+            <a:xfrm>
+              <a:off x="26092576" y="9038646"/>
+              <a:ext cx="6490112" cy="12336825"/>
+            </a:xfrm>
+            <a:prstGeom prst="roundRect">
+              <a:avLst/>
+            </a:prstGeom>
+            <a:solidFill>
+              <a:schemeClr val="bg1"/>
+            </a:solidFill>
+            <a:ln>
+              <a:solidFill>
+                <a:schemeClr val="bg1"/>
+              </a:solidFill>
+            </a:ln>
+            <a:effectLst>
+              <a:outerShdw blurRad="50800" dist="38100" dir="2700000" algn="tl" rotWithShape="0">
+                <a:prstClr val="black">
+                  <a:alpha val="40000"/>
+                </a:prstClr>
+              </a:outerShdw>
+            </a:effectLst>
+          </p:spPr>
+          <p:style>
+            <a:lnRef idx="2">
+              <a:schemeClr val="accent1">
+                <a:shade val="50000"/>
+              </a:schemeClr>
+            </a:lnRef>
+            <a:fillRef idx="1">
+              <a:schemeClr val="accent1"/>
+            </a:fillRef>
+            <a:effectRef idx="0">
+              <a:schemeClr val="accent1"/>
+            </a:effectRef>
+            <a:fontRef idx="minor">
+              <a:schemeClr val="lt1"/>
+            </a:fontRef>
+          </p:style>
+          <p:txBody>
+            <a:bodyPr rtlCol="0" anchor="ctr"/>
+            <a:lstStyle/>
+            <a:p>
+              <a:pPr algn="ctr"/>
+              <a:endParaRPr lang="en-US"/>
+            </a:p>
+          </p:txBody>
+        </p:sp>
+        <p:sp>
+          <p:nvSpPr>
+            <p:cNvPr id="15" name="TextBox 14"/>
+            <p:cNvSpPr txBox="1"/>
+            <p:nvPr/>
+          </p:nvSpPr>
+          <p:spPr>
+            <a:xfrm>
+              <a:off x="26424915" y="9213308"/>
+              <a:ext cx="6146800" cy="1323439"/>
+            </a:xfrm>
+            <a:prstGeom prst="rect">
+              <a:avLst/>
+            </a:prstGeom>
+            <a:noFill/>
+          </p:spPr>
+          <p:txBody>
+            <a:bodyPr wrap="square" rtlCol="0">
+              <a:spAutoFit/>
+            </a:bodyPr>
+            <a:lstStyle/>
+            <a:p>
+              <a:pPr algn="ctr"/>
+              <a:r>
+                <a:rPr lang="en-US" sz="2800" b="1" dirty="0" smtClean="0">
+                  <a:ea typeface="Century Gothic" charset="0"/>
+                  <a:cs typeface="Century Gothic" charset="0"/>
+                </a:rPr>
+                <a:t>Bacterial Infections</a:t>
+              </a:r>
+            </a:p>
+            <a:p>
+              <a:pPr algn="ctr"/>
+              <a:endParaRPr lang="en-US" sz="2800" b="1" dirty="0" smtClean="0">
+                <a:ea typeface="Century Gothic" charset="0"/>
+                <a:cs typeface="Century Gothic" charset="0"/>
+              </a:endParaRPr>
+            </a:p>
+            <a:p>
+              <a:r>
+                <a:rPr lang="en-US" sz="2400" b="1" dirty="0" smtClean="0">
+                  <a:ea typeface="Century Gothic" charset="0"/>
+                  <a:cs typeface="Century Gothic" charset="0"/>
+                </a:rPr>
+                <a:t>Experiment 4:</a:t>
+              </a:r>
+              <a:r>
+                <a:rPr lang="en-US" sz="2400" dirty="0" smtClean="0">
+                  <a:ea typeface="Century Gothic" charset="0"/>
+                  <a:cs typeface="Century Gothic" charset="0"/>
+                </a:rPr>
+                <a:t> Killing 10 body cells with </a:t>
+              </a:r>
+              <a:r>
+                <a:rPr lang="en-US" sz="2400" dirty="0" smtClean="0">
+                  <a:ea typeface="Century Gothic" charset="0"/>
+                  <a:cs typeface="Century Gothic" charset="0"/>
+                </a:rPr>
+                <a:t>bacteria</a:t>
+              </a:r>
+              <a:endParaRPr lang="en-US" sz="2400" dirty="0">
+                <a:ea typeface="Century Gothic" charset="0"/>
+                <a:cs typeface="Century Gothic" charset="0"/>
+              </a:endParaRPr>
+            </a:p>
+          </p:txBody>
+        </p:sp>
+        <p:sp>
+          <p:nvSpPr>
+            <p:cNvPr id="18" name="TextBox 17"/>
+            <p:cNvSpPr txBox="1"/>
+            <p:nvPr/>
+          </p:nvSpPr>
+          <p:spPr>
+            <a:xfrm>
+              <a:off x="26567594" y="14669425"/>
+              <a:ext cx="5486767" cy="830997"/>
+            </a:xfrm>
+            <a:prstGeom prst="rect">
+              <a:avLst/>
+            </a:prstGeom>
+            <a:noFill/>
+          </p:spPr>
+          <p:txBody>
+            <a:bodyPr wrap="square" rtlCol="0">
+              <a:spAutoFit/>
+            </a:bodyPr>
+            <a:lstStyle/>
+            <a:p>
+              <a:r>
+                <a:rPr lang="en-US" sz="2400" b="1" dirty="0" smtClean="0">
+                  <a:ea typeface="Century Gothic" charset="0"/>
+                  <a:cs typeface="Century Gothic" charset="0"/>
+                </a:rPr>
+                <a:t>Experiment 5: </a:t>
+              </a:r>
+              <a:r>
+                <a:rPr lang="en-US" sz="2400" dirty="0" smtClean="0">
+                  <a:ea typeface="Century Gothic" charset="0"/>
+                  <a:cs typeface="Century Gothic" charset="0"/>
+                </a:rPr>
+                <a:t>Killing 10 body cells with 10 macrophages for </a:t>
+              </a:r>
+              <a:r>
+                <a:rPr lang="en-US" sz="2400" dirty="0" smtClean="0">
+                  <a:ea typeface="Century Gothic" charset="0"/>
+                  <a:cs typeface="Century Gothic" charset="0"/>
+                </a:rPr>
+                <a:t>protection </a:t>
+              </a:r>
+              <a:endParaRPr lang="en-US" sz="2400" dirty="0">
+                <a:ea typeface="Century Gothic" charset="0"/>
+                <a:cs typeface="Century Gothic" charset="0"/>
+              </a:endParaRPr>
+            </a:p>
+          </p:txBody>
+        </p:sp>
+        <p:graphicFrame>
+          <p:nvGraphicFramePr>
+            <p:cNvPr id="49" name="Chart 48"/>
+            <p:cNvGraphicFramePr>
+              <a:graphicFrameLocks/>
+            </p:cNvGraphicFramePr>
+            <p:nvPr>
+              <p:extLst>
+                <p:ext uri="{D42A27DB-BD31-4B8C-83A1-F6EECF244321}">
+                  <p14:modId xmlns:p14="http://schemas.microsoft.com/office/powerpoint/2010/main" val="1813073898"/>
+                </p:ext>
+              </p:extLst>
+            </p:nvPr>
+          </p:nvGraphicFramePr>
+          <p:xfrm>
+            <a:off x="26580477" y="10906079"/>
+            <a:ext cx="5461000" cy="3632369"/>
+          </p:xfrm>
+          <a:graphic>
+            <a:graphicData uri="http://schemas.openxmlformats.org/drawingml/2006/chart">
+              <c:chart xmlns:c="http://schemas.openxmlformats.org/drawingml/2006/chart" xmlns:r="http://schemas.openxmlformats.org/officeDocument/2006/relationships" r:id="rId12"/>
+            </a:graphicData>
+          </a:graphic>
+        </p:graphicFrame>
+        <p:graphicFrame>
+          <p:nvGraphicFramePr>
+            <p:cNvPr id="50" name="Chart 49"/>
+            <p:cNvGraphicFramePr>
+              <a:graphicFrameLocks/>
+            </p:cNvGraphicFramePr>
+            <p:nvPr>
+              <p:extLst>
+                <p:ext uri="{D42A27DB-BD31-4B8C-83A1-F6EECF244321}">
+                  <p14:modId xmlns:p14="http://schemas.microsoft.com/office/powerpoint/2010/main" val="1687536403"/>
+                </p:ext>
+              </p:extLst>
+            </p:nvPr>
+          </p:nvGraphicFramePr>
+          <p:xfrm>
+            <a:off x="26302330" y="15685872"/>
+            <a:ext cx="6070600" cy="4972693"/>
+          </p:xfrm>
+          <a:graphic>
+            <a:graphicData uri="http://schemas.openxmlformats.org/drawingml/2006/chart">
+              <c:chart xmlns:c="http://schemas.openxmlformats.org/drawingml/2006/chart" xmlns:r="http://schemas.openxmlformats.org/officeDocument/2006/relationships" r:id="rId13"/>
+            </a:graphicData>
+          </a:graphic>
+        </p:graphicFrame>
+      </p:grpSp>
       <p:sp>
         <p:nvSpPr>
           <p:cNvPr id="54" name="TextBox 53"/>
@@ -8650,7 +8590,7 @@
         </p:nvSpPr>
         <p:spPr>
           <a:xfrm>
-            <a:off x="9466108" y="10694371"/>
+            <a:off x="9466108" y="11096436"/>
             <a:ext cx="16035492" cy="523220"/>
           </a:xfrm>
           <a:prstGeom prst="rect">

</xml_diff>

<commit_message>
changed size of screen temporarily
</commit_message>
<xml_diff>
--- a/Science Fair Poster .pptx
+++ b/Science Fair Poster .pptx
@@ -263,22 +263,22 @@
                   <c:v>100.0</c:v>
                 </c:pt>
                 <c:pt idx="3">
-                  <c:v>46.66666666666664</c:v>
+                  <c:v>46.66666666666663</c:v>
                 </c:pt>
                 <c:pt idx="4">
-                  <c:v>46.66666666666664</c:v>
+                  <c:v>46.66666666666663</c:v>
                 </c:pt>
                 <c:pt idx="5">
-                  <c:v>46.66666666666664</c:v>
+                  <c:v>46.66666666666663</c:v>
                 </c:pt>
                 <c:pt idx="6">
-                  <c:v>46.66666666666664</c:v>
+                  <c:v>46.66666666666663</c:v>
                 </c:pt>
                 <c:pt idx="7">
-                  <c:v>46.66666666666664</c:v>
+                  <c:v>46.66666666666663</c:v>
                 </c:pt>
                 <c:pt idx="8">
-                  <c:v>46.66666666666664</c:v>
+                  <c:v>46.66666666666663</c:v>
                 </c:pt>
                 <c:pt idx="9">
                   <c:v>5.0</c:v>
@@ -311,8 +311,8 @@
           <c:showPercent val="0"/>
           <c:showBubbleSize val="0"/>
         </c:dLbls>
-        <c:axId val="734889616"/>
-        <c:axId val="734897280"/>
+        <c:axId val="-1427885328"/>
+        <c:axId val="-1368285024"/>
       </c:scatterChart>
       <c:scatterChart>
         <c:scatterStyle val="smoothMarker"/>
@@ -444,11 +444,11 @@
           <c:showPercent val="0"/>
           <c:showBubbleSize val="0"/>
         </c:dLbls>
-        <c:axId val="734905552"/>
-        <c:axId val="734909264"/>
+        <c:axId val="-1368279488"/>
+        <c:axId val="-1368275776"/>
       </c:scatterChart>
       <c:valAx>
-        <c:axId val="734889616"/>
+        <c:axId val="-1427885328"/>
         <c:scaling>
           <c:orientation val="minMax"/>
         </c:scaling>
@@ -494,12 +494,12 @@
             <a:endParaRPr lang="en-US"/>
           </a:p>
         </c:txPr>
-        <c:crossAx val="734897280"/>
+        <c:crossAx val="-1368285024"/>
         <c:crosses val="autoZero"/>
         <c:crossBetween val="midCat"/>
       </c:valAx>
       <c:valAx>
-        <c:axId val="734897280"/>
+        <c:axId val="-1368285024"/>
         <c:scaling>
           <c:orientation val="minMax"/>
           <c:max val="110.0"/>
@@ -546,12 +546,12 @@
             <a:endParaRPr lang="en-US"/>
           </a:p>
         </c:txPr>
-        <c:crossAx val="734889616"/>
+        <c:crossAx val="-1427885328"/>
         <c:crosses val="autoZero"/>
         <c:crossBetween val="midCat"/>
       </c:valAx>
       <c:valAx>
-        <c:axId val="734905552"/>
+        <c:axId val="-1368279488"/>
         <c:scaling>
           <c:orientation val="minMax"/>
         </c:scaling>
@@ -560,12 +560,12 @@
         <c:majorTickMark val="out"/>
         <c:minorTickMark val="none"/>
         <c:tickLblPos val="nextTo"/>
-        <c:crossAx val="734909264"/>
+        <c:crossAx val="-1368275776"/>
         <c:crosses val="autoZero"/>
         <c:crossBetween val="midCat"/>
       </c:valAx>
       <c:valAx>
-        <c:axId val="734909264"/>
+        <c:axId val="-1368275776"/>
         <c:scaling>
           <c:orientation val="minMax"/>
           <c:max val="2400.0"/>
@@ -618,7 +618,7 @@
             <a:endParaRPr lang="en-US"/>
           </a:p>
         </c:txPr>
-        <c:crossAx val="734905552"/>
+        <c:crossAx val="-1368279488"/>
         <c:crosses val="max"/>
         <c:crossBetween val="midCat"/>
       </c:valAx>
@@ -790,22 +790,22 @@
                   <c:v>100.0</c:v>
                 </c:pt>
                 <c:pt idx="3">
-                  <c:v>46.66666666666664</c:v>
+                  <c:v>46.66666666666663</c:v>
                 </c:pt>
                 <c:pt idx="4">
-                  <c:v>46.66666666666664</c:v>
+                  <c:v>46.66666666666663</c:v>
                 </c:pt>
                 <c:pt idx="5">
-                  <c:v>46.66666666666664</c:v>
+                  <c:v>46.66666666666663</c:v>
                 </c:pt>
                 <c:pt idx="6">
-                  <c:v>46.66666666666664</c:v>
+                  <c:v>46.66666666666663</c:v>
                 </c:pt>
                 <c:pt idx="7">
-                  <c:v>46.66666666666664</c:v>
+                  <c:v>46.66666666666663</c:v>
                 </c:pt>
                 <c:pt idx="8">
-                  <c:v>46.66666666666664</c:v>
+                  <c:v>46.66666666666663</c:v>
                 </c:pt>
                 <c:pt idx="9">
                   <c:v>5.0</c:v>
@@ -964,11 +964,11 @@
           <c:showPercent val="0"/>
           <c:showBubbleSize val="0"/>
         </c:dLbls>
-        <c:axId val="737202176"/>
-        <c:axId val="737209440"/>
+        <c:axId val="-1358731072"/>
+        <c:axId val="-1358723856"/>
       </c:scatterChart>
       <c:valAx>
-        <c:axId val="737202176"/>
+        <c:axId val="-1358731072"/>
         <c:scaling>
           <c:orientation val="minMax"/>
         </c:scaling>
@@ -1014,12 +1014,12 @@
             <a:endParaRPr lang="en-US"/>
           </a:p>
         </c:txPr>
-        <c:crossAx val="737209440"/>
+        <c:crossAx val="-1358723856"/>
         <c:crosses val="autoZero"/>
         <c:crossBetween val="midCat"/>
       </c:valAx>
       <c:valAx>
-        <c:axId val="737209440"/>
+        <c:axId val="-1358723856"/>
         <c:scaling>
           <c:orientation val="minMax"/>
         </c:scaling>
@@ -1064,7 +1064,7 @@
             <a:endParaRPr lang="en-US"/>
           </a:p>
         </c:txPr>
-        <c:crossAx val="737202176"/>
+        <c:crossAx val="-1358731072"/>
         <c:crosses val="autoZero"/>
         <c:crossBetween val="midCat"/>
       </c:valAx>
@@ -1417,11 +1417,11 @@
           <c:showPercent val="0"/>
           <c:showBubbleSize val="0"/>
         </c:dLbls>
-        <c:axId val="737264064"/>
-        <c:axId val="737271296"/>
+        <c:axId val="-1369144240"/>
+        <c:axId val="-1369136992"/>
       </c:scatterChart>
       <c:valAx>
-        <c:axId val="737264064"/>
+        <c:axId val="-1369144240"/>
         <c:scaling>
           <c:orientation val="minMax"/>
         </c:scaling>
@@ -1467,12 +1467,12 @@
             <a:endParaRPr lang="en-US"/>
           </a:p>
         </c:txPr>
-        <c:crossAx val="737271296"/>
+        <c:crossAx val="-1369136992"/>
         <c:crosses val="autoZero"/>
         <c:crossBetween val="midCat"/>
       </c:valAx>
       <c:valAx>
-        <c:axId val="737271296"/>
+        <c:axId val="-1369136992"/>
         <c:scaling>
           <c:orientation val="minMax"/>
           <c:min val="0.0"/>
@@ -1518,7 +1518,7 @@
             <a:endParaRPr lang="en-US"/>
           </a:p>
         </c:txPr>
-        <c:crossAx val="737264064"/>
+        <c:crossAx val="-1369144240"/>
         <c:crosses val="autoZero"/>
         <c:crossBetween val="midCat"/>
       </c:valAx>
@@ -2099,11 +2099,11 @@
           <c:showPercent val="0"/>
           <c:showBubbleSize val="0"/>
         </c:dLbls>
-        <c:axId val="737333632"/>
-        <c:axId val="737340864"/>
+        <c:axId val="-1358626080"/>
+        <c:axId val="-1358618832"/>
       </c:scatterChart>
       <c:valAx>
-        <c:axId val="737333632"/>
+        <c:axId val="-1358626080"/>
         <c:scaling>
           <c:orientation val="minMax"/>
         </c:scaling>
@@ -2149,12 +2149,12 @@
             <a:endParaRPr lang="en-US"/>
           </a:p>
         </c:txPr>
-        <c:crossAx val="737340864"/>
+        <c:crossAx val="-1358618832"/>
         <c:crosses val="autoZero"/>
         <c:crossBetween val="midCat"/>
       </c:valAx>
       <c:valAx>
-        <c:axId val="737340864"/>
+        <c:axId val="-1358618832"/>
         <c:scaling>
           <c:orientation val="minMax"/>
           <c:min val="0.0"/>
@@ -2200,7 +2200,7 @@
             <a:endParaRPr lang="en-US"/>
           </a:p>
         </c:txPr>
-        <c:crossAx val="737333632"/>
+        <c:crossAx val="-1358626080"/>
         <c:crosses val="autoZero"/>
         <c:crossBetween val="midCat"/>
       </c:valAx>
@@ -2279,7 +2279,360 @@
             </a:pPr>
             <a:r>
               <a:rPr lang="en-US" sz="2400"/>
-              <a:t>Body Cell Death With and Without Immune System</a:t>
+              <a:t>Number of Body Cells Dying With Bacteria </a:t>
+            </a:r>
+          </a:p>
+        </c:rich>
+      </c:tx>
+      <c:layout>
+        <c:manualLayout>
+          <c:xMode val="edge"/>
+          <c:yMode val="edge"/>
+          <c:x val="0.13794750656168"/>
+          <c:y val="0.0416666666666667"/>
+        </c:manualLayout>
+      </c:layout>
+      <c:overlay val="0"/>
+    </c:title>
+    <c:autoTitleDeleted val="0"/>
+    <c:plotArea>
+      <c:layout/>
+      <c:scatterChart>
+        <c:scatterStyle val="smoothMarker"/>
+        <c:varyColors val="0"/>
+        <c:ser>
+          <c:idx val="0"/>
+          <c:order val="0"/>
+          <c:tx>
+            <c:v>Body Cells Dying</c:v>
+          </c:tx>
+          <c:marker>
+            <c:symbol val="none"/>
+          </c:marker>
+          <c:xVal>
+            <c:numRef>
+              <c:f>Sheet1!$A$1:$A$29</c:f>
+              <c:numCache>
+                <c:formatCode>General</c:formatCode>
+                <c:ptCount val="29"/>
+                <c:pt idx="0">
+                  <c:v>1.0</c:v>
+                </c:pt>
+                <c:pt idx="1">
+                  <c:v>2.0</c:v>
+                </c:pt>
+                <c:pt idx="2">
+                  <c:v>3.0</c:v>
+                </c:pt>
+                <c:pt idx="3">
+                  <c:v>4.0</c:v>
+                </c:pt>
+                <c:pt idx="4">
+                  <c:v>5.0</c:v>
+                </c:pt>
+                <c:pt idx="5">
+                  <c:v>6.0</c:v>
+                </c:pt>
+                <c:pt idx="6">
+                  <c:v>7.0</c:v>
+                </c:pt>
+                <c:pt idx="7">
+                  <c:v>8.0</c:v>
+                </c:pt>
+                <c:pt idx="8">
+                  <c:v>9.0</c:v>
+                </c:pt>
+                <c:pt idx="9">
+                  <c:v>10.0</c:v>
+                </c:pt>
+                <c:pt idx="10">
+                  <c:v>11.0</c:v>
+                </c:pt>
+                <c:pt idx="11">
+                  <c:v>12.0</c:v>
+                </c:pt>
+                <c:pt idx="12">
+                  <c:v>13.0</c:v>
+                </c:pt>
+                <c:pt idx="13">
+                  <c:v>14.0</c:v>
+                </c:pt>
+                <c:pt idx="14">
+                  <c:v>15.0</c:v>
+                </c:pt>
+                <c:pt idx="15">
+                  <c:v>16.0</c:v>
+                </c:pt>
+                <c:pt idx="16">
+                  <c:v>17.0</c:v>
+                </c:pt>
+                <c:pt idx="17">
+                  <c:v>18.0</c:v>
+                </c:pt>
+                <c:pt idx="18">
+                  <c:v>19.0</c:v>
+                </c:pt>
+                <c:pt idx="19">
+                  <c:v>20.0</c:v>
+                </c:pt>
+                <c:pt idx="20">
+                  <c:v>21.0</c:v>
+                </c:pt>
+                <c:pt idx="21">
+                  <c:v>22.0</c:v>
+                </c:pt>
+                <c:pt idx="22">
+                  <c:v>23.0</c:v>
+                </c:pt>
+                <c:pt idx="23">
+                  <c:v>24.0</c:v>
+                </c:pt>
+                <c:pt idx="24">
+                  <c:v>25.0</c:v>
+                </c:pt>
+                <c:pt idx="25">
+                  <c:v>26.0</c:v>
+                </c:pt>
+                <c:pt idx="26">
+                  <c:v>27.0</c:v>
+                </c:pt>
+                <c:pt idx="27">
+                  <c:v>28.0</c:v>
+                </c:pt>
+                <c:pt idx="28">
+                  <c:v>29.0</c:v>
+                </c:pt>
+              </c:numCache>
+            </c:numRef>
+          </c:xVal>
+          <c:yVal>
+            <c:numRef>
+              <c:f>Sheet1!$B$1:$B$29</c:f>
+              <c:numCache>
+                <c:formatCode>General</c:formatCode>
+                <c:ptCount val="29"/>
+                <c:pt idx="0">
+                  <c:v>10.0</c:v>
+                </c:pt>
+                <c:pt idx="1">
+                  <c:v>10.0</c:v>
+                </c:pt>
+                <c:pt idx="2">
+                  <c:v>10.0</c:v>
+                </c:pt>
+                <c:pt idx="3">
+                  <c:v>10.0</c:v>
+                </c:pt>
+                <c:pt idx="4">
+                  <c:v>9.0</c:v>
+                </c:pt>
+                <c:pt idx="5">
+                  <c:v>9.0</c:v>
+                </c:pt>
+                <c:pt idx="6">
+                  <c:v>9.0</c:v>
+                </c:pt>
+                <c:pt idx="7">
+                  <c:v>9.0</c:v>
+                </c:pt>
+                <c:pt idx="8">
+                  <c:v>9.0</c:v>
+                </c:pt>
+                <c:pt idx="9">
+                  <c:v>9.0</c:v>
+                </c:pt>
+                <c:pt idx="10">
+                  <c:v>8.0</c:v>
+                </c:pt>
+                <c:pt idx="11">
+                  <c:v>8.0</c:v>
+                </c:pt>
+                <c:pt idx="12">
+                  <c:v>6.0</c:v>
+                </c:pt>
+                <c:pt idx="13">
+                  <c:v>5.0</c:v>
+                </c:pt>
+                <c:pt idx="14">
+                  <c:v>5.0</c:v>
+                </c:pt>
+                <c:pt idx="15">
+                  <c:v>4.0</c:v>
+                </c:pt>
+                <c:pt idx="16">
+                  <c:v>4.0</c:v>
+                </c:pt>
+                <c:pt idx="17">
+                  <c:v>2.0</c:v>
+                </c:pt>
+                <c:pt idx="18">
+                  <c:v>2.0</c:v>
+                </c:pt>
+                <c:pt idx="19">
+                  <c:v>2.0</c:v>
+                </c:pt>
+                <c:pt idx="20">
+                  <c:v>2.0</c:v>
+                </c:pt>
+                <c:pt idx="21">
+                  <c:v>2.0</c:v>
+                </c:pt>
+                <c:pt idx="22">
+                  <c:v>2.0</c:v>
+                </c:pt>
+                <c:pt idx="23">
+                  <c:v>1.0</c:v>
+                </c:pt>
+                <c:pt idx="24">
+                  <c:v>1.0</c:v>
+                </c:pt>
+                <c:pt idx="25">
+                  <c:v>1.0</c:v>
+                </c:pt>
+                <c:pt idx="26">
+                  <c:v>1.0</c:v>
+                </c:pt>
+                <c:pt idx="27">
+                  <c:v>1.0</c:v>
+                </c:pt>
+                <c:pt idx="28">
+                  <c:v>0.0</c:v>
+                </c:pt>
+              </c:numCache>
+            </c:numRef>
+          </c:yVal>
+          <c:smooth val="1"/>
+        </c:ser>
+        <c:dLbls>
+          <c:showLegendKey val="0"/>
+          <c:showVal val="0"/>
+          <c:showCatName val="0"/>
+          <c:showSerName val="0"/>
+          <c:showPercent val="0"/>
+          <c:showBubbleSize val="0"/>
+        </c:dLbls>
+        <c:axId val="-1358509424"/>
+        <c:axId val="-1358505376"/>
+      </c:scatterChart>
+      <c:valAx>
+        <c:axId val="-1358509424"/>
+        <c:scaling>
+          <c:orientation val="minMax"/>
+        </c:scaling>
+        <c:delete val="0"/>
+        <c:axPos val="b"/>
+        <c:numFmt formatCode="General" sourceLinked="1"/>
+        <c:majorTickMark val="out"/>
+        <c:minorTickMark val="none"/>
+        <c:tickLblPos val="nextTo"/>
+        <c:txPr>
+          <a:bodyPr rot="0" vert="horz"/>
+          <a:lstStyle/>
+          <a:p>
+            <a:pPr>
+              <a:defRPr sz="2000" b="0" i="0" u="none" strike="noStrike" baseline="0">
+                <a:solidFill>
+                  <a:srgbClr val="000000"/>
+                </a:solidFill>
+                <a:latin typeface="Calibri"/>
+                <a:ea typeface="Calibri"/>
+                <a:cs typeface="Calibri"/>
+              </a:defRPr>
+            </a:pPr>
+            <a:endParaRPr lang="en-US"/>
+          </a:p>
+        </c:txPr>
+        <c:crossAx val="-1358505376"/>
+        <c:crosses val="autoZero"/>
+        <c:crossBetween val="midCat"/>
+      </c:valAx>
+      <c:valAx>
+        <c:axId val="-1358505376"/>
+        <c:scaling>
+          <c:orientation val="minMax"/>
+        </c:scaling>
+        <c:delete val="0"/>
+        <c:axPos val="l"/>
+        <c:majorGridlines/>
+        <c:numFmt formatCode="General" sourceLinked="1"/>
+        <c:majorTickMark val="out"/>
+        <c:minorTickMark val="none"/>
+        <c:tickLblPos val="nextTo"/>
+        <c:txPr>
+          <a:bodyPr/>
+          <a:lstStyle/>
+          <a:p>
+            <a:pPr>
+              <a:defRPr sz="2000"/>
+            </a:pPr>
+            <a:endParaRPr lang="en-US"/>
+          </a:p>
+        </c:txPr>
+        <c:crossAx val="-1358509424"/>
+        <c:crosses val="autoZero"/>
+        <c:crossBetween val="midCat"/>
+      </c:valAx>
+    </c:plotArea>
+    <c:plotVisOnly val="1"/>
+    <c:dispBlanksAs val="gap"/>
+    <c:showDLblsOverMax val="0"/>
+  </c:chart>
+  <c:txPr>
+    <a:bodyPr/>
+    <a:lstStyle/>
+    <a:p>
+      <a:pPr>
+        <a:defRPr sz="1000" b="0" i="0" u="none" strike="noStrike" baseline="0">
+          <a:solidFill>
+            <a:srgbClr val="000000"/>
+          </a:solidFill>
+          <a:latin typeface="Calibri"/>
+          <a:ea typeface="Calibri"/>
+          <a:cs typeface="Calibri"/>
+        </a:defRPr>
+      </a:pPr>
+      <a:endParaRPr lang="en-US"/>
+    </a:p>
+  </c:txPr>
+  <c:externalData r:id="rId1">
+    <c:autoUpdate val="0"/>
+  </c:externalData>
+</c:chartSpace>
+</file>
+
+<file path=ppt/charts/chart6.xml><?xml version="1.0" encoding="utf-8"?>
+<c:chartSpace xmlns:c="http://schemas.openxmlformats.org/drawingml/2006/chart" xmlns:a="http://schemas.openxmlformats.org/drawingml/2006/main" xmlns:r="http://schemas.openxmlformats.org/officeDocument/2006/relationships">
+  <c:date1904 val="0"/>
+  <c:lang val="en-US"/>
+  <c:roundedCorners val="0"/>
+  <mc:AlternateContent xmlns:mc="http://schemas.openxmlformats.org/markup-compatibility/2006">
+    <mc:Choice xmlns:c14="http://schemas.microsoft.com/office/drawing/2007/8/2/chart" Requires="c14">
+      <c14:style val="118"/>
+    </mc:Choice>
+    <mc:Fallback>
+      <c:style val="18"/>
+    </mc:Fallback>
+  </mc:AlternateContent>
+  <c:chart>
+    <c:title>
+      <c:tx>
+        <c:rich>
+          <a:bodyPr/>
+          <a:lstStyle/>
+          <a:p>
+            <a:pPr algn="ctr" rtl="1">
+              <a:defRPr sz="2000" b="1" i="0" u="none" strike="noStrike" baseline="0">
+                <a:solidFill>
+                  <a:srgbClr val="000000"/>
+                </a:solidFill>
+                <a:latin typeface="Calibri"/>
+                <a:ea typeface="Calibri"/>
+                <a:cs typeface="Calibri"/>
+              </a:defRPr>
+            </a:pPr>
+            <a:r>
+              <a:rPr lang="en-US" sz="2000"/>
+              <a:t>Body Cell Death with Bacteria and Macrophages</a:t>
             </a:r>
           </a:p>
         </c:rich>
@@ -2297,17 +2650,17 @@
           <c:idx val="0"/>
           <c:order val="0"/>
           <c:tx>
-            <c:v>Without Immune System</c:v>
+            <c:v> Without Macrophages</c:v>
           </c:tx>
           <c:marker>
             <c:symbol val="none"/>
           </c:marker>
           <c:xVal>
             <c:numRef>
-              <c:f>'With Immune system'!$G$3:$G$36</c:f>
+              <c:f>Sheet1!$A$1:$A$29</c:f>
               <c:numCache>
                 <c:formatCode>General</c:formatCode>
-                <c:ptCount val="34"/>
+                <c:ptCount val="29"/>
                 <c:pt idx="0">
                   <c:v>1.0</c:v>
                 </c:pt>
@@ -2394,131 +2747,101 @@
                 </c:pt>
                 <c:pt idx="28">
                   <c:v>29.0</c:v>
-                </c:pt>
-                <c:pt idx="29">
-                  <c:v>30.0</c:v>
-                </c:pt>
-                <c:pt idx="30">
-                  <c:v>31.0</c:v>
-                </c:pt>
-                <c:pt idx="31">
-                  <c:v>32.0</c:v>
-                </c:pt>
-                <c:pt idx="32">
-                  <c:v>33.0</c:v>
-                </c:pt>
-                <c:pt idx="33">
-                  <c:v>34.0</c:v>
                 </c:pt>
               </c:numCache>
             </c:numRef>
           </c:xVal>
           <c:yVal>
             <c:numRef>
-              <c:f>'With Immune system'!$H$3:$H$36</c:f>
+              <c:f>Sheet1!$B$1:$B$29</c:f>
               <c:numCache>
-                <c:formatCode>0.00</c:formatCode>
-                <c:ptCount val="34"/>
+                <c:formatCode>General</c:formatCode>
+                <c:ptCount val="29"/>
                 <c:pt idx="0">
-                  <c:v>100.0</c:v>
+                  <c:v>10.0</c:v>
                 </c:pt>
                 <c:pt idx="1">
-                  <c:v>100.0</c:v>
+                  <c:v>10.0</c:v>
                 </c:pt>
                 <c:pt idx="2">
-                  <c:v>100.0</c:v>
+                  <c:v>10.0</c:v>
                 </c:pt>
                 <c:pt idx="3">
-                  <c:v>46.66666666666664</c:v>
+                  <c:v>10.0</c:v>
                 </c:pt>
                 <c:pt idx="4">
-                  <c:v>46.66666666666664</c:v>
+                  <c:v>9.0</c:v>
                 </c:pt>
                 <c:pt idx="5">
-                  <c:v>46.66666666666664</c:v>
+                  <c:v>9.0</c:v>
                 </c:pt>
                 <c:pt idx="6">
-                  <c:v>46.66666666666664</c:v>
+                  <c:v>9.0</c:v>
                 </c:pt>
                 <c:pt idx="7">
-                  <c:v>46.66666666666664</c:v>
+                  <c:v>9.0</c:v>
                 </c:pt>
                 <c:pt idx="8">
-                  <c:v>46.66666666666664</c:v>
+                  <c:v>9.0</c:v>
                 </c:pt>
                 <c:pt idx="9">
+                  <c:v>9.0</c:v>
+                </c:pt>
+                <c:pt idx="10">
+                  <c:v>8.0</c:v>
+                </c:pt>
+                <c:pt idx="11">
+                  <c:v>8.0</c:v>
+                </c:pt>
+                <c:pt idx="12">
+                  <c:v>6.0</c:v>
+                </c:pt>
+                <c:pt idx="13">
                   <c:v>5.0</c:v>
                 </c:pt>
-                <c:pt idx="10">
-                  <c:v>2.333333333333333</c:v>
-                </c:pt>
-                <c:pt idx="11">
+                <c:pt idx="14">
+                  <c:v>5.0</c:v>
+                </c:pt>
+                <c:pt idx="15">
+                  <c:v>4.0</c:v>
+                </c:pt>
+                <c:pt idx="16">
+                  <c:v>4.0</c:v>
+                </c:pt>
+                <c:pt idx="17">
                   <c:v>2.0</c:v>
                 </c:pt>
-                <c:pt idx="12">
+                <c:pt idx="18">
+                  <c:v>2.0</c:v>
+                </c:pt>
+                <c:pt idx="19">
+                  <c:v>2.0</c:v>
+                </c:pt>
+                <c:pt idx="20">
+                  <c:v>2.0</c:v>
+                </c:pt>
+                <c:pt idx="21">
+                  <c:v>2.0</c:v>
+                </c:pt>
+                <c:pt idx="22">
+                  <c:v>2.0</c:v>
+                </c:pt>
+                <c:pt idx="23">
                   <c:v>1.0</c:v>
                 </c:pt>
-                <c:pt idx="13">
-                  <c:v>0.666666666666667</c:v>
-                </c:pt>
-                <c:pt idx="14">
-                  <c:v>0.666666666666667</c:v>
-                </c:pt>
-                <c:pt idx="15">
-                  <c:v>0.0</c:v>
-                </c:pt>
-                <c:pt idx="16">
-                  <c:v>0.0</c:v>
-                </c:pt>
-                <c:pt idx="17">
-                  <c:v>0.0</c:v>
-                </c:pt>
-                <c:pt idx="18">
-                  <c:v>0.0</c:v>
-                </c:pt>
-                <c:pt idx="19">
-                  <c:v>0.0</c:v>
-                </c:pt>
-                <c:pt idx="20">
-                  <c:v>0.0</c:v>
-                </c:pt>
-                <c:pt idx="21">
-                  <c:v>0.0</c:v>
-                </c:pt>
-                <c:pt idx="22">
-                  <c:v>0.0</c:v>
-                </c:pt>
-                <c:pt idx="23">
-                  <c:v>0.0</c:v>
-                </c:pt>
                 <c:pt idx="24">
-                  <c:v>0.0</c:v>
+                  <c:v>1.0</c:v>
                 </c:pt>
                 <c:pt idx="25">
-                  <c:v>0.0</c:v>
+                  <c:v>1.0</c:v>
                 </c:pt>
                 <c:pt idx="26">
-                  <c:v>0.0</c:v>
+                  <c:v>1.0</c:v>
                 </c:pt>
                 <c:pt idx="27">
-                  <c:v>0.0</c:v>
+                  <c:v>1.0</c:v>
                 </c:pt>
                 <c:pt idx="28">
-                  <c:v>0.0</c:v>
-                </c:pt>
-                <c:pt idx="29">
-                  <c:v>0.0</c:v>
-                </c:pt>
-                <c:pt idx="30">
-                  <c:v>0.0</c:v>
-                </c:pt>
-                <c:pt idx="31">
-                  <c:v>0.0</c:v>
-                </c:pt>
-                <c:pt idx="32">
-                  <c:v>0.0</c:v>
-                </c:pt>
-                <c:pt idx="33">
                   <c:v>0.0</c:v>
                 </c:pt>
               </c:numCache>
@@ -2530,12 +2853,12 @@
           <c:idx val="1"/>
           <c:order val="1"/>
           <c:tx>
-            <c:v>With Immune System</c:v>
+            <c:v> With Macrophages</c:v>
           </c:tx>
           <c:spPr>
             <a:ln>
               <a:solidFill>
-                <a:srgbClr val="FFC000"/>
+                <a:srgbClr val="00E88F"/>
               </a:solidFill>
             </a:ln>
           </c:spPr>
@@ -2544,10 +2867,10 @@
           </c:marker>
           <c:xVal>
             <c:numRef>
-              <c:f>'With Immune system'!$G$3:$G$36</c:f>
+              <c:f>Sheet1!$A$1:$A$29</c:f>
               <c:numCache>
                 <c:formatCode>General</c:formatCode>
-                <c:ptCount val="34"/>
+                <c:ptCount val="29"/>
                 <c:pt idx="0">
                   <c:v>1.0</c:v>
                 </c:pt>
@@ -2634,132 +2957,102 @@
                 </c:pt>
                 <c:pt idx="28">
                   <c:v>29.0</c:v>
-                </c:pt>
-                <c:pt idx="29">
-                  <c:v>30.0</c:v>
-                </c:pt>
-                <c:pt idx="30">
-                  <c:v>31.0</c:v>
-                </c:pt>
-                <c:pt idx="31">
-                  <c:v>32.0</c:v>
-                </c:pt>
-                <c:pt idx="32">
-                  <c:v>33.0</c:v>
-                </c:pt>
-                <c:pt idx="33">
-                  <c:v>34.0</c:v>
                 </c:pt>
               </c:numCache>
             </c:numRef>
           </c:xVal>
           <c:yVal>
             <c:numRef>
-              <c:f>'With Immune system'!$I$3:$I$36</c:f>
+              <c:f>Sheet1!$C$1:$C$29</c:f>
               <c:numCache>
                 <c:formatCode>General</c:formatCode>
-                <c:ptCount val="34"/>
+                <c:ptCount val="29"/>
                 <c:pt idx="0">
-                  <c:v>100.0</c:v>
+                  <c:v>10.0</c:v>
                 </c:pt>
                 <c:pt idx="1">
-                  <c:v>100.0</c:v>
+                  <c:v>10.0</c:v>
                 </c:pt>
                 <c:pt idx="2">
-                  <c:v>99.0</c:v>
+                  <c:v>10.0</c:v>
                 </c:pt>
                 <c:pt idx="3">
-                  <c:v>98.0</c:v>
+                  <c:v>10.0</c:v>
                 </c:pt>
                 <c:pt idx="4">
-                  <c:v>96.0</c:v>
+                  <c:v>10.0</c:v>
                 </c:pt>
                 <c:pt idx="5">
-                  <c:v>95.0</c:v>
+                  <c:v>9.0</c:v>
                 </c:pt>
                 <c:pt idx="6">
-                  <c:v>92.0</c:v>
+                  <c:v>8.0</c:v>
                 </c:pt>
                 <c:pt idx="7">
-                  <c:v>90.0</c:v>
+                  <c:v>8.0</c:v>
                 </c:pt>
                 <c:pt idx="8">
-                  <c:v>87.0</c:v>
+                  <c:v>8.0</c:v>
                 </c:pt>
                 <c:pt idx="9">
-                  <c:v>85.0</c:v>
+                  <c:v>8.0</c:v>
                 </c:pt>
                 <c:pt idx="10">
-                  <c:v>82.0</c:v>
+                  <c:v>8.0</c:v>
                 </c:pt>
                 <c:pt idx="11">
-                  <c:v>80.0</c:v>
+                  <c:v>8.0</c:v>
                 </c:pt>
                 <c:pt idx="12">
-                  <c:v>74.0</c:v>
+                  <c:v>8.0</c:v>
                 </c:pt>
                 <c:pt idx="13">
-                  <c:v>73.0</c:v>
+                  <c:v>8.0</c:v>
                 </c:pt>
                 <c:pt idx="14">
-                  <c:v>61.0</c:v>
+                  <c:v>8.0</c:v>
                 </c:pt>
                 <c:pt idx="15">
-                  <c:v>59.0</c:v>
+                  <c:v>8.0</c:v>
                 </c:pt>
                 <c:pt idx="16">
-                  <c:v>54.0</c:v>
+                  <c:v>8.0</c:v>
                 </c:pt>
                 <c:pt idx="17">
-                  <c:v>43.0</c:v>
+                  <c:v>8.0</c:v>
                 </c:pt>
                 <c:pt idx="18">
-                  <c:v>29.0</c:v>
+                  <c:v>8.0</c:v>
                 </c:pt>
                 <c:pt idx="19">
-                  <c:v>22.0</c:v>
+                  <c:v>8.0</c:v>
                 </c:pt>
                 <c:pt idx="20">
-                  <c:v>18.0</c:v>
+                  <c:v>8.0</c:v>
                 </c:pt>
                 <c:pt idx="21">
-                  <c:v>16.0</c:v>
+                  <c:v>7.0</c:v>
                 </c:pt>
                 <c:pt idx="22">
-                  <c:v>8.0</c:v>
+                  <c:v>7.0</c:v>
                 </c:pt>
                 <c:pt idx="23">
                   <c:v>7.0</c:v>
                 </c:pt>
                 <c:pt idx="24">
-                  <c:v>4.0</c:v>
+                  <c:v>7.0</c:v>
                 </c:pt>
                 <c:pt idx="25">
-                  <c:v>4.0</c:v>
+                  <c:v>7.0</c:v>
                 </c:pt>
                 <c:pt idx="26">
-                  <c:v>3.0</c:v>
+                  <c:v>7.0</c:v>
                 </c:pt>
                 <c:pt idx="27">
-                  <c:v>3.0</c:v>
+                  <c:v>7.0</c:v>
                 </c:pt>
                 <c:pt idx="28">
-                  <c:v>2.0</c:v>
-                </c:pt>
-                <c:pt idx="29">
-                  <c:v>1.0</c:v>
-                </c:pt>
-                <c:pt idx="30">
-                  <c:v>1.0</c:v>
-                </c:pt>
-                <c:pt idx="31">
-                  <c:v>1.0</c:v>
-                </c:pt>
-                <c:pt idx="32">
-                  <c:v>1.0</c:v>
-                </c:pt>
-                <c:pt idx="33">
-                  <c:v>1.0</c:v>
+                  <c:v>7.0</c:v>
                 </c:pt>
               </c:numCache>
             </c:numRef>
@@ -2774,35 +3067,16 @@
           <c:showPercent val="0"/>
           <c:showBubbleSize val="0"/>
         </c:dLbls>
-        <c:axId val="737390736"/>
-        <c:axId val="737397968"/>
+        <c:axId val="-1358454320"/>
+        <c:axId val="-1358450288"/>
       </c:scatterChart>
       <c:valAx>
-        <c:axId val="737390736"/>
+        <c:axId val="-1358454320"/>
         <c:scaling>
           <c:orientation val="minMax"/>
         </c:scaling>
         <c:delete val="0"/>
         <c:axPos val="b"/>
-        <c:title>
-          <c:tx>
-            <c:rich>
-              <a:bodyPr/>
-              <a:lstStyle/>
-              <a:p>
-                <a:pPr>
-                  <a:defRPr sz="2000"/>
-                </a:pPr>
-                <a:r>
-                  <a:rPr lang="en-US" sz="2000"/>
-                  <a:t>Time(seconds)</a:t>
-                </a:r>
-              </a:p>
-            </c:rich>
-          </c:tx>
-          <c:layout/>
-          <c:overlay val="0"/>
-        </c:title>
         <c:numFmt formatCode="General" sourceLinked="1"/>
         <c:majorTickMark val="out"/>
         <c:minorTickMark val="none"/>
@@ -2824,44 +3098,19 @@
             <a:endParaRPr lang="en-US"/>
           </a:p>
         </c:txPr>
-        <c:crossAx val="737397968"/>
+        <c:crossAx val="-1358450288"/>
         <c:crosses val="autoZero"/>
         <c:crossBetween val="midCat"/>
       </c:valAx>
       <c:valAx>
-        <c:axId val="737397968"/>
+        <c:axId val="-1358450288"/>
         <c:scaling>
           <c:orientation val="minMax"/>
-          <c:min val="0.0"/>
         </c:scaling>
         <c:delete val="0"/>
         <c:axPos val="l"/>
         <c:majorGridlines/>
-        <c:title>
-          <c:tx>
-            <c:rich>
-              <a:bodyPr rot="-5400000" vert="horz"/>
-              <a:lstStyle/>
-              <a:p>
-                <a:pPr>
-                  <a:defRPr sz="2000"/>
-                </a:pPr>
-                <a:r>
-                  <a:rPr lang="en-US" sz="2000"/>
-                  <a:t>Number</a:t>
-                </a:r>
-                <a:r>
-                  <a:rPr lang="en-US" sz="2000" baseline="0"/>
-                  <a:t> of Viruses</a:t>
-                </a:r>
-                <a:endParaRPr lang="en-US" sz="2000"/>
-              </a:p>
-            </c:rich>
-          </c:tx>
-          <c:layout/>
-          <c:overlay val="0"/>
-        </c:title>
-        <c:numFmt formatCode="0.00" sourceLinked="1"/>
+        <c:numFmt formatCode="General" sourceLinked="1"/>
         <c:majorTickMark val="out"/>
         <c:minorTickMark val="none"/>
         <c:tickLblPos val="nextTo"/>
@@ -2875,7 +3124,7 @@
             <a:endParaRPr lang="en-US"/>
           </a:p>
         </c:txPr>
-        <c:crossAx val="737390736"/>
+        <c:crossAx val="-1358454320"/>
         <c:crosses val="autoZero"/>
         <c:crossBetween val="midCat"/>
       </c:valAx>
@@ -2922,359 +3171,6 @@
 </c:chartSpace>
 </file>
 
-<file path=ppt/charts/chart6.xml><?xml version="1.0" encoding="utf-8"?>
-<c:chartSpace xmlns:c="http://schemas.openxmlformats.org/drawingml/2006/chart" xmlns:a="http://schemas.openxmlformats.org/drawingml/2006/main" xmlns:r="http://schemas.openxmlformats.org/officeDocument/2006/relationships">
-  <c:date1904 val="0"/>
-  <c:lang val="en-US"/>
-  <c:roundedCorners val="0"/>
-  <mc:AlternateContent xmlns:mc="http://schemas.openxmlformats.org/markup-compatibility/2006">
-    <mc:Choice xmlns:c14="http://schemas.microsoft.com/office/drawing/2007/8/2/chart" Requires="c14">
-      <c14:style val="118"/>
-    </mc:Choice>
-    <mc:Fallback>
-      <c:style val="18"/>
-    </mc:Fallback>
-  </mc:AlternateContent>
-  <c:chart>
-    <c:title>
-      <c:tx>
-        <c:rich>
-          <a:bodyPr/>
-          <a:lstStyle/>
-          <a:p>
-            <a:pPr algn="ctr" rtl="1">
-              <a:defRPr sz="2400" b="1" i="0" u="none" strike="noStrike" baseline="0">
-                <a:solidFill>
-                  <a:srgbClr val="000000"/>
-                </a:solidFill>
-                <a:latin typeface="Calibri"/>
-                <a:ea typeface="Calibri"/>
-                <a:cs typeface="Calibri"/>
-              </a:defRPr>
-            </a:pPr>
-            <a:r>
-              <a:rPr lang="en-US" sz="2400"/>
-              <a:t>Number of Body Cells Dying With Bacteria </a:t>
-            </a:r>
-          </a:p>
-        </c:rich>
-      </c:tx>
-      <c:layout>
-        <c:manualLayout>
-          <c:xMode val="edge"/>
-          <c:yMode val="edge"/>
-          <c:x val="0.13794750656168"/>
-          <c:y val="0.0416666666666667"/>
-        </c:manualLayout>
-      </c:layout>
-      <c:overlay val="0"/>
-    </c:title>
-    <c:autoTitleDeleted val="0"/>
-    <c:plotArea>
-      <c:layout/>
-      <c:scatterChart>
-        <c:scatterStyle val="smoothMarker"/>
-        <c:varyColors val="0"/>
-        <c:ser>
-          <c:idx val="0"/>
-          <c:order val="0"/>
-          <c:tx>
-            <c:v>Body Cells Dying</c:v>
-          </c:tx>
-          <c:marker>
-            <c:symbol val="none"/>
-          </c:marker>
-          <c:xVal>
-            <c:numRef>
-              <c:f>Sheet1!$A$1:$A$29</c:f>
-              <c:numCache>
-                <c:formatCode>General</c:formatCode>
-                <c:ptCount val="29"/>
-                <c:pt idx="0">
-                  <c:v>1.0</c:v>
-                </c:pt>
-                <c:pt idx="1">
-                  <c:v>2.0</c:v>
-                </c:pt>
-                <c:pt idx="2">
-                  <c:v>3.0</c:v>
-                </c:pt>
-                <c:pt idx="3">
-                  <c:v>4.0</c:v>
-                </c:pt>
-                <c:pt idx="4">
-                  <c:v>5.0</c:v>
-                </c:pt>
-                <c:pt idx="5">
-                  <c:v>6.0</c:v>
-                </c:pt>
-                <c:pt idx="6">
-                  <c:v>7.0</c:v>
-                </c:pt>
-                <c:pt idx="7">
-                  <c:v>8.0</c:v>
-                </c:pt>
-                <c:pt idx="8">
-                  <c:v>9.0</c:v>
-                </c:pt>
-                <c:pt idx="9">
-                  <c:v>10.0</c:v>
-                </c:pt>
-                <c:pt idx="10">
-                  <c:v>11.0</c:v>
-                </c:pt>
-                <c:pt idx="11">
-                  <c:v>12.0</c:v>
-                </c:pt>
-                <c:pt idx="12">
-                  <c:v>13.0</c:v>
-                </c:pt>
-                <c:pt idx="13">
-                  <c:v>14.0</c:v>
-                </c:pt>
-                <c:pt idx="14">
-                  <c:v>15.0</c:v>
-                </c:pt>
-                <c:pt idx="15">
-                  <c:v>16.0</c:v>
-                </c:pt>
-                <c:pt idx="16">
-                  <c:v>17.0</c:v>
-                </c:pt>
-                <c:pt idx="17">
-                  <c:v>18.0</c:v>
-                </c:pt>
-                <c:pt idx="18">
-                  <c:v>19.0</c:v>
-                </c:pt>
-                <c:pt idx="19">
-                  <c:v>20.0</c:v>
-                </c:pt>
-                <c:pt idx="20">
-                  <c:v>21.0</c:v>
-                </c:pt>
-                <c:pt idx="21">
-                  <c:v>22.0</c:v>
-                </c:pt>
-                <c:pt idx="22">
-                  <c:v>23.0</c:v>
-                </c:pt>
-                <c:pt idx="23">
-                  <c:v>24.0</c:v>
-                </c:pt>
-                <c:pt idx="24">
-                  <c:v>25.0</c:v>
-                </c:pt>
-                <c:pt idx="25">
-                  <c:v>26.0</c:v>
-                </c:pt>
-                <c:pt idx="26">
-                  <c:v>27.0</c:v>
-                </c:pt>
-                <c:pt idx="27">
-                  <c:v>28.0</c:v>
-                </c:pt>
-                <c:pt idx="28">
-                  <c:v>29.0</c:v>
-                </c:pt>
-              </c:numCache>
-            </c:numRef>
-          </c:xVal>
-          <c:yVal>
-            <c:numRef>
-              <c:f>Sheet1!$B$1:$B$29</c:f>
-              <c:numCache>
-                <c:formatCode>General</c:formatCode>
-                <c:ptCount val="29"/>
-                <c:pt idx="0">
-                  <c:v>10.0</c:v>
-                </c:pt>
-                <c:pt idx="1">
-                  <c:v>10.0</c:v>
-                </c:pt>
-                <c:pt idx="2">
-                  <c:v>10.0</c:v>
-                </c:pt>
-                <c:pt idx="3">
-                  <c:v>10.0</c:v>
-                </c:pt>
-                <c:pt idx="4">
-                  <c:v>9.0</c:v>
-                </c:pt>
-                <c:pt idx="5">
-                  <c:v>9.0</c:v>
-                </c:pt>
-                <c:pt idx="6">
-                  <c:v>9.0</c:v>
-                </c:pt>
-                <c:pt idx="7">
-                  <c:v>9.0</c:v>
-                </c:pt>
-                <c:pt idx="8">
-                  <c:v>9.0</c:v>
-                </c:pt>
-                <c:pt idx="9">
-                  <c:v>9.0</c:v>
-                </c:pt>
-                <c:pt idx="10">
-                  <c:v>8.0</c:v>
-                </c:pt>
-                <c:pt idx="11">
-                  <c:v>8.0</c:v>
-                </c:pt>
-                <c:pt idx="12">
-                  <c:v>6.0</c:v>
-                </c:pt>
-                <c:pt idx="13">
-                  <c:v>5.0</c:v>
-                </c:pt>
-                <c:pt idx="14">
-                  <c:v>5.0</c:v>
-                </c:pt>
-                <c:pt idx="15">
-                  <c:v>4.0</c:v>
-                </c:pt>
-                <c:pt idx="16">
-                  <c:v>4.0</c:v>
-                </c:pt>
-                <c:pt idx="17">
-                  <c:v>2.0</c:v>
-                </c:pt>
-                <c:pt idx="18">
-                  <c:v>2.0</c:v>
-                </c:pt>
-                <c:pt idx="19">
-                  <c:v>2.0</c:v>
-                </c:pt>
-                <c:pt idx="20">
-                  <c:v>2.0</c:v>
-                </c:pt>
-                <c:pt idx="21">
-                  <c:v>2.0</c:v>
-                </c:pt>
-                <c:pt idx="22">
-                  <c:v>2.0</c:v>
-                </c:pt>
-                <c:pt idx="23">
-                  <c:v>1.0</c:v>
-                </c:pt>
-                <c:pt idx="24">
-                  <c:v>1.0</c:v>
-                </c:pt>
-                <c:pt idx="25">
-                  <c:v>1.0</c:v>
-                </c:pt>
-                <c:pt idx="26">
-                  <c:v>1.0</c:v>
-                </c:pt>
-                <c:pt idx="27">
-                  <c:v>1.0</c:v>
-                </c:pt>
-                <c:pt idx="28">
-                  <c:v>0.0</c:v>
-                </c:pt>
-              </c:numCache>
-            </c:numRef>
-          </c:yVal>
-          <c:smooth val="1"/>
-        </c:ser>
-        <c:dLbls>
-          <c:showLegendKey val="0"/>
-          <c:showVal val="0"/>
-          <c:showCatName val="0"/>
-          <c:showSerName val="0"/>
-          <c:showPercent val="0"/>
-          <c:showBubbleSize val="0"/>
-        </c:dLbls>
-        <c:axId val="737436976"/>
-        <c:axId val="737441024"/>
-      </c:scatterChart>
-      <c:valAx>
-        <c:axId val="737436976"/>
-        <c:scaling>
-          <c:orientation val="minMax"/>
-        </c:scaling>
-        <c:delete val="0"/>
-        <c:axPos val="b"/>
-        <c:numFmt formatCode="General" sourceLinked="1"/>
-        <c:majorTickMark val="out"/>
-        <c:minorTickMark val="none"/>
-        <c:tickLblPos val="nextTo"/>
-        <c:txPr>
-          <a:bodyPr rot="0" vert="horz"/>
-          <a:lstStyle/>
-          <a:p>
-            <a:pPr>
-              <a:defRPr sz="2000" b="0" i="0" u="none" strike="noStrike" baseline="0">
-                <a:solidFill>
-                  <a:srgbClr val="000000"/>
-                </a:solidFill>
-                <a:latin typeface="Calibri"/>
-                <a:ea typeface="Calibri"/>
-                <a:cs typeface="Calibri"/>
-              </a:defRPr>
-            </a:pPr>
-            <a:endParaRPr lang="en-US"/>
-          </a:p>
-        </c:txPr>
-        <c:crossAx val="737441024"/>
-        <c:crosses val="autoZero"/>
-        <c:crossBetween val="midCat"/>
-      </c:valAx>
-      <c:valAx>
-        <c:axId val="737441024"/>
-        <c:scaling>
-          <c:orientation val="minMax"/>
-        </c:scaling>
-        <c:delete val="0"/>
-        <c:axPos val="l"/>
-        <c:majorGridlines/>
-        <c:numFmt formatCode="General" sourceLinked="1"/>
-        <c:majorTickMark val="out"/>
-        <c:minorTickMark val="none"/>
-        <c:tickLblPos val="nextTo"/>
-        <c:txPr>
-          <a:bodyPr/>
-          <a:lstStyle/>
-          <a:p>
-            <a:pPr>
-              <a:defRPr sz="2000"/>
-            </a:pPr>
-            <a:endParaRPr lang="en-US"/>
-          </a:p>
-        </c:txPr>
-        <c:crossAx val="737436976"/>
-        <c:crosses val="autoZero"/>
-        <c:crossBetween val="midCat"/>
-      </c:valAx>
-    </c:plotArea>
-    <c:plotVisOnly val="1"/>
-    <c:dispBlanksAs val="gap"/>
-    <c:showDLblsOverMax val="0"/>
-  </c:chart>
-  <c:txPr>
-    <a:bodyPr/>
-    <a:lstStyle/>
-    <a:p>
-      <a:pPr>
-        <a:defRPr sz="1000" b="0" i="0" u="none" strike="noStrike" baseline="0">
-          <a:solidFill>
-            <a:srgbClr val="000000"/>
-          </a:solidFill>
-          <a:latin typeface="Calibri"/>
-          <a:ea typeface="Calibri"/>
-          <a:cs typeface="Calibri"/>
-        </a:defRPr>
-      </a:pPr>
-      <a:endParaRPr lang="en-US"/>
-    </a:p>
-  </c:txPr>
-  <c:externalData r:id="rId1">
-    <c:autoUpdate val="0"/>
-  </c:externalData>
-</c:chartSpace>
-</file>
-
 <file path=ppt/charts/chart7.xml><?xml version="1.0" encoding="utf-8"?>
 <c:chartSpace xmlns:c="http://schemas.openxmlformats.org/drawingml/2006/chart" xmlns:a="http://schemas.openxmlformats.org/drawingml/2006/main" xmlns:r="http://schemas.openxmlformats.org/officeDocument/2006/relationships">
   <c:date1904 val="0"/>
@@ -3296,7 +3192,7 @@
           <a:lstStyle/>
           <a:p>
             <a:pPr algn="ctr" rtl="1">
-              <a:defRPr sz="2000" b="1" i="0" u="none" strike="noStrike" baseline="0">
+              <a:defRPr sz="2400" b="1" i="0" u="none" strike="noStrike" baseline="0">
                 <a:solidFill>
                   <a:srgbClr val="000000"/>
                 </a:solidFill>
@@ -3306,8 +3202,8 @@
               </a:defRPr>
             </a:pPr>
             <a:r>
-              <a:rPr lang="en-US" sz="2000"/>
-              <a:t>Body Cell Death with Bacteria and Macrophages</a:t>
+              <a:rPr lang="en-US" sz="2400"/>
+              <a:t>Body Cell Death With and Without Immune System</a:t>
             </a:r>
           </a:p>
         </c:rich>
@@ -3325,17 +3221,17 @@
           <c:idx val="0"/>
           <c:order val="0"/>
           <c:tx>
-            <c:v> Without Macrophages</c:v>
+            <c:v>Without Immune System</c:v>
           </c:tx>
           <c:marker>
             <c:symbol val="none"/>
           </c:marker>
           <c:xVal>
             <c:numRef>
-              <c:f>Sheet1!$A$1:$A$29</c:f>
+              <c:f>'With Immune system'!$G$3:$G$36</c:f>
               <c:numCache>
                 <c:formatCode>General</c:formatCode>
-                <c:ptCount val="29"/>
+                <c:ptCount val="34"/>
                 <c:pt idx="0">
                   <c:v>1.0</c:v>
                 </c:pt>
@@ -3422,101 +3318,131 @@
                 </c:pt>
                 <c:pt idx="28">
                   <c:v>29.0</c:v>
+                </c:pt>
+                <c:pt idx="29">
+                  <c:v>30.0</c:v>
+                </c:pt>
+                <c:pt idx="30">
+                  <c:v>31.0</c:v>
+                </c:pt>
+                <c:pt idx="31">
+                  <c:v>32.0</c:v>
+                </c:pt>
+                <c:pt idx="32">
+                  <c:v>33.0</c:v>
+                </c:pt>
+                <c:pt idx="33">
+                  <c:v>34.0</c:v>
                 </c:pt>
               </c:numCache>
             </c:numRef>
           </c:xVal>
           <c:yVal>
             <c:numRef>
-              <c:f>Sheet1!$B$1:$B$29</c:f>
+              <c:f>'With Immune system'!$H$3:$H$36</c:f>
               <c:numCache>
-                <c:formatCode>General</c:formatCode>
-                <c:ptCount val="29"/>
+                <c:formatCode>0.00</c:formatCode>
+                <c:ptCount val="34"/>
                 <c:pt idx="0">
-                  <c:v>10.0</c:v>
+                  <c:v>100.0</c:v>
                 </c:pt>
                 <c:pt idx="1">
-                  <c:v>10.0</c:v>
+                  <c:v>100.0</c:v>
                 </c:pt>
                 <c:pt idx="2">
-                  <c:v>10.0</c:v>
+                  <c:v>100.0</c:v>
                 </c:pt>
                 <c:pt idx="3">
-                  <c:v>10.0</c:v>
+                  <c:v>46.66666666666666</c:v>
                 </c:pt>
                 <c:pt idx="4">
-                  <c:v>9.0</c:v>
+                  <c:v>46.66666666666666</c:v>
                 </c:pt>
                 <c:pt idx="5">
-                  <c:v>9.0</c:v>
+                  <c:v>46.66666666666666</c:v>
                 </c:pt>
                 <c:pt idx="6">
-                  <c:v>9.0</c:v>
+                  <c:v>46.66666666666666</c:v>
                 </c:pt>
                 <c:pt idx="7">
-                  <c:v>9.0</c:v>
+                  <c:v>46.66666666666666</c:v>
                 </c:pt>
                 <c:pt idx="8">
-                  <c:v>9.0</c:v>
+                  <c:v>46.66666666666666</c:v>
                 </c:pt>
                 <c:pt idx="9">
-                  <c:v>9.0</c:v>
+                  <c:v>5.0</c:v>
                 </c:pt>
                 <c:pt idx="10">
-                  <c:v>8.0</c:v>
+                  <c:v>2.333333333333333</c:v>
                 </c:pt>
                 <c:pt idx="11">
-                  <c:v>8.0</c:v>
+                  <c:v>2.0</c:v>
                 </c:pt>
                 <c:pt idx="12">
-                  <c:v>6.0</c:v>
+                  <c:v>1.0</c:v>
                 </c:pt>
                 <c:pt idx="13">
-                  <c:v>5.0</c:v>
+                  <c:v>0.666666666666667</c:v>
                 </c:pt>
                 <c:pt idx="14">
-                  <c:v>5.0</c:v>
+                  <c:v>0.666666666666667</c:v>
                 </c:pt>
                 <c:pt idx="15">
-                  <c:v>4.0</c:v>
+                  <c:v>0.0</c:v>
                 </c:pt>
                 <c:pt idx="16">
-                  <c:v>4.0</c:v>
+                  <c:v>0.0</c:v>
                 </c:pt>
                 <c:pt idx="17">
-                  <c:v>2.0</c:v>
+                  <c:v>0.0</c:v>
                 </c:pt>
                 <c:pt idx="18">
-                  <c:v>2.0</c:v>
+                  <c:v>0.0</c:v>
                 </c:pt>
                 <c:pt idx="19">
-                  <c:v>2.0</c:v>
+                  <c:v>0.0</c:v>
                 </c:pt>
                 <c:pt idx="20">
-                  <c:v>2.0</c:v>
+                  <c:v>0.0</c:v>
                 </c:pt>
                 <c:pt idx="21">
-                  <c:v>2.0</c:v>
+                  <c:v>0.0</c:v>
                 </c:pt>
                 <c:pt idx="22">
-                  <c:v>2.0</c:v>
+                  <c:v>0.0</c:v>
                 </c:pt>
                 <c:pt idx="23">
-                  <c:v>1.0</c:v>
+                  <c:v>0.0</c:v>
                 </c:pt>
                 <c:pt idx="24">
-                  <c:v>1.0</c:v>
+                  <c:v>0.0</c:v>
                 </c:pt>
                 <c:pt idx="25">
-                  <c:v>1.0</c:v>
+                  <c:v>0.0</c:v>
                 </c:pt>
                 <c:pt idx="26">
-                  <c:v>1.0</c:v>
+                  <c:v>0.0</c:v>
                 </c:pt>
                 <c:pt idx="27">
-                  <c:v>1.0</c:v>
+                  <c:v>0.0</c:v>
                 </c:pt>
                 <c:pt idx="28">
+                  <c:v>0.0</c:v>
+                </c:pt>
+                <c:pt idx="29">
+                  <c:v>0.0</c:v>
+                </c:pt>
+                <c:pt idx="30">
+                  <c:v>0.0</c:v>
+                </c:pt>
+                <c:pt idx="31">
+                  <c:v>0.0</c:v>
+                </c:pt>
+                <c:pt idx="32">
+                  <c:v>0.0</c:v>
+                </c:pt>
+                <c:pt idx="33">
                   <c:v>0.0</c:v>
                 </c:pt>
               </c:numCache>
@@ -3528,12 +3454,12 @@
           <c:idx val="1"/>
           <c:order val="1"/>
           <c:tx>
-            <c:v> With Macrophages</c:v>
+            <c:v>With Immune System</c:v>
           </c:tx>
           <c:spPr>
             <a:ln>
               <a:solidFill>
-                <a:srgbClr val="00E88F"/>
+                <a:srgbClr val="FFC000"/>
               </a:solidFill>
             </a:ln>
           </c:spPr>
@@ -3542,10 +3468,10 @@
           </c:marker>
           <c:xVal>
             <c:numRef>
-              <c:f>Sheet1!$A$1:$A$29</c:f>
+              <c:f>'With Immune system'!$G$3:$G$36</c:f>
               <c:numCache>
                 <c:formatCode>General</c:formatCode>
-                <c:ptCount val="29"/>
+                <c:ptCount val="34"/>
                 <c:pt idx="0">
                   <c:v>1.0</c:v>
                 </c:pt>
@@ -3632,102 +3558,132 @@
                 </c:pt>
                 <c:pt idx="28">
                   <c:v>29.0</c:v>
+                </c:pt>
+                <c:pt idx="29">
+                  <c:v>30.0</c:v>
+                </c:pt>
+                <c:pt idx="30">
+                  <c:v>31.0</c:v>
+                </c:pt>
+                <c:pt idx="31">
+                  <c:v>32.0</c:v>
+                </c:pt>
+                <c:pt idx="32">
+                  <c:v>33.0</c:v>
+                </c:pt>
+                <c:pt idx="33">
+                  <c:v>34.0</c:v>
                 </c:pt>
               </c:numCache>
             </c:numRef>
           </c:xVal>
           <c:yVal>
             <c:numRef>
-              <c:f>Sheet1!$C$1:$C$29</c:f>
+              <c:f>'With Immune system'!$I$3:$I$36</c:f>
               <c:numCache>
                 <c:formatCode>General</c:formatCode>
-                <c:ptCount val="29"/>
+                <c:ptCount val="34"/>
                 <c:pt idx="0">
-                  <c:v>10.0</c:v>
+                  <c:v>100.0</c:v>
                 </c:pt>
                 <c:pt idx="1">
-                  <c:v>10.0</c:v>
+                  <c:v>100.0</c:v>
                 </c:pt>
                 <c:pt idx="2">
-                  <c:v>10.0</c:v>
+                  <c:v>99.0</c:v>
                 </c:pt>
                 <c:pt idx="3">
-                  <c:v>10.0</c:v>
+                  <c:v>98.0</c:v>
                 </c:pt>
                 <c:pt idx="4">
-                  <c:v>10.0</c:v>
+                  <c:v>96.0</c:v>
                 </c:pt>
                 <c:pt idx="5">
-                  <c:v>9.0</c:v>
+                  <c:v>95.0</c:v>
                 </c:pt>
                 <c:pt idx="6">
+                  <c:v>92.0</c:v>
+                </c:pt>
+                <c:pt idx="7">
+                  <c:v>90.0</c:v>
+                </c:pt>
+                <c:pt idx="8">
+                  <c:v>87.0</c:v>
+                </c:pt>
+                <c:pt idx="9">
+                  <c:v>85.0</c:v>
+                </c:pt>
+                <c:pt idx="10">
+                  <c:v>82.0</c:v>
+                </c:pt>
+                <c:pt idx="11">
+                  <c:v>80.0</c:v>
+                </c:pt>
+                <c:pt idx="12">
+                  <c:v>74.0</c:v>
+                </c:pt>
+                <c:pt idx="13">
+                  <c:v>73.0</c:v>
+                </c:pt>
+                <c:pt idx="14">
+                  <c:v>61.0</c:v>
+                </c:pt>
+                <c:pt idx="15">
+                  <c:v>59.0</c:v>
+                </c:pt>
+                <c:pt idx="16">
+                  <c:v>54.0</c:v>
+                </c:pt>
+                <c:pt idx="17">
+                  <c:v>43.0</c:v>
+                </c:pt>
+                <c:pt idx="18">
+                  <c:v>29.0</c:v>
+                </c:pt>
+                <c:pt idx="19">
+                  <c:v>22.0</c:v>
+                </c:pt>
+                <c:pt idx="20">
+                  <c:v>18.0</c:v>
+                </c:pt>
+                <c:pt idx="21">
+                  <c:v>16.0</c:v>
+                </c:pt>
+                <c:pt idx="22">
                   <c:v>8.0</c:v>
-                </c:pt>
-                <c:pt idx="7">
-                  <c:v>8.0</c:v>
-                </c:pt>
-                <c:pt idx="8">
-                  <c:v>8.0</c:v>
-                </c:pt>
-                <c:pt idx="9">
-                  <c:v>8.0</c:v>
-                </c:pt>
-                <c:pt idx="10">
-                  <c:v>8.0</c:v>
-                </c:pt>
-                <c:pt idx="11">
-                  <c:v>8.0</c:v>
-                </c:pt>
-                <c:pt idx="12">
-                  <c:v>8.0</c:v>
-                </c:pt>
-                <c:pt idx="13">
-                  <c:v>8.0</c:v>
-                </c:pt>
-                <c:pt idx="14">
-                  <c:v>8.0</c:v>
-                </c:pt>
-                <c:pt idx="15">
-                  <c:v>8.0</c:v>
-                </c:pt>
-                <c:pt idx="16">
-                  <c:v>8.0</c:v>
-                </c:pt>
-                <c:pt idx="17">
-                  <c:v>8.0</c:v>
-                </c:pt>
-                <c:pt idx="18">
-                  <c:v>8.0</c:v>
-                </c:pt>
-                <c:pt idx="19">
-                  <c:v>8.0</c:v>
-                </c:pt>
-                <c:pt idx="20">
-                  <c:v>8.0</c:v>
-                </c:pt>
-                <c:pt idx="21">
-                  <c:v>7.0</c:v>
-                </c:pt>
-                <c:pt idx="22">
-                  <c:v>7.0</c:v>
                 </c:pt>
                 <c:pt idx="23">
                   <c:v>7.0</c:v>
                 </c:pt>
                 <c:pt idx="24">
-                  <c:v>7.0</c:v>
+                  <c:v>4.0</c:v>
                 </c:pt>
                 <c:pt idx="25">
-                  <c:v>7.0</c:v>
+                  <c:v>4.0</c:v>
                 </c:pt>
                 <c:pt idx="26">
-                  <c:v>7.0</c:v>
+                  <c:v>3.0</c:v>
                 </c:pt>
                 <c:pt idx="27">
-                  <c:v>7.0</c:v>
+                  <c:v>3.0</c:v>
                 </c:pt>
                 <c:pt idx="28">
-                  <c:v>7.0</c:v>
+                  <c:v>2.0</c:v>
+                </c:pt>
+                <c:pt idx="29">
+                  <c:v>1.0</c:v>
+                </c:pt>
+                <c:pt idx="30">
+                  <c:v>1.0</c:v>
+                </c:pt>
+                <c:pt idx="31">
+                  <c:v>1.0</c:v>
+                </c:pt>
+                <c:pt idx="32">
+                  <c:v>1.0</c:v>
+                </c:pt>
+                <c:pt idx="33">
+                  <c:v>1.0</c:v>
                 </c:pt>
               </c:numCache>
             </c:numRef>
@@ -3742,16 +3698,35 @@
           <c:showPercent val="0"/>
           <c:showBubbleSize val="0"/>
         </c:dLbls>
-        <c:axId val="737492576"/>
-        <c:axId val="679252128"/>
+        <c:axId val="-1329044544"/>
+        <c:axId val="-1329305808"/>
       </c:scatterChart>
       <c:valAx>
-        <c:axId val="737492576"/>
+        <c:axId val="-1329044544"/>
         <c:scaling>
           <c:orientation val="minMax"/>
         </c:scaling>
         <c:delete val="0"/>
         <c:axPos val="b"/>
+        <c:title>
+          <c:tx>
+            <c:rich>
+              <a:bodyPr/>
+              <a:lstStyle/>
+              <a:p>
+                <a:pPr>
+                  <a:defRPr sz="2000"/>
+                </a:pPr>
+                <a:r>
+                  <a:rPr lang="en-US" sz="2000"/>
+                  <a:t>Time(seconds)</a:t>
+                </a:r>
+              </a:p>
+            </c:rich>
+          </c:tx>
+          <c:layout/>
+          <c:overlay val="0"/>
+        </c:title>
         <c:numFmt formatCode="General" sourceLinked="1"/>
         <c:majorTickMark val="out"/>
         <c:minorTickMark val="none"/>
@@ -3773,19 +3748,44 @@
             <a:endParaRPr lang="en-US"/>
           </a:p>
         </c:txPr>
-        <c:crossAx val="679252128"/>
+        <c:crossAx val="-1329305808"/>
         <c:crosses val="autoZero"/>
         <c:crossBetween val="midCat"/>
       </c:valAx>
       <c:valAx>
-        <c:axId val="679252128"/>
+        <c:axId val="-1329305808"/>
         <c:scaling>
           <c:orientation val="minMax"/>
+          <c:min val="0.0"/>
         </c:scaling>
         <c:delete val="0"/>
         <c:axPos val="l"/>
         <c:majorGridlines/>
-        <c:numFmt formatCode="General" sourceLinked="1"/>
+        <c:title>
+          <c:tx>
+            <c:rich>
+              <a:bodyPr rot="-5400000" vert="horz"/>
+              <a:lstStyle/>
+              <a:p>
+                <a:pPr>
+                  <a:defRPr sz="2000"/>
+                </a:pPr>
+                <a:r>
+                  <a:rPr lang="en-US" sz="2000"/>
+                  <a:t>Number</a:t>
+                </a:r>
+                <a:r>
+                  <a:rPr lang="en-US" sz="2000" baseline="0"/>
+                  <a:t> of Cells</a:t>
+                </a:r>
+                <a:endParaRPr lang="en-US" sz="2000"/>
+              </a:p>
+            </c:rich>
+          </c:tx>
+          <c:layout/>
+          <c:overlay val="0"/>
+        </c:title>
+        <c:numFmt formatCode="0.00" sourceLinked="1"/>
         <c:majorTickMark val="out"/>
         <c:minorTickMark val="none"/>
         <c:tickLblPos val="nextTo"/>
@@ -3799,7 +3799,7 @@
             <a:endParaRPr lang="en-US"/>
           </a:p>
         </c:txPr>
-        <c:crossAx val="737492576"/>
+        <c:crossAx val="-1329044544"/>
         <c:crosses val="autoZero"/>
         <c:crossBetween val="midCat"/>
       </c:valAx>
@@ -3928,7 +3928,7 @@
           <a:p>
             <a:fld id="{C774A270-9CA5-4E17-9448-1389142F63AE}" type="datetimeFigureOut">
               <a:rPr lang="en-US" smtClean="0"/>
-              <a:t>1/15/17</a:t>
+              <a:t>1/23/17</a:t>
             </a:fld>
             <a:endParaRPr lang="en-US"/>
           </a:p>
@@ -4718,7 +4718,7 @@
           <a:p>
             <a:fld id="{48A87A34-81AB-432B-8DAE-1953F412C126}" type="datetimeFigureOut">
               <a:rPr lang="en-US" smtClean="0"/>
-              <a:t>1/15/17</a:t>
+              <a:t>1/23/17</a:t>
             </a:fld>
             <a:endParaRPr lang="en-US" dirty="0"/>
           </a:p>
@@ -4933,7 +4933,7 @@
             <a:fld id="{48A87A34-81AB-432B-8DAE-1953F412C126}" type="datetimeFigureOut">
               <a:rPr lang="en-US" smtClean="0"/>
               <a:pPr/>
-              <a:t>1/15/17</a:t>
+              <a:t>1/23/17</a:t>
             </a:fld>
             <a:endParaRPr lang="en-US" dirty="0"/>
           </a:p>
@@ -6389,13 +6389,7 @@
                 <a:rPr lang="en-US" sz="2400" b="1" dirty="0" smtClean="0">
                   <a:cs typeface="Century Gothic"/>
                 </a:rPr>
-                <a:t>Our </a:t>
-              </a:r>
-              <a:r>
-                <a:rPr lang="en-US" sz="2400" b="1" dirty="0" smtClean="0">
-                  <a:cs typeface="Century Gothic"/>
-                </a:rPr>
-                <a:t>immune system. </a:t>
+                <a:t>Our immune system. </a:t>
               </a:r>
             </a:p>
             <a:p>
@@ -6569,19 +6563,7 @@
                 <a:rPr lang="en-US" sz="2400" dirty="0" smtClean="0">
                   <a:cs typeface="Century Gothic"/>
                 </a:rPr>
-                <a:t>To </a:t>
-              </a:r>
-              <a:r>
-                <a:rPr lang="en-US" sz="2400" dirty="0" smtClean="0">
-                  <a:cs typeface="Century Gothic"/>
-                </a:rPr>
-                <a:t>simulate </a:t>
-              </a:r>
-              <a:r>
-                <a:rPr lang="en-US" sz="2400" dirty="0" smtClean="0">
-                  <a:cs typeface="Century Gothic"/>
-                </a:rPr>
-                <a:t>the immune system and different pathogenic infections so we can better understand how our immune system works</a:t>
+                <a:t>To simulate the immune system and different pathogenic infections so we can better understand how our immune system works</a:t>
               </a:r>
               <a:r>
                 <a:rPr lang="en-US" sz="2000" dirty="0" smtClean="0">
@@ -6615,9 +6597,6 @@
                 </a:rPr>
                 <a:t>The simulation reflected aspects of the immune system effectively, based on known behaviors of the immune system.</a:t>
               </a:r>
-              <a:endParaRPr lang="en-US" sz="2400" dirty="0" smtClean="0">
-                <a:cs typeface="Century Gothic"/>
-              </a:endParaRPr>
             </a:p>
             <a:p>
               <a:pPr>
@@ -8284,13 +8263,7 @@
                 <a:rPr lang="en-US" sz="2400" dirty="0" smtClean="0">
                   <a:cs typeface="Century Gothic"/>
                 </a:rPr>
-                <a:t>Infecting 100 body cells with the entire immune system for </a:t>
-              </a:r>
-              <a:r>
-                <a:rPr lang="en-US" sz="2400" dirty="0" smtClean="0">
-                  <a:cs typeface="Century Gothic"/>
-                </a:rPr>
-                <a:t>protection</a:t>
+                <a:t>Infecting 100 body cells with the entire immune system for protection</a:t>
               </a:r>
               <a:endParaRPr lang="en-US" sz="2400" dirty="0">
                 <a:cs typeface="Century Gothic"/>
@@ -8319,30 +8292,6 @@
           <a:graphic>
             <a:graphicData uri="http://schemas.openxmlformats.org/drawingml/2006/chart">
               <c:chart xmlns:c="http://schemas.openxmlformats.org/drawingml/2006/chart" xmlns:r="http://schemas.openxmlformats.org/officeDocument/2006/relationships" r:id="rId10"/>
-            </a:graphicData>
-          </a:graphic>
-        </p:graphicFrame>
-        <p:graphicFrame>
-          <p:nvGraphicFramePr>
-            <p:cNvPr id="48" name="Chart 47"/>
-            <p:cNvGraphicFramePr>
-              <a:graphicFrameLocks/>
-            </p:cNvGraphicFramePr>
-            <p:nvPr>
-              <p:extLst>
-                <p:ext uri="{D42A27DB-BD31-4B8C-83A1-F6EECF244321}">
-                  <p14:modId xmlns:p14="http://schemas.microsoft.com/office/powerpoint/2010/main" val="522732648"/>
-                </p:ext>
-              </p:extLst>
-            </p:nvPr>
-          </p:nvGraphicFramePr>
-          <p:xfrm>
-            <a:off x="18727105" y="11722574"/>
-            <a:ext cx="6507133" cy="5689600"/>
-          </p:xfrm>
-          <a:graphic>
-            <a:graphicData uri="http://schemas.openxmlformats.org/drawingml/2006/chart">
-              <c:chart xmlns:c="http://schemas.openxmlformats.org/drawingml/2006/chart" xmlns:r="http://schemas.openxmlformats.org/officeDocument/2006/relationships" r:id="rId11"/>
             </a:graphicData>
           </a:graphic>
         </p:graphicFrame>
@@ -8467,14 +8416,7 @@
                   <a:ea typeface="Century Gothic" charset="0"/>
                   <a:cs typeface="Century Gothic" charset="0"/>
                 </a:rPr>
-                <a:t> Killing 10 body cells with </a:t>
-              </a:r>
-              <a:r>
-                <a:rPr lang="en-US" sz="2400" dirty="0" smtClean="0">
-                  <a:ea typeface="Century Gothic" charset="0"/>
-                  <a:cs typeface="Century Gothic" charset="0"/>
-                </a:rPr>
-                <a:t>bacteria</a:t>
+                <a:t> Killing 10 body cells with bacteria</a:t>
               </a:r>
               <a:endParaRPr lang="en-US" sz="2400" dirty="0">
                 <a:ea typeface="Century Gothic" charset="0"/>
@@ -8517,14 +8459,7 @@
                   <a:ea typeface="Century Gothic" charset="0"/>
                   <a:cs typeface="Century Gothic" charset="0"/>
                 </a:rPr>
-                <a:t>Killing 10 body cells with 10 macrophages for </a:t>
-              </a:r>
-              <a:r>
-                <a:rPr lang="en-US" sz="2400" dirty="0" smtClean="0">
-                  <a:ea typeface="Century Gothic" charset="0"/>
-                  <a:cs typeface="Century Gothic" charset="0"/>
-                </a:rPr>
-                <a:t>protection </a:t>
+                <a:t>Killing 10 body cells with 10 macrophages for protection </a:t>
               </a:r>
               <a:endParaRPr lang="en-US" sz="2400" dirty="0">
                 <a:ea typeface="Century Gothic" charset="0"/>
@@ -8553,7 +8488,7 @@
           </p:xfrm>
           <a:graphic>
             <a:graphicData uri="http://schemas.openxmlformats.org/drawingml/2006/chart">
-              <c:chart xmlns:c="http://schemas.openxmlformats.org/drawingml/2006/chart" xmlns:r="http://schemas.openxmlformats.org/officeDocument/2006/relationships" r:id="rId12"/>
+              <c:chart xmlns:c="http://schemas.openxmlformats.org/drawingml/2006/chart" xmlns:r="http://schemas.openxmlformats.org/officeDocument/2006/relationships" r:id="rId11"/>
             </a:graphicData>
           </a:graphic>
         </p:graphicFrame>
@@ -8577,7 +8512,7 @@
           </p:xfrm>
           <a:graphic>
             <a:graphicData uri="http://schemas.openxmlformats.org/drawingml/2006/chart">
-              <c:chart xmlns:c="http://schemas.openxmlformats.org/drawingml/2006/chart" xmlns:r="http://schemas.openxmlformats.org/officeDocument/2006/relationships" r:id="rId13"/>
+              <c:chart xmlns:c="http://schemas.openxmlformats.org/drawingml/2006/chart" xmlns:r="http://schemas.openxmlformats.org/officeDocument/2006/relationships" r:id="rId12"/>
             </a:graphicData>
           </a:graphic>
         </p:graphicFrame>
@@ -8715,6 +8650,30 @@
           </a:p>
         </p:txBody>
       </p:sp>
+      <p:graphicFrame>
+        <p:nvGraphicFramePr>
+          <p:cNvPr id="44" name="Chart 43"/>
+          <p:cNvGraphicFramePr>
+            <a:graphicFrameLocks/>
+          </p:cNvGraphicFramePr>
+          <p:nvPr>
+            <p:extLst>
+              <p:ext uri="{D42A27DB-BD31-4B8C-83A1-F6EECF244321}">
+                <p14:modId xmlns:p14="http://schemas.microsoft.com/office/powerpoint/2010/main" val="433915682"/>
+              </p:ext>
+            </p:extLst>
+          </p:nvPr>
+        </p:nvGraphicFramePr>
+        <p:xfrm>
+          <a:off x="18851663" y="15547665"/>
+          <a:ext cx="6567701" cy="5608153"/>
+        </p:xfrm>
+        <a:graphic>
+          <a:graphicData uri="http://schemas.openxmlformats.org/drawingml/2006/chart">
+            <c:chart xmlns:c="http://schemas.openxmlformats.org/drawingml/2006/chart" xmlns:r="http://schemas.openxmlformats.org/officeDocument/2006/relationships" r:id="rId13"/>
+          </a:graphicData>
+        </a:graphic>
+      </p:graphicFrame>
     </p:spTree>
     <p:extLst>
       <p:ext uri="{BB962C8B-B14F-4D97-AF65-F5344CB8AC3E}">

</xml_diff>